<commit_message>
PPT CHANGED AS GP
</commit_message>
<xml_diff>
--- a/docs/presentation.pptx
+++ b/docs/presentation.pptx
@@ -9,9 +9,10 @@
     <p:sldId id="257" r:id="rId3"/>
     <p:sldId id="262" r:id="rId4"/>
     <p:sldId id="258" r:id="rId5"/>
-    <p:sldId id="259" r:id="rId6"/>
-    <p:sldId id="260" r:id="rId7"/>
-    <p:sldId id="261" r:id="rId8"/>
+    <p:sldId id="263" r:id="rId6"/>
+    <p:sldId id="259" r:id="rId7"/>
+    <p:sldId id="260" r:id="rId8"/>
+    <p:sldId id="261" r:id="rId9"/>
   </p:sldIdLst>
   <p:sldSz cx="9144000" cy="6858000" type="screen4x3"/>
   <p:notesSz cx="6858000" cy="9144000"/>
@@ -112,7 +113,7 @@
   </p:defaultTextStyle>
   <p:extLst>
     <p:ext uri="{EFAFB233-063F-42B5-8137-9DF3F51BA10A}">
-      <p15:sldGuideLst xmlns:p15="http://schemas.microsoft.com/office/powerpoint/2012/main" xmlns="">
+      <p15:sldGuideLst xmlns="" xmlns:p15="http://schemas.microsoft.com/office/powerpoint/2012/main">
         <p15:guide id="1" orient="horz" pos="2160">
           <p15:clr>
             <a:srgbClr val="A4A3A4"/>
@@ -3933,7 +3934,7 @@
     </p:spTree>
     <p:extLst>
       <p:ext uri="{BB962C8B-B14F-4D97-AF65-F5344CB8AC3E}">
-        <p14:creationId xmlns:p14="http://schemas.microsoft.com/office/powerpoint/2010/main" xmlns="" val="2689682241"/>
+        <p14:creationId xmlns="" xmlns:p14="http://schemas.microsoft.com/office/powerpoint/2010/main" val="2689682241"/>
       </p:ext>
     </p:extLst>
   </p:cSld>
@@ -4032,17 +4033,8 @@
               <a:rPr lang="en-GB" dirty="0" smtClean="0">
                 <a:latin typeface="Lucida Sans" pitchFamily="34" charset="0"/>
               </a:rPr>
-              <a:t>-themed</a:t>
-            </a:r>
-            <a:r>
-              <a:rPr lang="en-GB" dirty="0" smtClean="0">
-                <a:latin typeface="Lucida Sans" pitchFamily="34" charset="0"/>
-              </a:rPr>
-              <a:t> discussion forum.</a:t>
-            </a:r>
-            <a:endParaRPr lang="en-GB" dirty="0" smtClean="0">
-              <a:latin typeface="Lucida Sans" pitchFamily="34" charset="0"/>
-            </a:endParaRPr>
+              <a:t>-themed discussion forum.</a:t>
+            </a:r>
           </a:p>
           <a:p>
             <a:pPr lvl="1"/>
@@ -4058,9 +4050,6 @@
               </a:rPr>
               <a:t>An easy to use, personalised, customisable experience</a:t>
             </a:r>
-            <a:endParaRPr lang="en-GB" dirty="0" smtClean="0">
-              <a:latin typeface="Lucida Sans" pitchFamily="34" charset="0"/>
-            </a:endParaRPr>
           </a:p>
           <a:p>
             <a:pPr lvl="2"/>
@@ -4068,50 +4057,17 @@
               <a:rPr lang="en-GB" dirty="0" smtClean="0">
                 <a:latin typeface="Lucida Sans" pitchFamily="34" charset="0"/>
               </a:rPr>
-              <a:t>Users </a:t>
-            </a:r>
+              <a:t>Users can browse or follow tags, customising their homepage</a:t>
+            </a:r>
+          </a:p>
+          <a:p>
+            <a:pPr lvl="2"/>
             <a:r>
               <a:rPr lang="en-GB" dirty="0" smtClean="0">
                 <a:latin typeface="Lucida Sans" pitchFamily="34" charset="0"/>
               </a:rPr>
-              <a:t>can browse or </a:t>
-            </a:r>
-            <a:r>
-              <a:rPr lang="en-GB" dirty="0" smtClean="0">
-                <a:latin typeface="Lucida Sans" pitchFamily="34" charset="0"/>
-              </a:rPr>
-              <a:t>follow tags, </a:t>
-            </a:r>
-            <a:r>
-              <a:rPr lang="en-GB" dirty="0" smtClean="0">
-                <a:latin typeface="Lucida Sans" pitchFamily="34" charset="0"/>
-              </a:rPr>
-              <a:t>customising </a:t>
-            </a:r>
-            <a:r>
-              <a:rPr lang="en-GB" dirty="0" smtClean="0">
-                <a:latin typeface="Lucida Sans" pitchFamily="34" charset="0"/>
-              </a:rPr>
-              <a:t>their homepage</a:t>
-            </a:r>
-          </a:p>
-          <a:p>
-            <a:pPr lvl="2"/>
-            <a:r>
-              <a:rPr lang="en-GB" dirty="0" smtClean="0">
-                <a:latin typeface="Lucida Sans" pitchFamily="34" charset="0"/>
-              </a:rPr>
-              <a:t>Reserved tags for universities, special groups. TODO?: Users have to be verified/accepted</a:t>
-            </a:r>
-            <a:r>
-              <a:rPr lang="en-GB" dirty="0" smtClean="0">
-                <a:latin typeface="Lucida Sans" pitchFamily="34" charset="0"/>
-              </a:rPr>
-              <a:t> to post in these groups.</a:t>
-            </a:r>
-            <a:endParaRPr lang="en-GB" dirty="0" smtClean="0">
-              <a:latin typeface="Lucida Sans" pitchFamily="34" charset="0"/>
-            </a:endParaRPr>
+              <a:t>Reserved tags for universities, special groups. TODO?: Users have to be verified/accepted to post in these groups.</a:t>
+            </a:r>
           </a:p>
           <a:p>
             <a:pPr lvl="1"/>
@@ -4162,7 +4118,7 @@
     </p:spTree>
     <p:extLst>
       <p:ext uri="{BB962C8B-B14F-4D97-AF65-F5344CB8AC3E}">
-        <p14:creationId xmlns:p14="http://schemas.microsoft.com/office/powerpoint/2010/main" xmlns="" val="1822052854"/>
+        <p14:creationId xmlns="" xmlns:p14="http://schemas.microsoft.com/office/powerpoint/2010/main" val="1822052854"/>
       </p:ext>
     </p:extLst>
   </p:cSld>
@@ -4264,9 +4220,6 @@
               </a:rPr>
               <a:t>Registered, logged in users can:</a:t>
             </a:r>
-            <a:endParaRPr lang="en-GB" dirty="0" smtClean="0">
-              <a:latin typeface="Lucida Sans" pitchFamily="34" charset="0"/>
-            </a:endParaRPr>
           </a:p>
           <a:p>
             <a:pPr marL="0" indent="0">
@@ -4276,19 +4229,29 @@
               <a:rPr lang="en-GB" dirty="0" smtClean="0">
                 <a:latin typeface="Lucida Sans" pitchFamily="34" charset="0"/>
               </a:rPr>
-              <a:t>	- </a:t>
-            </a:r>
+              <a:t>	- post content, questions, interesting links, videos</a:t>
+            </a:r>
+          </a:p>
+          <a:p>
+            <a:pPr marL="0" indent="0">
+              <a:buNone/>
+            </a:pPr>
             <a:r>
               <a:rPr lang="en-GB" dirty="0" smtClean="0">
                 <a:latin typeface="Lucida Sans" pitchFamily="34" charset="0"/>
               </a:rPr>
-              <a:t>p</a:t>
-            </a:r>
+              <a:t>	- rate posts positively, “like”</a:t>
+            </a:r>
+          </a:p>
+          <a:p>
+            <a:pPr marL="0" indent="0">
+              <a:buNone/>
+            </a:pPr>
             <a:r>
               <a:rPr lang="en-GB" dirty="0" smtClean="0">
                 <a:latin typeface="Lucida Sans" pitchFamily="34" charset="0"/>
               </a:rPr>
-              <a:t>ost content, questions, interesting links, videos</a:t>
+              <a:t>	- comment on existing posts</a:t>
             </a:r>
           </a:p>
           <a:p>
@@ -4299,93 +4262,8 @@
               <a:rPr lang="en-GB" dirty="0" smtClean="0">
                 <a:latin typeface="Lucida Sans" pitchFamily="34" charset="0"/>
               </a:rPr>
-              <a:t>	- </a:t>
-            </a:r>
-            <a:r>
-              <a:rPr lang="en-GB" dirty="0" smtClean="0">
-                <a:latin typeface="Lucida Sans" pitchFamily="34" charset="0"/>
-              </a:rPr>
-              <a:t>rate posts positively, “like”</a:t>
-            </a:r>
-            <a:endParaRPr lang="en-GB" dirty="0" smtClean="0">
-              <a:latin typeface="Lucida Sans" pitchFamily="34" charset="0"/>
-            </a:endParaRPr>
-          </a:p>
-          <a:p>
-            <a:pPr marL="0" indent="0">
-              <a:buNone/>
-            </a:pPr>
-            <a:r>
-              <a:rPr lang="en-GB" dirty="0" smtClean="0">
-                <a:latin typeface="Lucida Sans" pitchFamily="34" charset="0"/>
-              </a:rPr>
-              <a:t>	- </a:t>
-            </a:r>
-            <a:r>
-              <a:rPr lang="en-GB" dirty="0" smtClean="0">
-                <a:latin typeface="Lucida Sans" pitchFamily="34" charset="0"/>
-              </a:rPr>
-              <a:t>c</a:t>
-            </a:r>
-            <a:r>
-              <a:rPr lang="en-GB" dirty="0" smtClean="0">
-                <a:latin typeface="Lucida Sans" pitchFamily="34" charset="0"/>
-              </a:rPr>
-              <a:t>omment </a:t>
-            </a:r>
-            <a:r>
-              <a:rPr lang="en-GB" dirty="0" smtClean="0">
-                <a:latin typeface="Lucida Sans" pitchFamily="34" charset="0"/>
-              </a:rPr>
-              <a:t>on existing </a:t>
-            </a:r>
-            <a:r>
-              <a:rPr lang="en-GB" dirty="0" smtClean="0">
-                <a:latin typeface="Lucida Sans" pitchFamily="34" charset="0"/>
-              </a:rPr>
-              <a:t>posts</a:t>
-            </a:r>
-            <a:endParaRPr lang="en-GB" dirty="0" smtClean="0">
-              <a:latin typeface="Lucida Sans" pitchFamily="34" charset="0"/>
-            </a:endParaRPr>
-          </a:p>
-          <a:p>
-            <a:pPr marL="0" indent="0">
-              <a:buNone/>
-            </a:pPr>
-            <a:r>
-              <a:rPr lang="en-GB" dirty="0" smtClean="0">
-                <a:latin typeface="Lucida Sans" pitchFamily="34" charset="0"/>
-              </a:rPr>
-              <a:t>	- </a:t>
-            </a:r>
-            <a:r>
-              <a:rPr lang="en-GB" dirty="0" smtClean="0">
-                <a:latin typeface="Lucida Sans" pitchFamily="34" charset="0"/>
-              </a:rPr>
-              <a:t>s</a:t>
-            </a:r>
-            <a:r>
-              <a:rPr lang="en-GB" dirty="0" smtClean="0">
-                <a:latin typeface="Lucida Sans" pitchFamily="34" charset="0"/>
-              </a:rPr>
-              <a:t>ubscribe </a:t>
-            </a:r>
-            <a:r>
-              <a:rPr lang="en-GB" dirty="0" smtClean="0">
-                <a:latin typeface="Lucida Sans" pitchFamily="34" charset="0"/>
-              </a:rPr>
-              <a:t>to tags </a:t>
-            </a:r>
-            <a:r>
-              <a:rPr lang="en-GB" dirty="0" smtClean="0">
-                <a:latin typeface="Lucida Sans" pitchFamily="34" charset="0"/>
-              </a:rPr>
-              <a:t>which puts them on their homepage.</a:t>
-            </a:r>
-            <a:endParaRPr lang="en-GB" dirty="0" smtClean="0">
-              <a:latin typeface="Lucida Sans" pitchFamily="34" charset="0"/>
-            </a:endParaRPr>
+              <a:t>	- subscribe to tags which puts them on their homepage.</a:t>
+            </a:r>
           </a:p>
           <a:p>
             <a:endParaRPr lang="en-GB" dirty="0" smtClean="0">
@@ -4399,22 +4277,21 @@
               </a:rPr>
               <a:t>Content is sorted as a function of views, likes, number of comments, and post time.</a:t>
             </a:r>
-            <a:endParaRPr lang="en-GB" dirty="0" smtClean="0">
-              <a:latin typeface="Lucida Sans" pitchFamily="34" charset="0"/>
-            </a:endParaRPr>
           </a:p>
           <a:p>
             <a:r>
               <a:rPr lang="en-GB" dirty="0" smtClean="0">
                 <a:latin typeface="Lucida Sans" pitchFamily="34" charset="0"/>
               </a:rPr>
-              <a:t>E</a:t>
-            </a:r>
+              <a:t>Easily navigated.</a:t>
+            </a:r>
+          </a:p>
+          <a:p>
             <a:r>
               <a:rPr lang="en-GB" dirty="0" smtClean="0">
                 <a:latin typeface="Lucida Sans" pitchFamily="34" charset="0"/>
               </a:rPr>
-              <a:t>asily navigated.</a:t>
+              <a:t>Site needs to respond quickly (as given).</a:t>
             </a:r>
           </a:p>
           <a:p>
@@ -4422,60 +4299,7 @@
               <a:rPr lang="en-GB" dirty="0" smtClean="0">
                 <a:latin typeface="Lucida Sans" pitchFamily="34" charset="0"/>
               </a:rPr>
-              <a:t>Site </a:t>
-            </a:r>
-            <a:r>
-              <a:rPr lang="en-GB" dirty="0" smtClean="0">
-                <a:latin typeface="Lucida Sans" pitchFamily="34" charset="0"/>
-              </a:rPr>
-              <a:t>needs to respond quickly (as given</a:t>
-            </a:r>
-            <a:r>
-              <a:rPr lang="en-GB" dirty="0" smtClean="0">
-                <a:latin typeface="Lucida Sans" pitchFamily="34" charset="0"/>
-              </a:rPr>
-              <a:t>).</a:t>
-            </a:r>
-            <a:endParaRPr lang="en-GB" dirty="0" smtClean="0">
-              <a:latin typeface="Lucida Sans" pitchFamily="34" charset="0"/>
-            </a:endParaRPr>
-          </a:p>
-          <a:p>
-            <a:r>
-              <a:rPr lang="en-GB" dirty="0" smtClean="0">
-                <a:latin typeface="Lucida Sans" pitchFamily="34" charset="0"/>
-              </a:rPr>
-              <a:t>T</a:t>
-            </a:r>
-            <a:r>
-              <a:rPr lang="en-GB" dirty="0" smtClean="0">
-                <a:latin typeface="Lucida Sans" pitchFamily="34" charset="0"/>
-              </a:rPr>
-              <a:t>utorial / </a:t>
-            </a:r>
-            <a:r>
-              <a:rPr lang="en-GB" dirty="0" smtClean="0">
-                <a:latin typeface="Lucida Sans" pitchFamily="34" charset="0"/>
-              </a:rPr>
-              <a:t>o</a:t>
-            </a:r>
-            <a:r>
-              <a:rPr lang="en-GB" dirty="0" smtClean="0">
-                <a:latin typeface="Lucida Sans" pitchFamily="34" charset="0"/>
-              </a:rPr>
-              <a:t>n hand </a:t>
-            </a:r>
-            <a:r>
-              <a:rPr lang="en-GB" dirty="0" smtClean="0">
-                <a:latin typeface="Lucida Sans" pitchFamily="34" charset="0"/>
-              </a:rPr>
-              <a:t>help at any time if users get </a:t>
-            </a:r>
-            <a:r>
-              <a:rPr lang="en-GB" dirty="0" smtClean="0">
-                <a:latin typeface="Lucida Sans" pitchFamily="34" charset="0"/>
-              </a:rPr>
-              <a:t>stuck</a:t>
+              <a:t>Tutorial / on hand help at any time if users get stuck</a:t>
             </a:r>
             <a:endParaRPr lang="en-GB" dirty="0">
               <a:latin typeface="Lucida Sans" pitchFamily="34" charset="0"/>
@@ -4512,7 +4336,7 @@
     </p:spTree>
     <p:extLst>
       <p:ext uri="{BB962C8B-B14F-4D97-AF65-F5344CB8AC3E}">
-        <p14:creationId xmlns:p14="http://schemas.microsoft.com/office/powerpoint/2010/main" xmlns="" val="832151694"/>
+        <p14:creationId xmlns="" xmlns:p14="http://schemas.microsoft.com/office/powerpoint/2010/main" val="832151694"/>
       </p:ext>
     </p:extLst>
   </p:cSld>
@@ -4629,7 +4453,7 @@
     </p:spTree>
     <p:extLst>
       <p:ext uri="{BB962C8B-B14F-4D97-AF65-F5344CB8AC3E}">
-        <p14:creationId xmlns:p14="http://schemas.microsoft.com/office/powerpoint/2010/main" xmlns="" val="3379387096"/>
+        <p14:creationId xmlns="" xmlns:p14="http://schemas.microsoft.com/office/powerpoint/2010/main" val="3379387096"/>
       </p:ext>
     </p:extLst>
   </p:cSld>
@@ -4673,6 +4497,406 @@
             <p:ph type="title"/>
           </p:nvPr>
         </p:nvSpPr>
+        <p:spPr/>
+        <p:txBody>
+          <a:bodyPr/>
+          <a:lstStyle/>
+          <a:p>
+            <a:r>
+              <a:rPr lang="en-GB" dirty="0" smtClean="0">
+                <a:latin typeface="Lucida Sans" pitchFamily="34" charset="0"/>
+              </a:rPr>
+              <a:t>User Needs Table TODO!</a:t>
+            </a:r>
+            <a:endParaRPr lang="en-GB" dirty="0">
+              <a:latin typeface="Lucida Sans" pitchFamily="34" charset="0"/>
+            </a:endParaRPr>
+          </a:p>
+        </p:txBody>
+      </p:sp>
+      <p:graphicFrame>
+        <p:nvGraphicFramePr>
+          <p:cNvPr id="4" name="Table 3"/>
+          <p:cNvGraphicFramePr>
+            <a:graphicFrameLocks noGrp="1"/>
+          </p:cNvGraphicFramePr>
+          <p:nvPr/>
+        </p:nvGraphicFramePr>
+        <p:xfrm>
+          <a:off x="467544" y="1412776"/>
+          <a:ext cx="8280920" cy="5184574"/>
+        </p:xfrm>
+        <a:graphic>
+          <a:graphicData uri="http://schemas.openxmlformats.org/drawingml/2006/table">
+            <a:tbl>
+              <a:tblPr firstRow="1" bandRow="1">
+                <a:tableStyleId>{5C22544A-7EE6-4342-B048-85BDC9FD1C3A}</a:tableStyleId>
+              </a:tblPr>
+              <a:tblGrid>
+                <a:gridCol w="2070230"/>
+                <a:gridCol w="2070230"/>
+                <a:gridCol w="2070230"/>
+                <a:gridCol w="2070230"/>
+              </a:tblGrid>
+              <a:tr h="494635">
+                <a:tc>
+                  <a:txBody>
+                    <a:bodyPr/>
+                    <a:lstStyle/>
+                    <a:p>
+                      <a:r>
+                        <a:rPr lang="en-GB" sz="1400" dirty="0" smtClean="0"/>
+                        <a:t>User</a:t>
+                      </a:r>
+                      <a:endParaRPr lang="en-GB" sz="1400" dirty="0"/>
+                    </a:p>
+                  </a:txBody>
+                  <a:tcPr/>
+                </a:tc>
+                <a:tc>
+                  <a:txBody>
+                    <a:bodyPr/>
+                    <a:lstStyle/>
+                    <a:p>
+                      <a:r>
+                        <a:rPr lang="en-GB" sz="1400" dirty="0" smtClean="0"/>
+                        <a:t>Need</a:t>
+                      </a:r>
+                      <a:endParaRPr lang="en-GB" sz="1400" dirty="0"/>
+                    </a:p>
+                  </a:txBody>
+                  <a:tcPr/>
+                </a:tc>
+                <a:tc>
+                  <a:txBody>
+                    <a:bodyPr/>
+                    <a:lstStyle/>
+                    <a:p>
+                      <a:r>
+                        <a:rPr lang="en-GB" sz="1400" dirty="0" smtClean="0"/>
+                        <a:t>Met?</a:t>
+                      </a:r>
+                      <a:endParaRPr lang="en-GB" sz="1400" dirty="0"/>
+                    </a:p>
+                  </a:txBody>
+                  <a:tcPr/>
+                </a:tc>
+                <a:tc>
+                  <a:txBody>
+                    <a:bodyPr/>
+                    <a:lstStyle/>
+                    <a:p>
+                      <a:r>
+                        <a:rPr lang="en-GB" sz="1400" dirty="0" smtClean="0"/>
+                        <a:t>Met</a:t>
+                      </a:r>
+                      <a:r>
+                        <a:rPr lang="en-GB" sz="1400" baseline="0" dirty="0" smtClean="0"/>
+                        <a:t> by</a:t>
+                      </a:r>
+                      <a:endParaRPr lang="en-GB" sz="1400" dirty="0"/>
+                    </a:p>
+                  </a:txBody>
+                  <a:tcPr/>
+                </a:tc>
+              </a:tr>
+              <a:tr h="1088736">
+                <a:tc>
+                  <a:txBody>
+                    <a:bodyPr/>
+                    <a:lstStyle/>
+                    <a:p>
+                      <a:r>
+                        <a:rPr lang="en-GB" sz="1400" dirty="0" smtClean="0"/>
+                        <a:t>Jim (beginner)</a:t>
+                      </a:r>
+                      <a:endParaRPr lang="en-GB" sz="1400" dirty="0"/>
+                    </a:p>
+                  </a:txBody>
+                  <a:tcPr/>
+                </a:tc>
+                <a:tc>
+                  <a:txBody>
+                    <a:bodyPr/>
+                    <a:lstStyle/>
+                    <a:p>
+                      <a:r>
+                        <a:rPr lang="en-GB" sz="1400" dirty="0" smtClean="0"/>
+                        <a:t>Search for posts about</a:t>
+                      </a:r>
+                      <a:r>
+                        <a:rPr lang="en-GB" sz="1400" baseline="0" dirty="0" smtClean="0"/>
+                        <a:t> certain topics, posts with about  A “and” B</a:t>
+                      </a:r>
+                      <a:endParaRPr lang="en-GB" sz="1400" dirty="0"/>
+                    </a:p>
+                  </a:txBody>
+                  <a:tcPr/>
+                </a:tc>
+                <a:tc>
+                  <a:txBody>
+                    <a:bodyPr/>
+                    <a:lstStyle/>
+                    <a:p>
+                      <a:endParaRPr lang="en-GB" sz="1400"/>
+                    </a:p>
+                  </a:txBody>
+                  <a:tcPr/>
+                </a:tc>
+                <a:tc>
+                  <a:txBody>
+                    <a:bodyPr/>
+                    <a:lstStyle/>
+                    <a:p>
+                      <a:endParaRPr lang="en-GB" sz="1400" dirty="0"/>
+                    </a:p>
+                  </a:txBody>
+                  <a:tcPr/>
+                </a:tc>
+              </a:tr>
+              <a:tr h="837489">
+                <a:tc>
+                  <a:txBody>
+                    <a:bodyPr/>
+                    <a:lstStyle/>
+                    <a:p>
+                      <a:endParaRPr lang="en-GB" sz="1400" dirty="0"/>
+                    </a:p>
+                  </a:txBody>
+                  <a:tcPr/>
+                </a:tc>
+                <a:tc>
+                  <a:txBody>
+                    <a:bodyPr/>
+                    <a:lstStyle/>
+                    <a:p>
+                      <a:r>
+                        <a:rPr lang="en-GB" sz="1400" dirty="0" smtClean="0"/>
+                        <a:t>Browse the site generally, view interesting content</a:t>
+                      </a:r>
+                      <a:endParaRPr lang="en-GB" sz="1400" dirty="0"/>
+                    </a:p>
+                  </a:txBody>
+                  <a:tcPr/>
+                </a:tc>
+                <a:tc>
+                  <a:txBody>
+                    <a:bodyPr/>
+                    <a:lstStyle/>
+                    <a:p>
+                      <a:endParaRPr lang="en-GB" sz="1400" dirty="0"/>
+                    </a:p>
+                  </a:txBody>
+                  <a:tcPr/>
+                </a:tc>
+                <a:tc>
+                  <a:txBody>
+                    <a:bodyPr/>
+                    <a:lstStyle/>
+                    <a:p>
+                      <a:endParaRPr lang="en-GB" sz="1400" dirty="0"/>
+                    </a:p>
+                  </a:txBody>
+                  <a:tcPr/>
+                </a:tc>
+              </a:tr>
+              <a:tr h="837489">
+                <a:tc>
+                  <a:txBody>
+                    <a:bodyPr/>
+                    <a:lstStyle/>
+                    <a:p>
+                      <a:r>
+                        <a:rPr lang="en-GB" sz="1400" dirty="0" smtClean="0"/>
+                        <a:t>Dave (pro user)</a:t>
+                      </a:r>
+                      <a:endParaRPr lang="en-GB" sz="1400" dirty="0"/>
+                    </a:p>
+                  </a:txBody>
+                  <a:tcPr/>
+                </a:tc>
+                <a:tc>
+                  <a:txBody>
+                    <a:bodyPr/>
+                    <a:lstStyle/>
+                    <a:p>
+                      <a:r>
+                        <a:rPr lang="en-GB" sz="1400" dirty="0" smtClean="0"/>
+                        <a:t>To view</a:t>
+                      </a:r>
+                      <a:r>
+                        <a:rPr lang="en-GB" sz="1400" baseline="0" dirty="0" smtClean="0"/>
+                        <a:t> unanswered posts about topics he knows about</a:t>
+                      </a:r>
+                      <a:endParaRPr lang="en-GB" sz="1400" dirty="0"/>
+                    </a:p>
+                  </a:txBody>
+                  <a:tcPr/>
+                </a:tc>
+                <a:tc>
+                  <a:txBody>
+                    <a:bodyPr/>
+                    <a:lstStyle/>
+                    <a:p>
+                      <a:endParaRPr lang="en-GB" sz="1400" dirty="0"/>
+                    </a:p>
+                  </a:txBody>
+                  <a:tcPr/>
+                </a:tc>
+                <a:tc>
+                  <a:txBody>
+                    <a:bodyPr/>
+                    <a:lstStyle/>
+                    <a:p>
+                      <a:endParaRPr lang="en-GB" sz="1400"/>
+                    </a:p>
+                  </a:txBody>
+                  <a:tcPr/>
+                </a:tc>
+              </a:tr>
+              <a:tr h="1088736">
+                <a:tc>
+                  <a:txBody>
+                    <a:bodyPr/>
+                    <a:lstStyle/>
+                    <a:p>
+                      <a:endParaRPr lang="en-GB" sz="1400" dirty="0"/>
+                    </a:p>
+                  </a:txBody>
+                  <a:tcPr/>
+                </a:tc>
+                <a:tc>
+                  <a:txBody>
+                    <a:bodyPr/>
+                    <a:lstStyle/>
+                    <a:p>
+                      <a:r>
+                        <a:rPr lang="en-GB" sz="1400" dirty="0" smtClean="0"/>
+                        <a:t>Discuss</a:t>
+                      </a:r>
+                      <a:r>
+                        <a:rPr lang="en-GB" sz="1400" baseline="0" dirty="0" smtClean="0"/>
+                        <a:t> / communicate with other pro-users at his level</a:t>
+                      </a:r>
+                      <a:endParaRPr lang="en-GB" sz="1400" dirty="0"/>
+                    </a:p>
+                  </a:txBody>
+                  <a:tcPr/>
+                </a:tc>
+                <a:tc>
+                  <a:txBody>
+                    <a:bodyPr/>
+                    <a:lstStyle/>
+                    <a:p>
+                      <a:endParaRPr lang="en-GB" sz="1400" dirty="0"/>
+                    </a:p>
+                  </a:txBody>
+                  <a:tcPr/>
+                </a:tc>
+                <a:tc>
+                  <a:txBody>
+                    <a:bodyPr/>
+                    <a:lstStyle/>
+                    <a:p>
+                      <a:endParaRPr lang="en-GB" sz="1400" dirty="0"/>
+                    </a:p>
+                  </a:txBody>
+                  <a:tcPr/>
+                </a:tc>
+              </a:tr>
+              <a:tr h="837489">
+                <a:tc>
+                  <a:txBody>
+                    <a:bodyPr/>
+                    <a:lstStyle/>
+                    <a:p>
+                      <a:r>
+                        <a:rPr lang="en-GB" sz="1400" dirty="0" err="1" smtClean="0"/>
+                        <a:t>Trollo</a:t>
+                      </a:r>
+                      <a:endParaRPr lang="en-GB" sz="1400" dirty="0"/>
+                    </a:p>
+                  </a:txBody>
+                  <a:tcPr/>
+                </a:tc>
+                <a:tc>
+                  <a:txBody>
+                    <a:bodyPr/>
+                    <a:lstStyle/>
+                    <a:p>
+                      <a:r>
+                        <a:rPr lang="en-GB" sz="1400" dirty="0" smtClean="0"/>
+                        <a:t>To leave, be bored and unsatisfied</a:t>
+                      </a:r>
+                      <a:r>
+                        <a:rPr lang="en-GB" sz="1400" baseline="0" dirty="0" smtClean="0"/>
+                        <a:t> with BARK!</a:t>
+                      </a:r>
+                      <a:endParaRPr lang="en-GB" sz="1400" dirty="0"/>
+                    </a:p>
+                  </a:txBody>
+                  <a:tcPr/>
+                </a:tc>
+                <a:tc>
+                  <a:txBody>
+                    <a:bodyPr/>
+                    <a:lstStyle/>
+                    <a:p>
+                      <a:endParaRPr lang="en-GB" sz="1400" dirty="0"/>
+                    </a:p>
+                  </a:txBody>
+                  <a:tcPr/>
+                </a:tc>
+                <a:tc>
+                  <a:txBody>
+                    <a:bodyPr/>
+                    <a:lstStyle/>
+                    <a:p>
+                      <a:endParaRPr lang="en-GB" sz="1400" dirty="0"/>
+                    </a:p>
+                  </a:txBody>
+                  <a:tcPr/>
+                </a:tc>
+              </a:tr>
+            </a:tbl>
+          </a:graphicData>
+        </a:graphic>
+      </p:graphicFrame>
+    </p:spTree>
+  </p:cSld>
+  <p:clrMapOvr>
+    <a:masterClrMapping/>
+  </p:clrMapOvr>
+</p:sld>
+</file>
+
+<file path=ppt/slides/slide6.xml><?xml version="1.0" encoding="utf-8"?>
+<p:sld xmlns:a="http://schemas.openxmlformats.org/drawingml/2006/main" xmlns:r="http://schemas.openxmlformats.org/officeDocument/2006/relationships" xmlns:p="http://schemas.openxmlformats.org/presentationml/2006/main">
+  <p:cSld>
+    <p:spTree>
+      <p:nvGrpSpPr>
+        <p:cNvPr id="1" name=""/>
+        <p:cNvGrpSpPr/>
+        <p:nvPr/>
+      </p:nvGrpSpPr>
+      <p:grpSpPr>
+        <a:xfrm>
+          <a:off x="0" y="0"/>
+          <a:ext cx="0" cy="0"/>
+          <a:chOff x="0" y="0"/>
+          <a:chExt cx="0" cy="0"/>
+        </a:xfrm>
+      </p:grpSpPr>
+      <p:sp>
+        <p:nvSpPr>
+          <p:cNvPr id="2" name="Title 1"/>
+          <p:cNvSpPr>
+            <a:spLocks noGrp="1"/>
+          </p:cNvSpPr>
+          <p:nvPr>
+            <p:ph type="title"/>
+          </p:nvPr>
+        </p:nvSpPr>
         <p:spPr>
           <a:xfrm>
             <a:off x="457200" y="44624"/>
@@ -4707,7 +4931,7 @@
           <a:blip r:embed="rId2" cstate="print">
             <a:extLst>
               <a:ext uri="{28A0092B-C50C-407E-A947-70E740481C1C}">
-                <a14:useLocalDpi xmlns:a14="http://schemas.microsoft.com/office/drawing/2010/main" xmlns="" val="0"/>
+                <a14:useLocalDpi xmlns="" xmlns:a14="http://schemas.microsoft.com/office/drawing/2010/main" val="0"/>
               </a:ext>
             </a:extLst>
           </a:blip>
@@ -4727,7 +4951,7 @@
           <a:noFill/>
           <a:extLst>
             <a:ext uri="{909E8E84-426E-40DD-AFC4-6F175D3DCCD1}">
-              <a14:hiddenFill xmlns:a14="http://schemas.microsoft.com/office/drawing/2010/main" xmlns="">
+              <a14:hiddenFill xmlns="" xmlns:a14="http://schemas.microsoft.com/office/drawing/2010/main">
                 <a:solidFill>
                   <a:srgbClr val="FFFFFF"/>
                 </a:solidFill>
@@ -4765,155 +4989,7 @@
     </p:spTree>
     <p:extLst>
       <p:ext uri="{BB962C8B-B14F-4D97-AF65-F5344CB8AC3E}">
-        <p14:creationId xmlns:p14="http://schemas.microsoft.com/office/powerpoint/2010/main" xmlns="" val="3144856911"/>
-      </p:ext>
-    </p:extLst>
-  </p:cSld>
-  <p:clrMapOvr>
-    <a:masterClrMapping/>
-  </p:clrMapOvr>
-  <p:timing>
-    <p:tnLst>
-      <p:par>
-        <p:cTn id="1" dur="indefinite" restart="never" nodeType="tmRoot"/>
-      </p:par>
-    </p:tnLst>
-  </p:timing>
-</p:sld>
-</file>
-
-<file path=ppt/slides/slide6.xml><?xml version="1.0" encoding="utf-8"?>
-<p:sld xmlns:a="http://schemas.openxmlformats.org/drawingml/2006/main" xmlns:r="http://schemas.openxmlformats.org/officeDocument/2006/relationships" xmlns:p="http://schemas.openxmlformats.org/presentationml/2006/main">
-  <p:cSld>
-    <p:spTree>
-      <p:nvGrpSpPr>
-        <p:cNvPr id="1" name=""/>
-        <p:cNvGrpSpPr/>
-        <p:nvPr/>
-      </p:nvGrpSpPr>
-      <p:grpSpPr>
-        <a:xfrm>
-          <a:off x="0" y="0"/>
-          <a:ext cx="0" cy="0"/>
-          <a:chOff x="0" y="0"/>
-          <a:chExt cx="0" cy="0"/>
-        </a:xfrm>
-      </p:grpSpPr>
-      <p:sp>
-        <p:nvSpPr>
-          <p:cNvPr id="2" name="Title 1"/>
-          <p:cNvSpPr>
-            <a:spLocks noGrp="1"/>
-          </p:cNvSpPr>
-          <p:nvPr>
-            <p:ph type="title"/>
-          </p:nvPr>
-        </p:nvSpPr>
-        <p:spPr>
-          <a:xfrm>
-            <a:off x="395536" y="53752"/>
-            <a:ext cx="8229600" cy="1143000"/>
-          </a:xfrm>
-        </p:spPr>
-        <p:txBody>
-          <a:bodyPr/>
-          <a:lstStyle/>
-          <a:p>
-            <a:r>
-              <a:rPr lang="en-GB" dirty="0" smtClean="0">
-                <a:latin typeface="Lucida Sans" pitchFamily="34" charset="0"/>
-              </a:rPr>
-              <a:t>n</a:t>
-            </a:r>
-            <a:r>
-              <a:rPr lang="en-GB" dirty="0" smtClean="0">
-                <a:latin typeface="Lucida Sans" pitchFamily="34" charset="0"/>
-              </a:rPr>
-              <a:t>-Tier </a:t>
-            </a:r>
-            <a:r>
-              <a:rPr lang="en-GB" dirty="0" smtClean="0">
-                <a:latin typeface="Lucida Sans" pitchFamily="34" charset="0"/>
-              </a:rPr>
-              <a:t>Diagram</a:t>
-            </a:r>
-            <a:endParaRPr lang="en-GB" dirty="0">
-              <a:latin typeface="Lucida Sans" pitchFamily="34" charset="0"/>
-            </a:endParaRPr>
-          </a:p>
-        </p:txBody>
-      </p:sp>
-      <p:pic>
-        <p:nvPicPr>
-          <p:cNvPr id="2050" name="Picture 2" descr="C:\Users\Ewan\Documents\GitHub\studeso\docs\diagrams\BarkNTier.png"/>
-          <p:cNvPicPr>
-            <a:picLocks noChangeAspect="1" noChangeArrowheads="1"/>
-          </p:cNvPicPr>
-          <p:nvPr/>
-        </p:nvPicPr>
-        <p:blipFill>
-          <a:blip r:embed="rId2" cstate="print">
-            <a:extLst>
-              <a:ext uri="{28A0092B-C50C-407E-A947-70E740481C1C}">
-                <a14:useLocalDpi xmlns:a14="http://schemas.microsoft.com/office/drawing/2010/main" xmlns="" val="0"/>
-              </a:ext>
-            </a:extLst>
-          </a:blip>
-          <a:srcRect/>
-          <a:stretch>
-            <a:fillRect/>
-          </a:stretch>
-        </p:blipFill>
-        <p:spPr bwMode="auto">
-          <a:xfrm>
-            <a:off x="395536" y="2708920"/>
-            <a:ext cx="8088313" cy="1206500"/>
-          </a:xfrm>
-          <a:prstGeom prst="rect">
-            <a:avLst/>
-          </a:prstGeom>
-          <a:noFill/>
-          <a:extLst>
-            <a:ext uri="{909E8E84-426E-40DD-AFC4-6F175D3DCCD1}">
-              <a14:hiddenFill xmlns:a14="http://schemas.microsoft.com/office/drawing/2010/main" xmlns="">
-                <a:solidFill>
-                  <a:srgbClr val="FFFFFF"/>
-                </a:solidFill>
-              </a14:hiddenFill>
-            </a:ext>
-          </a:extLst>
-        </p:spPr>
-      </p:pic>
-      <p:pic>
-        <p:nvPicPr>
-          <p:cNvPr id="5" name="Picture 2" descr="H:\studeso\styling\images\akita.png"/>
-          <p:cNvPicPr>
-            <a:picLocks noChangeAspect="1" noChangeArrowheads="1"/>
-          </p:cNvPicPr>
-          <p:nvPr/>
-        </p:nvPicPr>
-        <p:blipFill>
-          <a:blip r:embed="rId3" cstate="print"/>
-          <a:srcRect/>
-          <a:stretch>
-            <a:fillRect/>
-          </a:stretch>
-        </p:blipFill>
-        <p:spPr bwMode="auto">
-          <a:xfrm flipH="1">
-            <a:off x="7559824" y="0"/>
-            <a:ext cx="1584176" cy="1475656"/>
-          </a:xfrm>
-          <a:prstGeom prst="rect">
-            <a:avLst/>
-          </a:prstGeom>
-          <a:noFill/>
-        </p:spPr>
-      </p:pic>
-    </p:spTree>
-    <p:extLst>
-      <p:ext uri="{BB962C8B-B14F-4D97-AF65-F5344CB8AC3E}">
-        <p14:creationId xmlns:p14="http://schemas.microsoft.com/office/powerpoint/2010/main" xmlns="" val="1312360545"/>
+        <p14:creationId xmlns="" xmlns:p14="http://schemas.microsoft.com/office/powerpoint/2010/main" val="3144856911"/>
       </p:ext>
     </p:extLst>
   </p:cSld>
@@ -4957,6 +5033,142 @@
             <p:ph type="title"/>
           </p:nvPr>
         </p:nvSpPr>
+        <p:spPr>
+          <a:xfrm>
+            <a:off x="395536" y="53752"/>
+            <a:ext cx="8229600" cy="1143000"/>
+          </a:xfrm>
+        </p:spPr>
+        <p:txBody>
+          <a:bodyPr/>
+          <a:lstStyle/>
+          <a:p>
+            <a:r>
+              <a:rPr lang="en-GB" dirty="0" smtClean="0">
+                <a:latin typeface="Lucida Sans" pitchFamily="34" charset="0"/>
+              </a:rPr>
+              <a:t>n-Tier Diagram</a:t>
+            </a:r>
+            <a:endParaRPr lang="en-GB" dirty="0">
+              <a:latin typeface="Lucida Sans" pitchFamily="34" charset="0"/>
+            </a:endParaRPr>
+          </a:p>
+        </p:txBody>
+      </p:sp>
+      <p:pic>
+        <p:nvPicPr>
+          <p:cNvPr id="2050" name="Picture 2" descr="C:\Users\Ewan\Documents\GitHub\studeso\docs\diagrams\BarkNTier.png"/>
+          <p:cNvPicPr>
+            <a:picLocks noChangeAspect="1" noChangeArrowheads="1"/>
+          </p:cNvPicPr>
+          <p:nvPr/>
+        </p:nvPicPr>
+        <p:blipFill>
+          <a:blip r:embed="rId2" cstate="print">
+            <a:extLst>
+              <a:ext uri="{28A0092B-C50C-407E-A947-70E740481C1C}">
+                <a14:useLocalDpi xmlns="" xmlns:a14="http://schemas.microsoft.com/office/drawing/2010/main" val="0"/>
+              </a:ext>
+            </a:extLst>
+          </a:blip>
+          <a:srcRect/>
+          <a:stretch>
+            <a:fillRect/>
+          </a:stretch>
+        </p:blipFill>
+        <p:spPr bwMode="auto">
+          <a:xfrm>
+            <a:off x="395536" y="2708920"/>
+            <a:ext cx="8088313" cy="1206500"/>
+          </a:xfrm>
+          <a:prstGeom prst="rect">
+            <a:avLst/>
+          </a:prstGeom>
+          <a:noFill/>
+          <a:extLst>
+            <a:ext uri="{909E8E84-426E-40DD-AFC4-6F175D3DCCD1}">
+              <a14:hiddenFill xmlns="" xmlns:a14="http://schemas.microsoft.com/office/drawing/2010/main">
+                <a:solidFill>
+                  <a:srgbClr val="FFFFFF"/>
+                </a:solidFill>
+              </a14:hiddenFill>
+            </a:ext>
+          </a:extLst>
+        </p:spPr>
+      </p:pic>
+      <p:pic>
+        <p:nvPicPr>
+          <p:cNvPr id="5" name="Picture 2" descr="H:\studeso\styling\images\akita.png"/>
+          <p:cNvPicPr>
+            <a:picLocks noChangeAspect="1" noChangeArrowheads="1"/>
+          </p:cNvPicPr>
+          <p:nvPr/>
+        </p:nvPicPr>
+        <p:blipFill>
+          <a:blip r:embed="rId3" cstate="print"/>
+          <a:srcRect/>
+          <a:stretch>
+            <a:fillRect/>
+          </a:stretch>
+        </p:blipFill>
+        <p:spPr bwMode="auto">
+          <a:xfrm flipH="1">
+            <a:off x="7559824" y="0"/>
+            <a:ext cx="1584176" cy="1475656"/>
+          </a:xfrm>
+          <a:prstGeom prst="rect">
+            <a:avLst/>
+          </a:prstGeom>
+          <a:noFill/>
+        </p:spPr>
+      </p:pic>
+    </p:spTree>
+    <p:extLst>
+      <p:ext uri="{BB962C8B-B14F-4D97-AF65-F5344CB8AC3E}">
+        <p14:creationId xmlns="" xmlns:p14="http://schemas.microsoft.com/office/powerpoint/2010/main" val="1312360545"/>
+      </p:ext>
+    </p:extLst>
+  </p:cSld>
+  <p:clrMapOvr>
+    <a:masterClrMapping/>
+  </p:clrMapOvr>
+  <p:timing>
+    <p:tnLst>
+      <p:par>
+        <p:cTn id="1" dur="indefinite" restart="never" nodeType="tmRoot"/>
+      </p:par>
+    </p:tnLst>
+  </p:timing>
+</p:sld>
+</file>
+
+<file path=ppt/slides/slide8.xml><?xml version="1.0" encoding="utf-8"?>
+<p:sld xmlns:a="http://schemas.openxmlformats.org/drawingml/2006/main" xmlns:r="http://schemas.openxmlformats.org/officeDocument/2006/relationships" xmlns:p="http://schemas.openxmlformats.org/presentationml/2006/main">
+  <p:cSld>
+    <p:spTree>
+      <p:nvGrpSpPr>
+        <p:cNvPr id="1" name=""/>
+        <p:cNvGrpSpPr/>
+        <p:nvPr/>
+      </p:nvGrpSpPr>
+      <p:grpSpPr>
+        <a:xfrm>
+          <a:off x="0" y="0"/>
+          <a:ext cx="0" cy="0"/>
+          <a:chOff x="0" y="0"/>
+          <a:chExt cx="0" cy="0"/>
+        </a:xfrm>
+      </p:grpSpPr>
+      <p:sp>
+        <p:nvSpPr>
+          <p:cNvPr id="2" name="Title 1"/>
+          <p:cNvSpPr>
+            <a:spLocks noGrp="1"/>
+          </p:cNvSpPr>
+          <p:nvPr>
+            <p:ph type="title"/>
+          </p:nvPr>
+        </p:nvSpPr>
         <p:spPr/>
         <p:txBody>
           <a:bodyPr/>
@@ -5027,7 +5239,7 @@
     </p:spTree>
     <p:extLst>
       <p:ext uri="{BB962C8B-B14F-4D97-AF65-F5344CB8AC3E}">
-        <p14:creationId xmlns:p14="http://schemas.microsoft.com/office/powerpoint/2010/main" xmlns="" val="2608953531"/>
+        <p14:creationId xmlns="" xmlns:p14="http://schemas.microsoft.com/office/powerpoint/2010/main" val="2608953531"/>
       </p:ext>
     </p:extLst>
   </p:cSld>

</xml_diff>

<commit_message>
Prepared powerpoint for the meeting
Small tweaks to save us time
</commit_message>
<xml_diff>
--- a/docs/presentation.pptx
+++ b/docs/presentation.pptx
@@ -9,10 +9,12 @@
     <p:sldId id="257" r:id="rId3"/>
     <p:sldId id="262" r:id="rId4"/>
     <p:sldId id="258" r:id="rId5"/>
-    <p:sldId id="263" r:id="rId6"/>
-    <p:sldId id="259" r:id="rId7"/>
-    <p:sldId id="260" r:id="rId8"/>
-    <p:sldId id="261" r:id="rId9"/>
+    <p:sldId id="264" r:id="rId6"/>
+    <p:sldId id="265" r:id="rId7"/>
+    <p:sldId id="263" r:id="rId8"/>
+    <p:sldId id="259" r:id="rId9"/>
+    <p:sldId id="260" r:id="rId10"/>
+    <p:sldId id="261" r:id="rId11"/>
   </p:sldIdLst>
   <p:sldSz cx="9144000" cy="6858000" type="screen4x3"/>
   <p:notesSz cx="6858000" cy="9144000"/>
@@ -113,7 +115,7 @@
   </p:defaultTextStyle>
   <p:extLst>
     <p:ext uri="{EFAFB233-063F-42B5-8137-9DF3F51BA10A}">
-      <p15:sldGuideLst xmlns="" xmlns:p15="http://schemas.microsoft.com/office/powerpoint/2012/main">
+      <p15:sldGuideLst xmlns:p15="http://schemas.microsoft.com/office/powerpoint/2012/main">
         <p15:guide id="1" orient="horz" pos="2160">
           <p15:clr>
             <a:srgbClr val="A4A3A4"/>
@@ -293,7 +295,7 @@
             <a:fld id="{3FEB6C20-88C7-4B3D-B23C-A0B2BF770696}" type="datetimeFigureOut">
               <a:rPr lang="en-GB" smtClean="0"/>
               <a:pPr/>
-              <a:t>13/02/2015</a:t>
+              <a:t>18/02/2015</a:t>
             </a:fld>
             <a:endParaRPr lang="en-GB"/>
           </a:p>
@@ -654,7 +656,7 @@
             <a:fld id="{3FEB6C20-88C7-4B3D-B23C-A0B2BF770696}" type="datetimeFigureOut">
               <a:rPr lang="en-GB" smtClean="0"/>
               <a:pPr/>
-              <a:t>13/02/2015</a:t>
+              <a:t>18/02/2015</a:t>
             </a:fld>
             <a:endParaRPr lang="en-GB"/>
           </a:p>
@@ -831,7 +833,7 @@
             <a:fld id="{3FEB6C20-88C7-4B3D-B23C-A0B2BF770696}" type="datetimeFigureOut">
               <a:rPr lang="en-GB" smtClean="0"/>
               <a:pPr/>
-              <a:t>13/02/2015</a:t>
+              <a:t>18/02/2015</a:t>
             </a:fld>
             <a:endParaRPr lang="en-GB"/>
           </a:p>
@@ -1068,7 +1070,7 @@
             <a:fld id="{3FEB6C20-88C7-4B3D-B23C-A0B2BF770696}" type="datetimeFigureOut">
               <a:rPr lang="en-GB" smtClean="0"/>
               <a:pPr/>
-              <a:t>13/02/2015</a:t>
+              <a:t>18/02/2015</a:t>
             </a:fld>
             <a:endParaRPr lang="en-GB"/>
           </a:p>
@@ -1339,7 +1341,7 @@
             <a:fld id="{3FEB6C20-88C7-4B3D-B23C-A0B2BF770696}" type="datetimeFigureOut">
               <a:rPr lang="en-GB" smtClean="0"/>
               <a:pPr/>
-              <a:t>13/02/2015</a:t>
+              <a:t>18/02/2015</a:t>
             </a:fld>
             <a:endParaRPr lang="en-GB"/>
           </a:p>
@@ -1561,7 +1563,7 @@
             <a:fld id="{3FEB6C20-88C7-4B3D-B23C-A0B2BF770696}" type="datetimeFigureOut">
               <a:rPr lang="en-GB" smtClean="0"/>
               <a:pPr/>
-              <a:t>13/02/2015</a:t>
+              <a:t>18/02/2015</a:t>
             </a:fld>
             <a:endParaRPr lang="en-GB"/>
           </a:p>
@@ -1915,7 +1917,7 @@
             <a:fld id="{3FEB6C20-88C7-4B3D-B23C-A0B2BF770696}" type="datetimeFigureOut">
               <a:rPr lang="en-GB" smtClean="0"/>
               <a:pPr/>
-              <a:t>13/02/2015</a:t>
+              <a:t>18/02/2015</a:t>
             </a:fld>
             <a:endParaRPr lang="en-GB"/>
           </a:p>
@@ -2149,7 +2151,7 @@
             <a:fld id="{3FEB6C20-88C7-4B3D-B23C-A0B2BF770696}" type="datetimeFigureOut">
               <a:rPr lang="en-GB" smtClean="0"/>
               <a:pPr/>
-              <a:t>13/02/2015</a:t>
+              <a:t>18/02/2015</a:t>
             </a:fld>
             <a:endParaRPr lang="en-GB"/>
           </a:p>
@@ -2291,7 +2293,7 @@
             <a:fld id="{3FEB6C20-88C7-4B3D-B23C-A0B2BF770696}" type="datetimeFigureOut">
               <a:rPr lang="en-GB" smtClean="0"/>
               <a:pPr/>
-              <a:t>13/02/2015</a:t>
+              <a:t>18/02/2015</a:t>
             </a:fld>
             <a:endParaRPr lang="en-GB"/>
           </a:p>
@@ -2570,7 +2572,7 @@
             <a:fld id="{3FEB6C20-88C7-4B3D-B23C-A0B2BF770696}" type="datetimeFigureOut">
               <a:rPr lang="en-GB" smtClean="0"/>
               <a:pPr/>
-              <a:t>13/02/2015</a:t>
+              <a:t>18/02/2015</a:t>
             </a:fld>
             <a:endParaRPr lang="en-GB"/>
           </a:p>
@@ -2979,7 +2981,7 @@
             <a:fld id="{3FEB6C20-88C7-4B3D-B23C-A0B2BF770696}" type="datetimeFigureOut">
               <a:rPr lang="en-GB" smtClean="0"/>
               <a:pPr/>
-              <a:t>13/02/2015</a:t>
+              <a:t>18/02/2015</a:t>
             </a:fld>
             <a:endParaRPr lang="en-GB"/>
           </a:p>
@@ -3319,7 +3321,7 @@
             <a:fld id="{3FEB6C20-88C7-4B3D-B23C-A0B2BF770696}" type="datetimeFigureOut">
               <a:rPr lang="en-GB" smtClean="0"/>
               <a:pPr/>
-              <a:t>13/02/2015</a:t>
+              <a:t>18/02/2015</a:t>
             </a:fld>
             <a:endParaRPr lang="en-GB"/>
           </a:p>
@@ -3863,7 +3865,9 @@
         </p:nvSpPr>
         <p:spPr/>
         <p:txBody>
-          <a:bodyPr/>
+          <a:bodyPr>
+            <a:normAutofit/>
+          </a:bodyPr>
           <a:lstStyle/>
           <a:p>
             <a:r>
@@ -3872,33 +3876,48 @@
               </a:rPr>
               <a:t>BARK!</a:t>
             </a:r>
-            <a:endParaRPr lang="en-GB" dirty="0">
-              <a:latin typeface="Lucida Sans" pitchFamily="34" charset="0"/>
-            </a:endParaRPr>
-          </a:p>
-        </p:txBody>
-      </p:sp>
-      <p:sp>
-        <p:nvSpPr>
-          <p:cNvPr id="3" name="Subtitle 2"/>
-          <p:cNvSpPr>
-            <a:spLocks noGrp="1"/>
-          </p:cNvSpPr>
-          <p:nvPr>
-            <p:ph type="subTitle" idx="1"/>
-          </p:nvPr>
-        </p:nvSpPr>
-        <p:spPr/>
-        <p:txBody>
-          <a:bodyPr/>
-          <a:lstStyle/>
-          <a:p>
-            <a:r>
+            <a:br>
               <a:rPr lang="en-GB" dirty="0" smtClean="0">
                 <a:latin typeface="Lucida Sans" pitchFamily="34" charset="0"/>
               </a:rPr>
-              <a:t>Preliminary Design</a:t>
-            </a:r>
+            </a:br>
+            <a:r>
+              <a:rPr lang="en-GB" sz="2000" dirty="0" smtClean="0">
+                <a:latin typeface="Lucida Sans" pitchFamily="34" charset="0"/>
+              </a:rPr>
+              <a:t>Created by N-Tier The Matrix</a:t>
+            </a:r>
+            <a:endParaRPr lang="en-GB" sz="2000" dirty="0">
+              <a:latin typeface="Lucida Sans" pitchFamily="34" charset="0"/>
+            </a:endParaRPr>
+          </a:p>
+        </p:txBody>
+      </p:sp>
+      <p:sp>
+        <p:nvSpPr>
+          <p:cNvPr id="3" name="Subtitle 2"/>
+          <p:cNvSpPr>
+            <a:spLocks noGrp="1"/>
+          </p:cNvSpPr>
+          <p:nvPr>
+            <p:ph type="subTitle" idx="1"/>
+          </p:nvPr>
+        </p:nvSpPr>
+        <p:spPr/>
+        <p:txBody>
+          <a:bodyPr>
+            <a:normAutofit/>
+          </a:bodyPr>
+          <a:lstStyle/>
+          <a:p>
+            <a:r>
+              <a:rPr lang="en-GB" sz="1600" dirty="0" smtClean="0">
+                <a:latin typeface="Lucida Sans" pitchFamily="34" charset="0"/>
+              </a:rPr>
+              <a:t>Paul Cowie, Lewis Dicks, Michael McKay, Ewan McCartney</a:t>
+            </a:r>
+          </a:p>
+          <a:p>
             <a:endParaRPr lang="en-GB" dirty="0">
               <a:latin typeface="Lucida Sans" pitchFamily="34" charset="0"/>
             </a:endParaRPr>
@@ -3934,7 +3953,121 @@
     </p:spTree>
     <p:extLst>
       <p:ext uri="{BB962C8B-B14F-4D97-AF65-F5344CB8AC3E}">
-        <p14:creationId xmlns="" xmlns:p14="http://schemas.microsoft.com/office/powerpoint/2010/main" val="2689682241"/>
+        <p14:creationId xmlns:p14="http://schemas.microsoft.com/office/powerpoint/2010/main" val="2689682241"/>
+      </p:ext>
+    </p:extLst>
+  </p:cSld>
+  <p:clrMapOvr>
+    <a:masterClrMapping/>
+  </p:clrMapOvr>
+  <p:timing>
+    <p:tnLst>
+      <p:par>
+        <p:cTn id="1" dur="indefinite" restart="never" nodeType="tmRoot"/>
+      </p:par>
+    </p:tnLst>
+  </p:timing>
+</p:sld>
+</file>
+
+<file path=ppt/slides/slide10.xml><?xml version="1.0" encoding="utf-8"?>
+<p:sld xmlns:a="http://schemas.openxmlformats.org/drawingml/2006/main" xmlns:r="http://schemas.openxmlformats.org/officeDocument/2006/relationships" xmlns:p="http://schemas.openxmlformats.org/presentationml/2006/main">
+  <p:cSld>
+    <p:spTree>
+      <p:nvGrpSpPr>
+        <p:cNvPr id="1" name=""/>
+        <p:cNvGrpSpPr/>
+        <p:nvPr/>
+      </p:nvGrpSpPr>
+      <p:grpSpPr>
+        <a:xfrm>
+          <a:off x="0" y="0"/>
+          <a:ext cx="0" cy="0"/>
+          <a:chOff x="0" y="0"/>
+          <a:chExt cx="0" cy="0"/>
+        </a:xfrm>
+      </p:grpSpPr>
+      <p:sp>
+        <p:nvSpPr>
+          <p:cNvPr id="2" name="Title 1"/>
+          <p:cNvSpPr>
+            <a:spLocks noGrp="1"/>
+          </p:cNvSpPr>
+          <p:nvPr>
+            <p:ph type="title"/>
+          </p:nvPr>
+        </p:nvSpPr>
+        <p:spPr/>
+        <p:txBody>
+          <a:bodyPr/>
+          <a:lstStyle/>
+          <a:p>
+            <a:r>
+              <a:rPr lang="en-GB" dirty="0" smtClean="0">
+                <a:latin typeface="Lucida Sans" pitchFamily="34" charset="0"/>
+              </a:rPr>
+              <a:t>Wireframes</a:t>
+            </a:r>
+            <a:endParaRPr lang="en-GB" dirty="0">
+              <a:latin typeface="Lucida Sans" pitchFamily="34" charset="0"/>
+            </a:endParaRPr>
+          </a:p>
+        </p:txBody>
+      </p:sp>
+      <p:sp>
+        <p:nvSpPr>
+          <p:cNvPr id="3" name="Content Placeholder 2"/>
+          <p:cNvSpPr>
+            <a:spLocks noGrp="1"/>
+          </p:cNvSpPr>
+          <p:nvPr>
+            <p:ph sz="quarter" idx="1"/>
+          </p:nvPr>
+        </p:nvSpPr>
+        <p:spPr/>
+        <p:txBody>
+          <a:bodyPr/>
+          <a:lstStyle/>
+          <a:p>
+            <a:r>
+              <a:rPr lang="en-GB" dirty="0" smtClean="0">
+                <a:latin typeface="Lucida Sans" pitchFamily="34" charset="0"/>
+              </a:rPr>
+              <a:t>Paste this shit in, bitch</a:t>
+            </a:r>
+          </a:p>
+        </p:txBody>
+      </p:sp>
+      <p:pic>
+        <p:nvPicPr>
+          <p:cNvPr id="5" name="Picture 2" descr="H:\studeso\styling\images\akita.png"/>
+          <p:cNvPicPr>
+            <a:picLocks noChangeAspect="1" noChangeArrowheads="1"/>
+          </p:cNvPicPr>
+          <p:nvPr/>
+        </p:nvPicPr>
+        <p:blipFill>
+          <a:blip r:embed="rId2" cstate="print"/>
+          <a:srcRect/>
+          <a:stretch>
+            <a:fillRect/>
+          </a:stretch>
+        </p:blipFill>
+        <p:spPr bwMode="auto">
+          <a:xfrm flipH="1">
+            <a:off x="7559824" y="0"/>
+            <a:ext cx="1584176" cy="1475656"/>
+          </a:xfrm>
+          <a:prstGeom prst="rect">
+            <a:avLst/>
+          </a:prstGeom>
+          <a:noFill/>
+        </p:spPr>
+      </p:pic>
+    </p:spTree>
+    <p:extLst>
+      <p:ext uri="{BB962C8B-B14F-4D97-AF65-F5344CB8AC3E}">
+        <p14:creationId xmlns:p14="http://schemas.microsoft.com/office/powerpoint/2010/main" val="2608953531"/>
       </p:ext>
     </p:extLst>
   </p:cSld>
@@ -4118,7 +4251,7 @@
     </p:spTree>
     <p:extLst>
       <p:ext uri="{BB962C8B-B14F-4D97-AF65-F5344CB8AC3E}">
-        <p14:creationId xmlns="" xmlns:p14="http://schemas.microsoft.com/office/powerpoint/2010/main" val="1822052854"/>
+        <p14:creationId xmlns:p14="http://schemas.microsoft.com/office/powerpoint/2010/main" val="1822052854"/>
       </p:ext>
     </p:extLst>
   </p:cSld>
@@ -4262,7 +4395,19 @@
               <a:rPr lang="en-GB" dirty="0" smtClean="0">
                 <a:latin typeface="Lucida Sans" pitchFamily="34" charset="0"/>
               </a:rPr>
-              <a:t>	- subscribe to tags which puts them on their homepage.</a:t>
+              <a:t>	- subscribe to tags which puts them on their </a:t>
+            </a:r>
+            <a:r>
+              <a:rPr lang="en-GB" dirty="0" smtClean="0">
+                <a:latin typeface="Lucida Sans" pitchFamily="34" charset="0"/>
+              </a:rPr>
+              <a:t>		  homepage</a:t>
+            </a:r>
+            <a:r>
+              <a:rPr lang="en-GB" dirty="0" smtClean="0">
+                <a:latin typeface="Lucida Sans" pitchFamily="34" charset="0"/>
+              </a:rPr>
+              <a:t>.</a:t>
             </a:r>
           </a:p>
           <a:p>
@@ -4336,7 +4481,7 @@
     </p:spTree>
     <p:extLst>
       <p:ext uri="{BB962C8B-B14F-4D97-AF65-F5344CB8AC3E}">
-        <p14:creationId xmlns="" xmlns:p14="http://schemas.microsoft.com/office/powerpoint/2010/main" val="832151694"/>
+        <p14:creationId xmlns:p14="http://schemas.microsoft.com/office/powerpoint/2010/main" val="832151694"/>
       </p:ext>
     </p:extLst>
   </p:cSld>
@@ -4416,7 +4561,7 @@
               <a:rPr lang="en-GB" dirty="0" smtClean="0">
                 <a:latin typeface="Lucida Sans" pitchFamily="34" charset="0"/>
               </a:rPr>
-              <a:t>&lt;Copy / Paste &gt;</a:t>
+              <a:t>Jim goes here</a:t>
             </a:r>
             <a:endParaRPr lang="en-GB" dirty="0">
               <a:latin typeface="Lucida Sans" pitchFamily="34" charset="0"/>
@@ -4450,10 +4595,40 @@
           <a:noFill/>
         </p:spPr>
       </p:pic>
+      <p:pic>
+        <p:nvPicPr>
+          <p:cNvPr id="4" name="Picture 3"/>
+          <p:cNvPicPr>
+            <a:picLocks noChangeAspect="1"/>
+          </p:cNvPicPr>
+          <p:nvPr/>
+        </p:nvPicPr>
+        <p:blipFill>
+          <a:blip r:embed="rId3" cstate="print">
+            <a:extLst>
+              <a:ext uri="{28A0092B-C50C-407E-A947-70E740481C1C}">
+                <a14:useLocalDpi xmlns:a14="http://schemas.microsoft.com/office/drawing/2010/main" val="0"/>
+              </a:ext>
+            </a:extLst>
+          </a:blip>
+          <a:stretch>
+            <a:fillRect/>
+          </a:stretch>
+        </p:blipFill>
+        <p:spPr>
+          <a:xfrm>
+            <a:off x="5257800" y="1295400"/>
+            <a:ext cx="3657600" cy="2438400"/>
+          </a:xfrm>
+          <a:prstGeom prst="rect">
+            <a:avLst/>
+          </a:prstGeom>
+        </p:spPr>
+      </p:pic>
     </p:spTree>
     <p:extLst>
       <p:ext uri="{BB962C8B-B14F-4D97-AF65-F5344CB8AC3E}">
-        <p14:creationId xmlns="" xmlns:p14="http://schemas.microsoft.com/office/powerpoint/2010/main" val="3379387096"/>
+        <p14:creationId xmlns:p14="http://schemas.microsoft.com/office/powerpoint/2010/main" val="3379387096"/>
       </p:ext>
     </p:extLst>
   </p:cSld>
@@ -4506,6 +4681,306 @@
               <a:rPr lang="en-GB" dirty="0" smtClean="0">
                 <a:latin typeface="Lucida Sans" pitchFamily="34" charset="0"/>
               </a:rPr>
+              <a:t>User Personas</a:t>
+            </a:r>
+            <a:endParaRPr lang="en-GB" dirty="0">
+              <a:latin typeface="Lucida Sans" pitchFamily="34" charset="0"/>
+            </a:endParaRPr>
+          </a:p>
+        </p:txBody>
+      </p:sp>
+      <p:sp>
+        <p:nvSpPr>
+          <p:cNvPr id="3" name="Content Placeholder 2"/>
+          <p:cNvSpPr>
+            <a:spLocks noGrp="1"/>
+          </p:cNvSpPr>
+          <p:nvPr>
+            <p:ph sz="quarter" idx="1"/>
+          </p:nvPr>
+        </p:nvSpPr>
+        <p:spPr/>
+        <p:txBody>
+          <a:bodyPr/>
+          <a:lstStyle/>
+          <a:p>
+            <a:r>
+              <a:rPr lang="en-GB" dirty="0" smtClean="0">
+                <a:latin typeface="Lucida Sans" pitchFamily="34" charset="0"/>
+              </a:rPr>
+              <a:t>Dave goes here</a:t>
+            </a:r>
+            <a:endParaRPr lang="en-GB" dirty="0">
+              <a:latin typeface="Lucida Sans" pitchFamily="34" charset="0"/>
+            </a:endParaRPr>
+          </a:p>
+        </p:txBody>
+      </p:sp>
+      <p:pic>
+        <p:nvPicPr>
+          <p:cNvPr id="5" name="Picture 2" descr="H:\studeso\styling\images\akita.png"/>
+          <p:cNvPicPr>
+            <a:picLocks noChangeAspect="1" noChangeArrowheads="1"/>
+          </p:cNvPicPr>
+          <p:nvPr/>
+        </p:nvPicPr>
+        <p:blipFill>
+          <a:blip r:embed="rId2" cstate="print"/>
+          <a:srcRect/>
+          <a:stretch>
+            <a:fillRect/>
+          </a:stretch>
+        </p:blipFill>
+        <p:spPr bwMode="auto">
+          <a:xfrm flipH="1">
+            <a:off x="7559824" y="0"/>
+            <a:ext cx="1584176" cy="1475656"/>
+          </a:xfrm>
+          <a:prstGeom prst="rect">
+            <a:avLst/>
+          </a:prstGeom>
+          <a:noFill/>
+        </p:spPr>
+      </p:pic>
+      <p:pic>
+        <p:nvPicPr>
+          <p:cNvPr id="4" name="Picture 3"/>
+          <p:cNvPicPr>
+            <a:picLocks noChangeAspect="1"/>
+          </p:cNvPicPr>
+          <p:nvPr/>
+        </p:nvPicPr>
+        <p:blipFill>
+          <a:blip r:embed="rId3">
+            <a:extLst>
+              <a:ext uri="{28A0092B-C50C-407E-A947-70E740481C1C}">
+                <a14:useLocalDpi xmlns:a14="http://schemas.microsoft.com/office/drawing/2010/main" val="0"/>
+              </a:ext>
+            </a:extLst>
+          </a:blip>
+          <a:stretch>
+            <a:fillRect/>
+          </a:stretch>
+        </p:blipFill>
+        <p:spPr>
+          <a:xfrm>
+            <a:off x="4979242" y="1228203"/>
+            <a:ext cx="3936158" cy="2953693"/>
+          </a:xfrm>
+          <a:prstGeom prst="rect">
+            <a:avLst/>
+          </a:prstGeom>
+        </p:spPr>
+      </p:pic>
+    </p:spTree>
+    <p:extLst>
+      <p:ext uri="{BB962C8B-B14F-4D97-AF65-F5344CB8AC3E}">
+        <p14:creationId xmlns:p14="http://schemas.microsoft.com/office/powerpoint/2010/main" val="3285001572"/>
+      </p:ext>
+    </p:extLst>
+  </p:cSld>
+  <p:clrMapOvr>
+    <a:masterClrMapping/>
+  </p:clrMapOvr>
+  <p:timing>
+    <p:tnLst>
+      <p:par>
+        <p:cTn id="1" dur="indefinite" restart="never" nodeType="tmRoot"/>
+      </p:par>
+    </p:tnLst>
+  </p:timing>
+</p:sld>
+</file>
+
+<file path=ppt/slides/slide6.xml><?xml version="1.0" encoding="utf-8"?>
+<p:sld xmlns:a="http://schemas.openxmlformats.org/drawingml/2006/main" xmlns:r="http://schemas.openxmlformats.org/officeDocument/2006/relationships" xmlns:p="http://schemas.openxmlformats.org/presentationml/2006/main">
+  <p:cSld>
+    <p:spTree>
+      <p:nvGrpSpPr>
+        <p:cNvPr id="1" name=""/>
+        <p:cNvGrpSpPr/>
+        <p:nvPr/>
+      </p:nvGrpSpPr>
+      <p:grpSpPr>
+        <a:xfrm>
+          <a:off x="0" y="0"/>
+          <a:ext cx="0" cy="0"/>
+          <a:chOff x="0" y="0"/>
+          <a:chExt cx="0" cy="0"/>
+        </a:xfrm>
+      </p:grpSpPr>
+      <p:sp>
+        <p:nvSpPr>
+          <p:cNvPr id="2" name="Title 1"/>
+          <p:cNvSpPr>
+            <a:spLocks noGrp="1"/>
+          </p:cNvSpPr>
+          <p:nvPr>
+            <p:ph type="title"/>
+          </p:nvPr>
+        </p:nvSpPr>
+        <p:spPr/>
+        <p:txBody>
+          <a:bodyPr/>
+          <a:lstStyle/>
+          <a:p>
+            <a:r>
+              <a:rPr lang="en-GB" dirty="0" smtClean="0">
+                <a:latin typeface="Lucida Sans" pitchFamily="34" charset="0"/>
+              </a:rPr>
+              <a:t>User Personas</a:t>
+            </a:r>
+            <a:endParaRPr lang="en-GB" dirty="0">
+              <a:latin typeface="Lucida Sans" pitchFamily="34" charset="0"/>
+            </a:endParaRPr>
+          </a:p>
+        </p:txBody>
+      </p:sp>
+      <p:sp>
+        <p:nvSpPr>
+          <p:cNvPr id="3" name="Content Placeholder 2"/>
+          <p:cNvSpPr>
+            <a:spLocks noGrp="1"/>
+          </p:cNvSpPr>
+          <p:nvPr>
+            <p:ph sz="quarter" idx="1"/>
+          </p:nvPr>
+        </p:nvSpPr>
+        <p:spPr/>
+        <p:txBody>
+          <a:bodyPr/>
+          <a:lstStyle/>
+          <a:p>
+            <a:r>
+              <a:rPr lang="en-GB" dirty="0" err="1" smtClean="0">
+                <a:latin typeface="Lucida Sans" pitchFamily="34" charset="0"/>
+              </a:rPr>
+              <a:t>Trollo</a:t>
+            </a:r>
+            <a:r>
+              <a:rPr lang="en-GB" dirty="0" smtClean="0">
+                <a:latin typeface="Lucida Sans" pitchFamily="34" charset="0"/>
+              </a:rPr>
+              <a:t> goes here</a:t>
+            </a:r>
+            <a:endParaRPr lang="en-GB" dirty="0">
+              <a:latin typeface="Lucida Sans" pitchFamily="34" charset="0"/>
+            </a:endParaRPr>
+          </a:p>
+        </p:txBody>
+      </p:sp>
+      <p:pic>
+        <p:nvPicPr>
+          <p:cNvPr id="5" name="Picture 2" descr="H:\studeso\styling\images\akita.png"/>
+          <p:cNvPicPr>
+            <a:picLocks noChangeAspect="1" noChangeArrowheads="1"/>
+          </p:cNvPicPr>
+          <p:nvPr/>
+        </p:nvPicPr>
+        <p:blipFill>
+          <a:blip r:embed="rId2" cstate="print"/>
+          <a:srcRect/>
+          <a:stretch>
+            <a:fillRect/>
+          </a:stretch>
+        </p:blipFill>
+        <p:spPr bwMode="auto">
+          <a:xfrm flipH="1">
+            <a:off x="7559824" y="0"/>
+            <a:ext cx="1584176" cy="1475656"/>
+          </a:xfrm>
+          <a:prstGeom prst="rect">
+            <a:avLst/>
+          </a:prstGeom>
+          <a:noFill/>
+        </p:spPr>
+      </p:pic>
+      <p:pic>
+        <p:nvPicPr>
+          <p:cNvPr id="4" name="Picture 3"/>
+          <p:cNvPicPr>
+            <a:picLocks noChangeAspect="1"/>
+          </p:cNvPicPr>
+          <p:nvPr/>
+        </p:nvPicPr>
+        <p:blipFill>
+          <a:blip r:embed="rId3" cstate="print">
+            <a:extLst>
+              <a:ext uri="{28A0092B-C50C-407E-A947-70E740481C1C}">
+                <a14:useLocalDpi xmlns:a14="http://schemas.microsoft.com/office/drawing/2010/main" val="0"/>
+              </a:ext>
+            </a:extLst>
+          </a:blip>
+          <a:stretch>
+            <a:fillRect/>
+          </a:stretch>
+        </p:blipFill>
+        <p:spPr>
+          <a:xfrm>
+            <a:off x="5796136" y="1143000"/>
+            <a:ext cx="3214643" cy="2933321"/>
+          </a:xfrm>
+          <a:prstGeom prst="rect">
+            <a:avLst/>
+          </a:prstGeom>
+        </p:spPr>
+      </p:pic>
+    </p:spTree>
+    <p:extLst>
+      <p:ext uri="{BB962C8B-B14F-4D97-AF65-F5344CB8AC3E}">
+        <p14:creationId xmlns:p14="http://schemas.microsoft.com/office/powerpoint/2010/main" val="2678201838"/>
+      </p:ext>
+    </p:extLst>
+  </p:cSld>
+  <p:clrMapOvr>
+    <a:masterClrMapping/>
+  </p:clrMapOvr>
+  <p:timing>
+    <p:tnLst>
+      <p:par>
+        <p:cTn id="1" dur="indefinite" restart="never" nodeType="tmRoot"/>
+      </p:par>
+    </p:tnLst>
+  </p:timing>
+</p:sld>
+</file>
+
+<file path=ppt/slides/slide7.xml><?xml version="1.0" encoding="utf-8"?>
+<p:sld xmlns:a="http://schemas.openxmlformats.org/drawingml/2006/main" xmlns:r="http://schemas.openxmlformats.org/officeDocument/2006/relationships" xmlns:p="http://schemas.openxmlformats.org/presentationml/2006/main">
+  <p:cSld>
+    <p:spTree>
+      <p:nvGrpSpPr>
+        <p:cNvPr id="1" name=""/>
+        <p:cNvGrpSpPr/>
+        <p:nvPr/>
+      </p:nvGrpSpPr>
+      <p:grpSpPr>
+        <a:xfrm>
+          <a:off x="0" y="0"/>
+          <a:ext cx="0" cy="0"/>
+          <a:chOff x="0" y="0"/>
+          <a:chExt cx="0" cy="0"/>
+        </a:xfrm>
+      </p:grpSpPr>
+      <p:sp>
+        <p:nvSpPr>
+          <p:cNvPr id="2" name="Title 1"/>
+          <p:cNvSpPr>
+            <a:spLocks noGrp="1"/>
+          </p:cNvSpPr>
+          <p:nvPr>
+            <p:ph type="title"/>
+          </p:nvPr>
+        </p:nvSpPr>
+        <p:spPr/>
+        <p:txBody>
+          <a:bodyPr/>
+          <a:lstStyle/>
+          <a:p>
+            <a:r>
+              <a:rPr lang="en-GB" dirty="0" smtClean="0">
+                <a:latin typeface="Lucida Sans" pitchFamily="34" charset="0"/>
+              </a:rPr>
               <a:t>User Needs Table TODO!</a:t>
             </a:r>
             <a:endParaRPr lang="en-GB" dirty="0">
@@ -4520,7 +4995,13 @@
           <p:cNvGraphicFramePr>
             <a:graphicFrameLocks noGrp="1"/>
           </p:cNvGraphicFramePr>
-          <p:nvPr/>
+          <p:nvPr>
+            <p:extLst>
+              <p:ext uri="{D42A27DB-BD31-4B8C-83A1-F6EECF244321}">
+                <p14:modId xmlns:p14="http://schemas.microsoft.com/office/powerpoint/2010/main" val="2022530688"/>
+              </p:ext>
+            </p:extLst>
+          </p:nvPr>
         </p:nvGraphicFramePr>
         <p:xfrm>
           <a:off x="467544" y="1412776"/>
@@ -4626,7 +5107,11 @@
                       </a:r>
                       <a:r>
                         <a:rPr lang="en-GB" sz="1400" baseline="0" dirty="0" smtClean="0"/>
-                        <a:t> certain topics, posts with about  A “and” B</a:t>
+                        <a:t> certain topics, posts with about  A “and” </a:t>
+                      </a:r>
+                      <a:r>
+                        <a:rPr lang="en-GB" sz="1400" baseline="0" dirty="0" smtClean="0"/>
+                        <a:t>B, or ask a new question</a:t>
                       </a:r>
                       <a:endParaRPr lang="en-GB" sz="1400" dirty="0"/>
                     </a:p>
@@ -4648,6 +5133,10 @@
                     <a:bodyPr/>
                     <a:lstStyle/>
                     <a:p>
+                      <a:r>
+                        <a:rPr lang="en-GB" sz="1400" dirty="0" smtClean="0"/>
+                        <a:t>Other users?</a:t>
+                      </a:r>
                       <a:endParaRPr lang="en-GB" sz="1400" dirty="0"/>
                     </a:p>
                   </a:txBody>
@@ -4748,7 +5237,11 @@
                     <a:bodyPr/>
                     <a:lstStyle/>
                     <a:p>
-                      <a:endParaRPr lang="en-GB" sz="1400"/>
+                      <a:r>
+                        <a:rPr lang="en-GB" sz="1400" dirty="0" smtClean="0"/>
+                        <a:t>Unanswered/new questions view</a:t>
+                      </a:r>
+                      <a:endParaRPr lang="en-GB" sz="1400" dirty="0"/>
                     </a:p>
                   </a:txBody>
                   <a:tcPr/>
@@ -4798,6 +5291,10 @@
                     <a:bodyPr/>
                     <a:lstStyle/>
                     <a:p>
+                      <a:r>
+                        <a:rPr lang="en-GB" sz="1400" dirty="0" smtClean="0"/>
+                        <a:t>Other users?</a:t>
+                      </a:r>
                       <a:endParaRPr lang="en-GB" sz="1400" dirty="0"/>
                     </a:p>
                   </a:txBody>
@@ -4842,6 +5339,14 @@
                     <a:bodyPr/>
                     <a:lstStyle/>
                     <a:p>
+                      <a:r>
+                        <a:rPr lang="en-GB" sz="1400" dirty="0" smtClean="0"/>
+                        <a:t>Of</a:t>
+                      </a:r>
+                      <a:r>
+                        <a:rPr lang="en-GB" sz="1400" baseline="0" dirty="0" smtClean="0"/>
+                        <a:t> course!</a:t>
+                      </a:r>
                       <a:endParaRPr lang="en-GB" sz="1400" dirty="0"/>
                     </a:p>
                   </a:txBody>
@@ -4852,6 +5357,10 @@
                     <a:bodyPr/>
                     <a:lstStyle/>
                     <a:p>
+                      <a:r>
+                        <a:rPr lang="en-GB" sz="1400" dirty="0" smtClean="0"/>
+                        <a:t>Moderators/admins monitoring website</a:t>
+                      </a:r>
                       <a:endParaRPr lang="en-GB" sz="1400" dirty="0"/>
                     </a:p>
                   </a:txBody>
@@ -4870,7 +5379,7 @@
 </p:sld>
 </file>
 
-<file path=ppt/slides/slide6.xml><?xml version="1.0" encoding="utf-8"?>
+<file path=ppt/slides/slide8.xml><?xml version="1.0" encoding="utf-8"?>
 <p:sld xmlns:a="http://schemas.openxmlformats.org/drawingml/2006/main" xmlns:r="http://schemas.openxmlformats.org/officeDocument/2006/relationships" xmlns:p="http://schemas.openxmlformats.org/presentationml/2006/main">
   <p:cSld>
     <p:spTree>
@@ -4931,7 +5440,7 @@
           <a:blip r:embed="rId2" cstate="print">
             <a:extLst>
               <a:ext uri="{28A0092B-C50C-407E-A947-70E740481C1C}">
-                <a14:useLocalDpi xmlns="" xmlns:a14="http://schemas.microsoft.com/office/drawing/2010/main" val="0"/>
+                <a14:useLocalDpi xmlns:a14="http://schemas.microsoft.com/office/drawing/2010/main" val="0"/>
               </a:ext>
             </a:extLst>
           </a:blip>
@@ -4951,7 +5460,7 @@
           <a:noFill/>
           <a:extLst>
             <a:ext uri="{909E8E84-426E-40DD-AFC4-6F175D3DCCD1}">
-              <a14:hiddenFill xmlns="" xmlns:a14="http://schemas.microsoft.com/office/drawing/2010/main">
+              <a14:hiddenFill xmlns:a14="http://schemas.microsoft.com/office/drawing/2010/main">
                 <a:solidFill>
                   <a:srgbClr val="FFFFFF"/>
                 </a:solidFill>
@@ -4989,7 +5498,7 @@
     </p:spTree>
     <p:extLst>
       <p:ext uri="{BB962C8B-B14F-4D97-AF65-F5344CB8AC3E}">
-        <p14:creationId xmlns="" xmlns:p14="http://schemas.microsoft.com/office/powerpoint/2010/main" val="3144856911"/>
+        <p14:creationId xmlns:p14="http://schemas.microsoft.com/office/powerpoint/2010/main" val="3144856911"/>
       </p:ext>
     </p:extLst>
   </p:cSld>
@@ -5006,7 +5515,7 @@
 </p:sld>
 </file>
 
-<file path=ppt/slides/slide7.xml><?xml version="1.0" encoding="utf-8"?>
+<file path=ppt/slides/slide9.xml><?xml version="1.0" encoding="utf-8"?>
 <p:sld xmlns:a="http://schemas.openxmlformats.org/drawingml/2006/main" xmlns:r="http://schemas.openxmlformats.org/officeDocument/2006/relationships" xmlns:p="http://schemas.openxmlformats.org/presentationml/2006/main">
   <p:cSld>
     <p:spTree>
@@ -5067,7 +5576,7 @@
           <a:blip r:embed="rId2" cstate="print">
             <a:extLst>
               <a:ext uri="{28A0092B-C50C-407E-A947-70E740481C1C}">
-                <a14:useLocalDpi xmlns="" xmlns:a14="http://schemas.microsoft.com/office/drawing/2010/main" val="0"/>
+                <a14:useLocalDpi xmlns:a14="http://schemas.microsoft.com/office/drawing/2010/main" val="0"/>
               </a:ext>
             </a:extLst>
           </a:blip>
@@ -5087,7 +5596,7 @@
           <a:noFill/>
           <a:extLst>
             <a:ext uri="{909E8E84-426E-40DD-AFC4-6F175D3DCCD1}">
-              <a14:hiddenFill xmlns="" xmlns:a14="http://schemas.microsoft.com/office/drawing/2010/main">
+              <a14:hiddenFill xmlns:a14="http://schemas.microsoft.com/office/drawing/2010/main">
                 <a:solidFill>
                   <a:srgbClr val="FFFFFF"/>
                 </a:solidFill>
@@ -5125,121 +5634,7 @@
     </p:spTree>
     <p:extLst>
       <p:ext uri="{BB962C8B-B14F-4D97-AF65-F5344CB8AC3E}">
-        <p14:creationId xmlns="" xmlns:p14="http://schemas.microsoft.com/office/powerpoint/2010/main" val="1312360545"/>
-      </p:ext>
-    </p:extLst>
-  </p:cSld>
-  <p:clrMapOvr>
-    <a:masterClrMapping/>
-  </p:clrMapOvr>
-  <p:timing>
-    <p:tnLst>
-      <p:par>
-        <p:cTn id="1" dur="indefinite" restart="never" nodeType="tmRoot"/>
-      </p:par>
-    </p:tnLst>
-  </p:timing>
-</p:sld>
-</file>
-
-<file path=ppt/slides/slide8.xml><?xml version="1.0" encoding="utf-8"?>
-<p:sld xmlns:a="http://schemas.openxmlformats.org/drawingml/2006/main" xmlns:r="http://schemas.openxmlformats.org/officeDocument/2006/relationships" xmlns:p="http://schemas.openxmlformats.org/presentationml/2006/main">
-  <p:cSld>
-    <p:spTree>
-      <p:nvGrpSpPr>
-        <p:cNvPr id="1" name=""/>
-        <p:cNvGrpSpPr/>
-        <p:nvPr/>
-      </p:nvGrpSpPr>
-      <p:grpSpPr>
-        <a:xfrm>
-          <a:off x="0" y="0"/>
-          <a:ext cx="0" cy="0"/>
-          <a:chOff x="0" y="0"/>
-          <a:chExt cx="0" cy="0"/>
-        </a:xfrm>
-      </p:grpSpPr>
-      <p:sp>
-        <p:nvSpPr>
-          <p:cNvPr id="2" name="Title 1"/>
-          <p:cNvSpPr>
-            <a:spLocks noGrp="1"/>
-          </p:cNvSpPr>
-          <p:nvPr>
-            <p:ph type="title"/>
-          </p:nvPr>
-        </p:nvSpPr>
-        <p:spPr/>
-        <p:txBody>
-          <a:bodyPr/>
-          <a:lstStyle/>
-          <a:p>
-            <a:r>
-              <a:rPr lang="en-GB" dirty="0" smtClean="0">
-                <a:latin typeface="Lucida Sans" pitchFamily="34" charset="0"/>
-              </a:rPr>
-              <a:t>Wireframes</a:t>
-            </a:r>
-            <a:endParaRPr lang="en-GB" dirty="0">
-              <a:latin typeface="Lucida Sans" pitchFamily="34" charset="0"/>
-            </a:endParaRPr>
-          </a:p>
-        </p:txBody>
-      </p:sp>
-      <p:sp>
-        <p:nvSpPr>
-          <p:cNvPr id="3" name="Content Placeholder 2"/>
-          <p:cNvSpPr>
-            <a:spLocks noGrp="1"/>
-          </p:cNvSpPr>
-          <p:nvPr>
-            <p:ph sz="quarter" idx="1"/>
-          </p:nvPr>
-        </p:nvSpPr>
-        <p:spPr/>
-        <p:txBody>
-          <a:bodyPr/>
-          <a:lstStyle/>
-          <a:p>
-            <a:r>
-              <a:rPr lang="en-GB" dirty="0" smtClean="0">
-                <a:latin typeface="Lucida Sans" pitchFamily="34" charset="0"/>
-              </a:rPr>
-              <a:t>Paste this shit in, bitch</a:t>
-            </a:r>
-          </a:p>
-        </p:txBody>
-      </p:sp>
-      <p:pic>
-        <p:nvPicPr>
-          <p:cNvPr id="5" name="Picture 2" descr="H:\studeso\styling\images\akita.png"/>
-          <p:cNvPicPr>
-            <a:picLocks noChangeAspect="1" noChangeArrowheads="1"/>
-          </p:cNvPicPr>
-          <p:nvPr/>
-        </p:nvPicPr>
-        <p:blipFill>
-          <a:blip r:embed="rId2" cstate="print"/>
-          <a:srcRect/>
-          <a:stretch>
-            <a:fillRect/>
-          </a:stretch>
-        </p:blipFill>
-        <p:spPr bwMode="auto">
-          <a:xfrm flipH="1">
-            <a:off x="7559824" y="0"/>
-            <a:ext cx="1584176" cy="1475656"/>
-          </a:xfrm>
-          <a:prstGeom prst="rect">
-            <a:avLst/>
-          </a:prstGeom>
-          <a:noFill/>
-        </p:spPr>
-      </p:pic>
-    </p:spTree>
-    <p:extLst>
-      <p:ext uri="{BB962C8B-B14F-4D97-AF65-F5344CB8AC3E}">
-        <p14:creationId xmlns="" xmlns:p14="http://schemas.microsoft.com/office/powerpoint/2010/main" val="2608953531"/>
+        <p14:creationId xmlns:p14="http://schemas.microsoft.com/office/powerpoint/2010/main" val="1312360545"/>
       </p:ext>
     </p:extLst>
   </p:cSld>

</xml_diff>

<commit_message>
Updated powerpoint with the user personas
</commit_message>
<xml_diff>
--- a/docs/presentation.pptx
+++ b/docs/presentation.pptx
@@ -4,17 +4,19 @@
   <p:sldMasterIdLst>
     <p:sldMasterId id="2147483660" r:id="rId1"/>
   </p:sldMasterIdLst>
+  <p:notesMasterIdLst>
+    <p:notesMasterId r:id="rId11"/>
+  </p:notesMasterIdLst>
   <p:sldIdLst>
     <p:sldId id="256" r:id="rId2"/>
     <p:sldId id="257" r:id="rId3"/>
     <p:sldId id="262" r:id="rId4"/>
     <p:sldId id="258" r:id="rId5"/>
     <p:sldId id="264" r:id="rId6"/>
-    <p:sldId id="265" r:id="rId7"/>
-    <p:sldId id="263" r:id="rId8"/>
-    <p:sldId id="259" r:id="rId9"/>
-    <p:sldId id="260" r:id="rId10"/>
-    <p:sldId id="261" r:id="rId11"/>
+    <p:sldId id="263" r:id="rId7"/>
+    <p:sldId id="259" r:id="rId8"/>
+    <p:sldId id="260" r:id="rId9"/>
+    <p:sldId id="261" r:id="rId10"/>
   </p:sldIdLst>
   <p:sldSz cx="9144000" cy="6858000" type="screen4x3"/>
   <p:notesSz cx="6858000" cy="9144000"/>
@@ -115,7 +117,7 @@
   </p:defaultTextStyle>
   <p:extLst>
     <p:ext uri="{EFAFB233-063F-42B5-8137-9DF3F51BA10A}">
-      <p15:sldGuideLst xmlns:p15="http://schemas.microsoft.com/office/powerpoint/2012/main">
+      <p15:sldGuideLst xmlns:p15="http://schemas.microsoft.com/office/powerpoint/2012/main" xmlns="">
         <p15:guide id="1" orient="horz" pos="2160">
           <p15:clr>
             <a:srgbClr val="A4A3A4"/>
@@ -149,6 +151,552 @@
     <p:text>Just copied from the REQUIREMENTS.txt FILE</p:text>
   </p:cm>
 </p:cmLst>
+</file>
+
+<file path=ppt/notesMasters/notesMaster1.xml><?xml version="1.0" encoding="utf-8"?>
+<p:notesMaster xmlns:a="http://schemas.openxmlformats.org/drawingml/2006/main" xmlns:r="http://schemas.openxmlformats.org/officeDocument/2006/relationships" xmlns:p="http://schemas.openxmlformats.org/presentationml/2006/main">
+  <p:cSld>
+    <p:bg>
+      <p:bgRef idx="1001">
+        <a:schemeClr val="bg1"/>
+      </p:bgRef>
+    </p:bg>
+    <p:spTree>
+      <p:nvGrpSpPr>
+        <p:cNvPr id="1" name=""/>
+        <p:cNvGrpSpPr/>
+        <p:nvPr/>
+      </p:nvGrpSpPr>
+      <p:grpSpPr>
+        <a:xfrm>
+          <a:off x="0" y="0"/>
+          <a:ext cx="0" cy="0"/>
+          <a:chOff x="0" y="0"/>
+          <a:chExt cx="0" cy="0"/>
+        </a:xfrm>
+      </p:grpSpPr>
+      <p:sp>
+        <p:nvSpPr>
+          <p:cNvPr id="2" name="Header Placeholder 1"/>
+          <p:cNvSpPr>
+            <a:spLocks noGrp="1"/>
+          </p:cNvSpPr>
+          <p:nvPr>
+            <p:ph type="hdr" sz="quarter"/>
+          </p:nvPr>
+        </p:nvSpPr>
+        <p:spPr>
+          <a:xfrm>
+            <a:off x="0" y="0"/>
+            <a:ext cx="2971800" cy="457200"/>
+          </a:xfrm>
+          <a:prstGeom prst="rect">
+            <a:avLst/>
+          </a:prstGeom>
+        </p:spPr>
+        <p:txBody>
+          <a:bodyPr vert="horz" lIns="91440" tIns="45720" rIns="91440" bIns="45720" rtlCol="0"/>
+          <a:lstStyle>
+            <a:lvl1pPr algn="l">
+              <a:defRPr sz="1200"/>
+            </a:lvl1pPr>
+          </a:lstStyle>
+          <a:p>
+            <a:endParaRPr lang="en-GB"/>
+          </a:p>
+        </p:txBody>
+      </p:sp>
+      <p:sp>
+        <p:nvSpPr>
+          <p:cNvPr id="3" name="Date Placeholder 2"/>
+          <p:cNvSpPr>
+            <a:spLocks noGrp="1"/>
+          </p:cNvSpPr>
+          <p:nvPr>
+            <p:ph type="dt" idx="1"/>
+          </p:nvPr>
+        </p:nvSpPr>
+        <p:spPr>
+          <a:xfrm>
+            <a:off x="3884613" y="0"/>
+            <a:ext cx="2971800" cy="457200"/>
+          </a:xfrm>
+          <a:prstGeom prst="rect">
+            <a:avLst/>
+          </a:prstGeom>
+        </p:spPr>
+        <p:txBody>
+          <a:bodyPr vert="horz" lIns="91440" tIns="45720" rIns="91440" bIns="45720" rtlCol="0"/>
+          <a:lstStyle>
+            <a:lvl1pPr algn="r">
+              <a:defRPr sz="1200"/>
+            </a:lvl1pPr>
+          </a:lstStyle>
+          <a:p>
+            <a:fld id="{3BB74382-EDD2-490F-9388-C1D0E6077212}" type="datetimeFigureOut">
+              <a:rPr lang="en-GB" smtClean="0"/>
+              <a:t>19/02/2015</a:t>
+            </a:fld>
+            <a:endParaRPr lang="en-GB"/>
+          </a:p>
+        </p:txBody>
+      </p:sp>
+      <p:sp>
+        <p:nvSpPr>
+          <p:cNvPr id="4" name="Slide Image Placeholder 3"/>
+          <p:cNvSpPr>
+            <a:spLocks noGrp="1" noRot="1" noChangeAspect="1"/>
+          </p:cNvSpPr>
+          <p:nvPr>
+            <p:ph type="sldImg" idx="2"/>
+          </p:nvPr>
+        </p:nvSpPr>
+        <p:spPr>
+          <a:xfrm>
+            <a:off x="1143000" y="685800"/>
+            <a:ext cx="4572000" cy="3429000"/>
+          </a:xfrm>
+          <a:prstGeom prst="rect">
+            <a:avLst/>
+          </a:prstGeom>
+          <a:noFill/>
+          <a:ln w="12700">
+            <a:solidFill>
+              <a:prstClr val="black"/>
+            </a:solidFill>
+          </a:ln>
+        </p:spPr>
+        <p:txBody>
+          <a:bodyPr vert="horz" lIns="91440" tIns="45720" rIns="91440" bIns="45720" rtlCol="0" anchor="ctr"/>
+          <a:lstStyle/>
+          <a:p>
+            <a:endParaRPr lang="en-GB"/>
+          </a:p>
+        </p:txBody>
+      </p:sp>
+      <p:sp>
+        <p:nvSpPr>
+          <p:cNvPr id="5" name="Notes Placeholder 4"/>
+          <p:cNvSpPr>
+            <a:spLocks noGrp="1"/>
+          </p:cNvSpPr>
+          <p:nvPr>
+            <p:ph type="body" sz="quarter" idx="3"/>
+          </p:nvPr>
+        </p:nvSpPr>
+        <p:spPr>
+          <a:xfrm>
+            <a:off x="685800" y="4343400"/>
+            <a:ext cx="5486400" cy="4114800"/>
+          </a:xfrm>
+          <a:prstGeom prst="rect">
+            <a:avLst/>
+          </a:prstGeom>
+        </p:spPr>
+        <p:txBody>
+          <a:bodyPr vert="horz" lIns="91440" tIns="45720" rIns="91440" bIns="45720" rtlCol="0"/>
+          <a:lstStyle/>
+          <a:p>
+            <a:pPr lvl="0"/>
+            <a:r>
+              <a:rPr lang="en-US" smtClean="0"/>
+              <a:t>Click to edit Master text styles</a:t>
+            </a:r>
+          </a:p>
+          <a:p>
+            <a:pPr lvl="1"/>
+            <a:r>
+              <a:rPr lang="en-US" smtClean="0"/>
+              <a:t>Second level</a:t>
+            </a:r>
+          </a:p>
+          <a:p>
+            <a:pPr lvl="2"/>
+            <a:r>
+              <a:rPr lang="en-US" smtClean="0"/>
+              <a:t>Third level</a:t>
+            </a:r>
+          </a:p>
+          <a:p>
+            <a:pPr lvl="3"/>
+            <a:r>
+              <a:rPr lang="en-US" smtClean="0"/>
+              <a:t>Fourth level</a:t>
+            </a:r>
+          </a:p>
+          <a:p>
+            <a:pPr lvl="4"/>
+            <a:r>
+              <a:rPr lang="en-US" smtClean="0"/>
+              <a:t>Fifth level</a:t>
+            </a:r>
+            <a:endParaRPr lang="en-GB"/>
+          </a:p>
+        </p:txBody>
+      </p:sp>
+      <p:sp>
+        <p:nvSpPr>
+          <p:cNvPr id="6" name="Footer Placeholder 5"/>
+          <p:cNvSpPr>
+            <a:spLocks noGrp="1"/>
+          </p:cNvSpPr>
+          <p:nvPr>
+            <p:ph type="ftr" sz="quarter" idx="4"/>
+          </p:nvPr>
+        </p:nvSpPr>
+        <p:spPr>
+          <a:xfrm>
+            <a:off x="0" y="8685213"/>
+            <a:ext cx="2971800" cy="457200"/>
+          </a:xfrm>
+          <a:prstGeom prst="rect">
+            <a:avLst/>
+          </a:prstGeom>
+        </p:spPr>
+        <p:txBody>
+          <a:bodyPr vert="horz" lIns="91440" tIns="45720" rIns="91440" bIns="45720" rtlCol="0" anchor="b"/>
+          <a:lstStyle>
+            <a:lvl1pPr algn="l">
+              <a:defRPr sz="1200"/>
+            </a:lvl1pPr>
+          </a:lstStyle>
+          <a:p>
+            <a:endParaRPr lang="en-GB"/>
+          </a:p>
+        </p:txBody>
+      </p:sp>
+      <p:sp>
+        <p:nvSpPr>
+          <p:cNvPr id="7" name="Slide Number Placeholder 6"/>
+          <p:cNvSpPr>
+            <a:spLocks noGrp="1"/>
+          </p:cNvSpPr>
+          <p:nvPr>
+            <p:ph type="sldNum" sz="quarter" idx="5"/>
+          </p:nvPr>
+        </p:nvSpPr>
+        <p:spPr>
+          <a:xfrm>
+            <a:off x="3884613" y="8685213"/>
+            <a:ext cx="2971800" cy="457200"/>
+          </a:xfrm>
+          <a:prstGeom prst="rect">
+            <a:avLst/>
+          </a:prstGeom>
+        </p:spPr>
+        <p:txBody>
+          <a:bodyPr vert="horz" lIns="91440" tIns="45720" rIns="91440" bIns="45720" rtlCol="0" anchor="b"/>
+          <a:lstStyle>
+            <a:lvl1pPr algn="r">
+              <a:defRPr sz="1200"/>
+            </a:lvl1pPr>
+          </a:lstStyle>
+          <a:p>
+            <a:fld id="{801CE7F8-BC30-4FF3-AC28-1053AB04805F}" type="slidenum">
+              <a:rPr lang="en-GB" smtClean="0"/>
+              <a:t>‹#›</a:t>
+            </a:fld>
+            <a:endParaRPr lang="en-GB"/>
+          </a:p>
+        </p:txBody>
+      </p:sp>
+    </p:spTree>
+    <p:extLst>
+      <p:ext uri="{BB962C8B-B14F-4D97-AF65-F5344CB8AC3E}">
+        <p14:creationId xmlns:p14="http://schemas.microsoft.com/office/powerpoint/2010/main" val="3209695932"/>
+      </p:ext>
+    </p:extLst>
+  </p:cSld>
+  <p:clrMap bg1="lt1" tx1="dk1" bg2="lt2" tx2="dk2" accent1="accent1" accent2="accent2" accent3="accent3" accent4="accent4" accent5="accent5" accent6="accent6" hlink="hlink" folHlink="folHlink"/>
+  <p:notesStyle>
+    <a:lvl1pPr marL="0" algn="l" defTabSz="914400" rtl="0" eaLnBrk="1" latinLnBrk="0" hangingPunct="1">
+      <a:defRPr sz="1200" kern="1200">
+        <a:solidFill>
+          <a:schemeClr val="tx1"/>
+        </a:solidFill>
+        <a:latin typeface="+mn-lt"/>
+        <a:ea typeface="+mn-ea"/>
+        <a:cs typeface="+mn-cs"/>
+      </a:defRPr>
+    </a:lvl1pPr>
+    <a:lvl2pPr marL="457200" algn="l" defTabSz="914400" rtl="0" eaLnBrk="1" latinLnBrk="0" hangingPunct="1">
+      <a:defRPr sz="1200" kern="1200">
+        <a:solidFill>
+          <a:schemeClr val="tx1"/>
+        </a:solidFill>
+        <a:latin typeface="+mn-lt"/>
+        <a:ea typeface="+mn-ea"/>
+        <a:cs typeface="+mn-cs"/>
+      </a:defRPr>
+    </a:lvl2pPr>
+    <a:lvl3pPr marL="914400" algn="l" defTabSz="914400" rtl="0" eaLnBrk="1" latinLnBrk="0" hangingPunct="1">
+      <a:defRPr sz="1200" kern="1200">
+        <a:solidFill>
+          <a:schemeClr val="tx1"/>
+        </a:solidFill>
+        <a:latin typeface="+mn-lt"/>
+        <a:ea typeface="+mn-ea"/>
+        <a:cs typeface="+mn-cs"/>
+      </a:defRPr>
+    </a:lvl3pPr>
+    <a:lvl4pPr marL="1371600" algn="l" defTabSz="914400" rtl="0" eaLnBrk="1" latinLnBrk="0" hangingPunct="1">
+      <a:defRPr sz="1200" kern="1200">
+        <a:solidFill>
+          <a:schemeClr val="tx1"/>
+        </a:solidFill>
+        <a:latin typeface="+mn-lt"/>
+        <a:ea typeface="+mn-ea"/>
+        <a:cs typeface="+mn-cs"/>
+      </a:defRPr>
+    </a:lvl4pPr>
+    <a:lvl5pPr marL="1828800" algn="l" defTabSz="914400" rtl="0" eaLnBrk="1" latinLnBrk="0" hangingPunct="1">
+      <a:defRPr sz="1200" kern="1200">
+        <a:solidFill>
+          <a:schemeClr val="tx1"/>
+        </a:solidFill>
+        <a:latin typeface="+mn-lt"/>
+        <a:ea typeface="+mn-ea"/>
+        <a:cs typeface="+mn-cs"/>
+      </a:defRPr>
+    </a:lvl5pPr>
+    <a:lvl6pPr marL="2286000" algn="l" defTabSz="914400" rtl="0" eaLnBrk="1" latinLnBrk="0" hangingPunct="1">
+      <a:defRPr sz="1200" kern="1200">
+        <a:solidFill>
+          <a:schemeClr val="tx1"/>
+        </a:solidFill>
+        <a:latin typeface="+mn-lt"/>
+        <a:ea typeface="+mn-ea"/>
+        <a:cs typeface="+mn-cs"/>
+      </a:defRPr>
+    </a:lvl6pPr>
+    <a:lvl7pPr marL="2743200" algn="l" defTabSz="914400" rtl="0" eaLnBrk="1" latinLnBrk="0" hangingPunct="1">
+      <a:defRPr sz="1200" kern="1200">
+        <a:solidFill>
+          <a:schemeClr val="tx1"/>
+        </a:solidFill>
+        <a:latin typeface="+mn-lt"/>
+        <a:ea typeface="+mn-ea"/>
+        <a:cs typeface="+mn-cs"/>
+      </a:defRPr>
+    </a:lvl7pPr>
+    <a:lvl8pPr marL="3200400" algn="l" defTabSz="914400" rtl="0" eaLnBrk="1" latinLnBrk="0" hangingPunct="1">
+      <a:defRPr sz="1200" kern="1200">
+        <a:solidFill>
+          <a:schemeClr val="tx1"/>
+        </a:solidFill>
+        <a:latin typeface="+mn-lt"/>
+        <a:ea typeface="+mn-ea"/>
+        <a:cs typeface="+mn-cs"/>
+      </a:defRPr>
+    </a:lvl8pPr>
+    <a:lvl9pPr marL="3657600" algn="l" defTabSz="914400" rtl="0" eaLnBrk="1" latinLnBrk="0" hangingPunct="1">
+      <a:defRPr sz="1200" kern="1200">
+        <a:solidFill>
+          <a:schemeClr val="tx1"/>
+        </a:solidFill>
+        <a:latin typeface="+mn-lt"/>
+        <a:ea typeface="+mn-ea"/>
+        <a:cs typeface="+mn-cs"/>
+      </a:defRPr>
+    </a:lvl9pPr>
+  </p:notesStyle>
+</p:notesMaster>
+</file>
+
+<file path=ppt/notesSlides/notesSlide1.xml><?xml version="1.0" encoding="utf-8"?>
+<p:notes xmlns:a="http://schemas.openxmlformats.org/drawingml/2006/main" xmlns:r="http://schemas.openxmlformats.org/officeDocument/2006/relationships" xmlns:p="http://schemas.openxmlformats.org/presentationml/2006/main">
+  <p:cSld>
+    <p:spTree>
+      <p:nvGrpSpPr>
+        <p:cNvPr id="1" name=""/>
+        <p:cNvGrpSpPr/>
+        <p:nvPr/>
+      </p:nvGrpSpPr>
+      <p:grpSpPr>
+        <a:xfrm>
+          <a:off x="0" y="0"/>
+          <a:ext cx="0" cy="0"/>
+          <a:chOff x="0" y="0"/>
+          <a:chExt cx="0" cy="0"/>
+        </a:xfrm>
+      </p:grpSpPr>
+      <p:sp>
+        <p:nvSpPr>
+          <p:cNvPr id="2" name="Slide Image Placeholder 1"/>
+          <p:cNvSpPr>
+            <a:spLocks noGrp="1" noRot="1" noChangeAspect="1"/>
+          </p:cNvSpPr>
+          <p:nvPr>
+            <p:ph type="sldImg"/>
+          </p:nvPr>
+        </p:nvSpPr>
+        <p:spPr/>
+      </p:sp>
+      <p:sp>
+        <p:nvSpPr>
+          <p:cNvPr id="3" name="Notes Placeholder 2"/>
+          <p:cNvSpPr>
+            <a:spLocks noGrp="1"/>
+          </p:cNvSpPr>
+          <p:nvPr>
+            <p:ph type="body" idx="1"/>
+          </p:nvPr>
+        </p:nvSpPr>
+        <p:spPr/>
+        <p:txBody>
+          <a:bodyPr/>
+          <a:lstStyle/>
+          <a:p>
+            <a:r>
+              <a:rPr lang="en-GB" dirty="0" smtClean="0">
+                <a:latin typeface="Lucida Sans" pitchFamily="34" charset="0"/>
+              </a:rPr>
+              <a:t>Jim can go onto our website and search for the tags @python and @dictionary </a:t>
+            </a:r>
+          </a:p>
+          <a:p>
+            <a:r>
+              <a:rPr lang="en-GB" dirty="0" smtClean="0">
+                <a:latin typeface="Lucida Sans" pitchFamily="34" charset="0"/>
+              </a:rPr>
+              <a:t>He’ll also search for post from his own University by using the special @bristol.ac.uk tag.</a:t>
+            </a:r>
+          </a:p>
+          <a:p>
+            <a:r>
+              <a:rPr lang="en-GB" dirty="0" smtClean="0">
+                <a:latin typeface="Lucida Sans" pitchFamily="34" charset="0"/>
+              </a:rPr>
+              <a:t>The combination of tags leads him to posts from other people in his course who are struggling with the same things and so can quickly find an answer!</a:t>
+            </a:r>
+          </a:p>
+          <a:p>
+            <a:endParaRPr lang="en-GB" dirty="0"/>
+          </a:p>
+        </p:txBody>
+      </p:sp>
+      <p:sp>
+        <p:nvSpPr>
+          <p:cNvPr id="4" name="Slide Number Placeholder 3"/>
+          <p:cNvSpPr>
+            <a:spLocks noGrp="1"/>
+          </p:cNvSpPr>
+          <p:nvPr>
+            <p:ph type="sldNum" sz="quarter" idx="10"/>
+          </p:nvPr>
+        </p:nvSpPr>
+        <p:spPr/>
+        <p:txBody>
+          <a:bodyPr/>
+          <a:lstStyle/>
+          <a:p>
+            <a:fld id="{801CE7F8-BC30-4FF3-AC28-1053AB04805F}" type="slidenum">
+              <a:rPr lang="en-GB" smtClean="0"/>
+              <a:t>4</a:t>
+            </a:fld>
+            <a:endParaRPr lang="en-GB"/>
+          </a:p>
+        </p:txBody>
+      </p:sp>
+    </p:spTree>
+    <p:extLst>
+      <p:ext uri="{BB962C8B-B14F-4D97-AF65-F5344CB8AC3E}">
+        <p14:creationId xmlns:p14="http://schemas.microsoft.com/office/powerpoint/2010/main" val="3257369482"/>
+      </p:ext>
+    </p:extLst>
+  </p:cSld>
+  <p:clrMapOvr>
+    <a:masterClrMapping/>
+  </p:clrMapOvr>
+</p:notes>
+</file>
+
+<file path=ppt/notesSlides/notesSlide2.xml><?xml version="1.0" encoding="utf-8"?>
+<p:notes xmlns:a="http://schemas.openxmlformats.org/drawingml/2006/main" xmlns:r="http://schemas.openxmlformats.org/officeDocument/2006/relationships" xmlns:p="http://schemas.openxmlformats.org/presentationml/2006/main">
+  <p:cSld>
+    <p:spTree>
+      <p:nvGrpSpPr>
+        <p:cNvPr id="1" name=""/>
+        <p:cNvGrpSpPr/>
+        <p:nvPr/>
+      </p:nvGrpSpPr>
+      <p:grpSpPr>
+        <a:xfrm>
+          <a:off x="0" y="0"/>
+          <a:ext cx="0" cy="0"/>
+          <a:chOff x="0" y="0"/>
+          <a:chExt cx="0" cy="0"/>
+        </a:xfrm>
+      </p:grpSpPr>
+      <p:sp>
+        <p:nvSpPr>
+          <p:cNvPr id="2" name="Slide Image Placeholder 1"/>
+          <p:cNvSpPr>
+            <a:spLocks noGrp="1" noRot="1" noChangeAspect="1"/>
+          </p:cNvSpPr>
+          <p:nvPr>
+            <p:ph type="sldImg"/>
+          </p:nvPr>
+        </p:nvSpPr>
+        <p:spPr/>
+      </p:sp>
+      <p:sp>
+        <p:nvSpPr>
+          <p:cNvPr id="3" name="Notes Placeholder 2"/>
+          <p:cNvSpPr>
+            <a:spLocks noGrp="1"/>
+          </p:cNvSpPr>
+          <p:nvPr>
+            <p:ph type="body" idx="1"/>
+          </p:nvPr>
+        </p:nvSpPr>
+        <p:spPr/>
+        <p:txBody>
+          <a:bodyPr/>
+          <a:lstStyle/>
+          <a:p>
+            <a:r>
+              <a:rPr lang="en-GB" dirty="0" smtClean="0"/>
+              <a:t>He can browse BARK! for programming tags e.g. @java and look for unanswered questions in which he can answer. Many students would appreciate it. He gets a buzz out of answering questions and enjoys a large "score", as many people find his answers helpful.</a:t>
+            </a:r>
+            <a:endParaRPr lang="en-GB" dirty="0"/>
+          </a:p>
+        </p:txBody>
+      </p:sp>
+      <p:sp>
+        <p:nvSpPr>
+          <p:cNvPr id="4" name="Slide Number Placeholder 3"/>
+          <p:cNvSpPr>
+            <a:spLocks noGrp="1"/>
+          </p:cNvSpPr>
+          <p:nvPr>
+            <p:ph type="sldNum" sz="quarter" idx="10"/>
+          </p:nvPr>
+        </p:nvSpPr>
+        <p:spPr/>
+        <p:txBody>
+          <a:bodyPr/>
+          <a:lstStyle/>
+          <a:p>
+            <a:fld id="{801CE7F8-BC30-4FF3-AC28-1053AB04805F}" type="slidenum">
+              <a:rPr lang="en-GB" smtClean="0"/>
+              <a:t>5</a:t>
+            </a:fld>
+            <a:endParaRPr lang="en-GB"/>
+          </a:p>
+        </p:txBody>
+      </p:sp>
+    </p:spTree>
+    <p:extLst>
+      <p:ext uri="{BB962C8B-B14F-4D97-AF65-F5344CB8AC3E}">
+        <p14:creationId xmlns:p14="http://schemas.microsoft.com/office/powerpoint/2010/main" val="1032398851"/>
+      </p:ext>
+    </p:extLst>
+  </p:cSld>
+  <p:clrMapOvr>
+    <a:masterClrMapping/>
+  </p:clrMapOvr>
+</p:notes>
 </file>
 
 <file path=ppt/slideLayouts/slideLayout1.xml><?xml version="1.0" encoding="utf-8"?>
@@ -295,7 +843,7 @@
             <a:fld id="{3FEB6C20-88C7-4B3D-B23C-A0B2BF770696}" type="datetimeFigureOut">
               <a:rPr lang="en-GB" smtClean="0"/>
               <a:pPr/>
-              <a:t>18/02/2015</a:t>
+              <a:t>19/02/2015</a:t>
             </a:fld>
             <a:endParaRPr lang="en-GB"/>
           </a:p>
@@ -656,7 +1204,7 @@
             <a:fld id="{3FEB6C20-88C7-4B3D-B23C-A0B2BF770696}" type="datetimeFigureOut">
               <a:rPr lang="en-GB" smtClean="0"/>
               <a:pPr/>
-              <a:t>18/02/2015</a:t>
+              <a:t>19/02/2015</a:t>
             </a:fld>
             <a:endParaRPr lang="en-GB"/>
           </a:p>
@@ -833,7 +1381,7 @@
             <a:fld id="{3FEB6C20-88C7-4B3D-B23C-A0B2BF770696}" type="datetimeFigureOut">
               <a:rPr lang="en-GB" smtClean="0"/>
               <a:pPr/>
-              <a:t>18/02/2015</a:t>
+              <a:t>19/02/2015</a:t>
             </a:fld>
             <a:endParaRPr lang="en-GB"/>
           </a:p>
@@ -1070,7 +1618,7 @@
             <a:fld id="{3FEB6C20-88C7-4B3D-B23C-A0B2BF770696}" type="datetimeFigureOut">
               <a:rPr lang="en-GB" smtClean="0"/>
               <a:pPr/>
-              <a:t>18/02/2015</a:t>
+              <a:t>19/02/2015</a:t>
             </a:fld>
             <a:endParaRPr lang="en-GB"/>
           </a:p>
@@ -1341,7 +1889,7 @@
             <a:fld id="{3FEB6C20-88C7-4B3D-B23C-A0B2BF770696}" type="datetimeFigureOut">
               <a:rPr lang="en-GB" smtClean="0"/>
               <a:pPr/>
-              <a:t>18/02/2015</a:t>
+              <a:t>19/02/2015</a:t>
             </a:fld>
             <a:endParaRPr lang="en-GB"/>
           </a:p>
@@ -1563,7 +2111,7 @@
             <a:fld id="{3FEB6C20-88C7-4B3D-B23C-A0B2BF770696}" type="datetimeFigureOut">
               <a:rPr lang="en-GB" smtClean="0"/>
               <a:pPr/>
-              <a:t>18/02/2015</a:t>
+              <a:t>19/02/2015</a:t>
             </a:fld>
             <a:endParaRPr lang="en-GB"/>
           </a:p>
@@ -1917,7 +2465,7 @@
             <a:fld id="{3FEB6C20-88C7-4B3D-B23C-A0B2BF770696}" type="datetimeFigureOut">
               <a:rPr lang="en-GB" smtClean="0"/>
               <a:pPr/>
-              <a:t>18/02/2015</a:t>
+              <a:t>19/02/2015</a:t>
             </a:fld>
             <a:endParaRPr lang="en-GB"/>
           </a:p>
@@ -2151,7 +2699,7 @@
             <a:fld id="{3FEB6C20-88C7-4B3D-B23C-A0B2BF770696}" type="datetimeFigureOut">
               <a:rPr lang="en-GB" smtClean="0"/>
               <a:pPr/>
-              <a:t>18/02/2015</a:t>
+              <a:t>19/02/2015</a:t>
             </a:fld>
             <a:endParaRPr lang="en-GB"/>
           </a:p>
@@ -2293,7 +2841,7 @@
             <a:fld id="{3FEB6C20-88C7-4B3D-B23C-A0B2BF770696}" type="datetimeFigureOut">
               <a:rPr lang="en-GB" smtClean="0"/>
               <a:pPr/>
-              <a:t>18/02/2015</a:t>
+              <a:t>19/02/2015</a:t>
             </a:fld>
             <a:endParaRPr lang="en-GB"/>
           </a:p>
@@ -2572,7 +3120,7 @@
             <a:fld id="{3FEB6C20-88C7-4B3D-B23C-A0B2BF770696}" type="datetimeFigureOut">
               <a:rPr lang="en-GB" smtClean="0"/>
               <a:pPr/>
-              <a:t>18/02/2015</a:t>
+              <a:t>19/02/2015</a:t>
             </a:fld>
             <a:endParaRPr lang="en-GB"/>
           </a:p>
@@ -2981,7 +3529,7 @@
             <a:fld id="{3FEB6C20-88C7-4B3D-B23C-A0B2BF770696}" type="datetimeFigureOut">
               <a:rPr lang="en-GB" smtClean="0"/>
               <a:pPr/>
-              <a:t>18/02/2015</a:t>
+              <a:t>19/02/2015</a:t>
             </a:fld>
             <a:endParaRPr lang="en-GB"/>
           </a:p>
@@ -3321,7 +3869,7 @@
             <a:fld id="{3FEB6C20-88C7-4B3D-B23C-A0B2BF770696}" type="datetimeFigureOut">
               <a:rPr lang="en-GB" smtClean="0"/>
               <a:pPr/>
-              <a:t>18/02/2015</a:t>
+              <a:t>19/02/2015</a:t>
             </a:fld>
             <a:endParaRPr lang="en-GB"/>
           </a:p>
@@ -3970,120 +4518,6 @@
 </p:sld>
 </file>
 
-<file path=ppt/slides/slide10.xml><?xml version="1.0" encoding="utf-8"?>
-<p:sld xmlns:a="http://schemas.openxmlformats.org/drawingml/2006/main" xmlns:r="http://schemas.openxmlformats.org/officeDocument/2006/relationships" xmlns:p="http://schemas.openxmlformats.org/presentationml/2006/main">
-  <p:cSld>
-    <p:spTree>
-      <p:nvGrpSpPr>
-        <p:cNvPr id="1" name=""/>
-        <p:cNvGrpSpPr/>
-        <p:nvPr/>
-      </p:nvGrpSpPr>
-      <p:grpSpPr>
-        <a:xfrm>
-          <a:off x="0" y="0"/>
-          <a:ext cx="0" cy="0"/>
-          <a:chOff x="0" y="0"/>
-          <a:chExt cx="0" cy="0"/>
-        </a:xfrm>
-      </p:grpSpPr>
-      <p:sp>
-        <p:nvSpPr>
-          <p:cNvPr id="2" name="Title 1"/>
-          <p:cNvSpPr>
-            <a:spLocks noGrp="1"/>
-          </p:cNvSpPr>
-          <p:nvPr>
-            <p:ph type="title"/>
-          </p:nvPr>
-        </p:nvSpPr>
-        <p:spPr/>
-        <p:txBody>
-          <a:bodyPr/>
-          <a:lstStyle/>
-          <a:p>
-            <a:r>
-              <a:rPr lang="en-GB" dirty="0" smtClean="0">
-                <a:latin typeface="Lucida Sans" pitchFamily="34" charset="0"/>
-              </a:rPr>
-              <a:t>Wireframes</a:t>
-            </a:r>
-            <a:endParaRPr lang="en-GB" dirty="0">
-              <a:latin typeface="Lucida Sans" pitchFamily="34" charset="0"/>
-            </a:endParaRPr>
-          </a:p>
-        </p:txBody>
-      </p:sp>
-      <p:sp>
-        <p:nvSpPr>
-          <p:cNvPr id="3" name="Content Placeholder 2"/>
-          <p:cNvSpPr>
-            <a:spLocks noGrp="1"/>
-          </p:cNvSpPr>
-          <p:nvPr>
-            <p:ph sz="quarter" idx="1"/>
-          </p:nvPr>
-        </p:nvSpPr>
-        <p:spPr/>
-        <p:txBody>
-          <a:bodyPr/>
-          <a:lstStyle/>
-          <a:p>
-            <a:r>
-              <a:rPr lang="en-GB" dirty="0" smtClean="0">
-                <a:latin typeface="Lucida Sans" pitchFamily="34" charset="0"/>
-              </a:rPr>
-              <a:t>Paste this shit in, bitch</a:t>
-            </a:r>
-          </a:p>
-        </p:txBody>
-      </p:sp>
-      <p:pic>
-        <p:nvPicPr>
-          <p:cNvPr id="5" name="Picture 2" descr="H:\studeso\styling\images\akita.png"/>
-          <p:cNvPicPr>
-            <a:picLocks noChangeAspect="1" noChangeArrowheads="1"/>
-          </p:cNvPicPr>
-          <p:nvPr/>
-        </p:nvPicPr>
-        <p:blipFill>
-          <a:blip r:embed="rId2" cstate="print"/>
-          <a:srcRect/>
-          <a:stretch>
-            <a:fillRect/>
-          </a:stretch>
-        </p:blipFill>
-        <p:spPr bwMode="auto">
-          <a:xfrm flipH="1">
-            <a:off x="7559824" y="0"/>
-            <a:ext cx="1584176" cy="1475656"/>
-          </a:xfrm>
-          <a:prstGeom prst="rect">
-            <a:avLst/>
-          </a:prstGeom>
-          <a:noFill/>
-        </p:spPr>
-      </p:pic>
-    </p:spTree>
-    <p:extLst>
-      <p:ext uri="{BB962C8B-B14F-4D97-AF65-F5344CB8AC3E}">
-        <p14:creationId xmlns:p14="http://schemas.microsoft.com/office/powerpoint/2010/main" val="2608953531"/>
-      </p:ext>
-    </p:extLst>
-  </p:cSld>
-  <p:clrMapOvr>
-    <a:masterClrMapping/>
-  </p:clrMapOvr>
-  <p:timing>
-    <p:tnLst>
-      <p:par>
-        <p:cTn id="1" dur="indefinite" restart="never" nodeType="tmRoot"/>
-      </p:par>
-    </p:tnLst>
-  </p:timing>
-</p:sld>
-</file>
-
 <file path=ppt/slides/slide2.xml><?xml version="1.0" encoding="utf-8"?>
 <p:sld xmlns:a="http://schemas.openxmlformats.org/drawingml/2006/main" xmlns:r="http://schemas.openxmlformats.org/officeDocument/2006/relationships" xmlns:p="http://schemas.openxmlformats.org/presentationml/2006/main">
   <p:cSld>
@@ -4395,19 +4829,7 @@
               <a:rPr lang="en-GB" dirty="0" smtClean="0">
                 <a:latin typeface="Lucida Sans" pitchFamily="34" charset="0"/>
               </a:rPr>
-              <a:t>	- subscribe to tags which puts them on their </a:t>
-            </a:r>
-            <a:r>
-              <a:rPr lang="en-GB" dirty="0" smtClean="0">
-                <a:latin typeface="Lucida Sans" pitchFamily="34" charset="0"/>
-              </a:rPr>
-              <a:t>		  homepage</a:t>
-            </a:r>
-            <a:r>
-              <a:rPr lang="en-GB" dirty="0" smtClean="0">
-                <a:latin typeface="Lucida Sans" pitchFamily="34" charset="0"/>
-              </a:rPr>
-              <a:t>.</a:t>
+              <a:t>	- subscribe to tags which puts them on their 		  homepage.</a:t>
             </a:r>
           </a:p>
           <a:p>
@@ -4554,14 +4976,110 @@
         </p:nvSpPr>
         <p:spPr/>
         <p:txBody>
-          <a:bodyPr/>
+          <a:bodyPr>
+            <a:normAutofit fontScale="92500" lnSpcReduction="10000"/>
+          </a:bodyPr>
           <a:lstStyle/>
           <a:p>
             <a:r>
               <a:rPr lang="en-GB" dirty="0" smtClean="0">
                 <a:latin typeface="Lucida Sans" pitchFamily="34" charset="0"/>
               </a:rPr>
-              <a:t>Jim goes here</a:t>
+              <a:t>Name: Jim</a:t>
+            </a:r>
+          </a:p>
+          <a:p>
+            <a:r>
+              <a:rPr lang="en-GB" dirty="0" smtClean="0">
+                <a:latin typeface="Lucida Sans" pitchFamily="34" charset="0"/>
+              </a:rPr>
+              <a:t>Age: 17</a:t>
+            </a:r>
+          </a:p>
+          <a:p>
+            <a:r>
+              <a:rPr lang="en-GB" dirty="0" smtClean="0">
+                <a:latin typeface="Lucida Sans" pitchFamily="34" charset="0"/>
+              </a:rPr>
+              <a:t>Just started Comp </a:t>
+            </a:r>
+            <a:r>
+              <a:rPr lang="en-GB" dirty="0" err="1" smtClean="0">
+                <a:latin typeface="Lucida Sans" pitchFamily="34" charset="0"/>
+              </a:rPr>
+              <a:t>Sci</a:t>
+            </a:r>
+            <a:r>
+              <a:rPr lang="en-GB" dirty="0" smtClean="0">
+                <a:latin typeface="Lucida Sans" pitchFamily="34" charset="0"/>
+              </a:rPr>
+              <a:t> </a:t>
+            </a:r>
+          </a:p>
+          <a:p>
+            <a:pPr marL="0" indent="0">
+              <a:buNone/>
+            </a:pPr>
+            <a:r>
+              <a:rPr lang="en-GB" dirty="0" smtClean="0">
+                <a:latin typeface="Lucida Sans" pitchFamily="34" charset="0"/>
+              </a:rPr>
+              <a:t>   At Bristol University</a:t>
+            </a:r>
+          </a:p>
+          <a:p>
+            <a:r>
+              <a:rPr lang="en-GB" dirty="0" smtClean="0">
+                <a:latin typeface="Lucida Sans" pitchFamily="34" charset="0"/>
+              </a:rPr>
+              <a:t>Thinks Python is</a:t>
+            </a:r>
+          </a:p>
+          <a:p>
+            <a:pPr marL="0" indent="0">
+              <a:buNone/>
+            </a:pPr>
+            <a:r>
+              <a:rPr lang="en-GB" dirty="0">
+                <a:latin typeface="Lucida Sans" pitchFamily="34" charset="0"/>
+              </a:rPr>
+              <a:t> </a:t>
+            </a:r>
+            <a:r>
+              <a:rPr lang="en-GB" dirty="0" smtClean="0">
+                <a:latin typeface="Lucida Sans" pitchFamily="34" charset="0"/>
+              </a:rPr>
+              <a:t>  really neat. </a:t>
+            </a:r>
+          </a:p>
+          <a:p>
+            <a:r>
+              <a:rPr lang="en-GB" dirty="0" smtClean="0">
+                <a:latin typeface="Lucida Sans" pitchFamily="34" charset="0"/>
+              </a:rPr>
+              <a:t>Likes to make hobby programs along with the work he does at University.</a:t>
+            </a:r>
+            <a:endParaRPr lang="en-GB" dirty="0">
+              <a:latin typeface="Lucida Sans" pitchFamily="34" charset="0"/>
+            </a:endParaRPr>
+          </a:p>
+          <a:p>
+            <a:endParaRPr lang="en-GB" dirty="0">
+              <a:latin typeface="Lucida Sans" pitchFamily="34" charset="0"/>
+            </a:endParaRPr>
+          </a:p>
+          <a:p>
+            <a:r>
+              <a:rPr lang="en-GB" dirty="0">
+                <a:latin typeface="Lucida Sans" pitchFamily="34" charset="0"/>
+              </a:rPr>
+              <a:t>In one of this lectures he's baffled by the concept of dictionaries in Python and the lecturer wasn't making it any easier to understand</a:t>
+            </a:r>
+            <a:r>
+              <a:rPr lang="en-GB" dirty="0" smtClean="0">
+                <a:latin typeface="Lucida Sans" pitchFamily="34" charset="0"/>
+              </a:rPr>
+              <a:t>.</a:t>
             </a:r>
             <a:endParaRPr lang="en-GB" dirty="0">
               <a:latin typeface="Lucida Sans" pitchFamily="34" charset="0"/>
@@ -4578,7 +5096,7 @@
           <p:nvPr/>
         </p:nvPicPr>
         <p:blipFill>
-          <a:blip r:embed="rId2" cstate="print"/>
+          <a:blip r:embed="rId3" cstate="print"/>
           <a:srcRect/>
           <a:stretch>
             <a:fillRect/>
@@ -4604,7 +5122,7 @@
           <p:nvPr/>
         </p:nvPicPr>
         <p:blipFill>
-          <a:blip r:embed="rId3" cstate="print">
+          <a:blip r:embed="rId4" cstate="print">
             <a:extLst>
               <a:ext uri="{28A0092B-C50C-407E-A947-70E740481C1C}">
                 <a14:useLocalDpi xmlns:a14="http://schemas.microsoft.com/office/drawing/2010/main" val="0"/>
@@ -4617,7 +5135,7 @@
         </p:blipFill>
         <p:spPr>
           <a:xfrm>
-            <a:off x="5257800" y="1295400"/>
+            <a:off x="4282516" y="1196752"/>
             <a:ext cx="3657600" cy="2438400"/>
           </a:xfrm>
           <a:prstGeom prst="rect">
@@ -4708,7 +5226,81 @@
               <a:rPr lang="en-GB" dirty="0" smtClean="0">
                 <a:latin typeface="Lucida Sans" pitchFamily="34" charset="0"/>
               </a:rPr>
-              <a:t>Dave goes here</a:t>
+              <a:t>Name : Dave</a:t>
+            </a:r>
+          </a:p>
+          <a:p>
+            <a:r>
+              <a:rPr lang="en-GB" dirty="0" smtClean="0">
+                <a:latin typeface="Lucida Sans" pitchFamily="34" charset="0"/>
+              </a:rPr>
+              <a:t>Age: 22</a:t>
+            </a:r>
+          </a:p>
+          <a:p>
+            <a:r>
+              <a:rPr lang="en-GB" dirty="0" smtClean="0">
+                <a:latin typeface="Lucida Sans" pitchFamily="34" charset="0"/>
+              </a:rPr>
+              <a:t>Aspiring PhD student</a:t>
+            </a:r>
+          </a:p>
+          <a:p>
+            <a:r>
+              <a:rPr lang="en-GB" dirty="0" smtClean="0">
+                <a:latin typeface="Lucida Sans" pitchFamily="34" charset="0"/>
+              </a:rPr>
+              <a:t>A programming Guru</a:t>
+            </a:r>
+          </a:p>
+          <a:p>
+            <a:r>
+              <a:rPr lang="en-GB" dirty="0" smtClean="0">
+                <a:latin typeface="Lucida Sans" pitchFamily="34" charset="0"/>
+              </a:rPr>
+              <a:t>Knows everything about</a:t>
+            </a:r>
+          </a:p>
+          <a:p>
+            <a:pPr marL="0" indent="0">
+              <a:buNone/>
+            </a:pPr>
+            <a:r>
+              <a:rPr lang="en-GB" dirty="0">
+                <a:latin typeface="Lucida Sans" pitchFamily="34" charset="0"/>
+              </a:rPr>
+              <a:t> </a:t>
+            </a:r>
+            <a:r>
+              <a:rPr lang="en-GB" dirty="0" smtClean="0">
+                <a:latin typeface="Lucida Sans" pitchFamily="34" charset="0"/>
+              </a:rPr>
+              <a:t>  every programming </a:t>
+            </a:r>
+          </a:p>
+          <a:p>
+            <a:pPr marL="0" indent="0">
+              <a:buNone/>
+            </a:pPr>
+            <a:r>
+              <a:rPr lang="en-GB" dirty="0">
+                <a:latin typeface="Lucida Sans" pitchFamily="34" charset="0"/>
+              </a:rPr>
+              <a:t> </a:t>
+            </a:r>
+            <a:r>
+              <a:rPr lang="en-GB" dirty="0" smtClean="0">
+                <a:latin typeface="Lucida Sans" pitchFamily="34" charset="0"/>
+              </a:rPr>
+              <a:t>  language he can find, from COBOL to Python.</a:t>
+            </a:r>
+          </a:p>
+          <a:p>
+            <a:r>
+              <a:rPr lang="en-GB" dirty="0" smtClean="0">
+                <a:latin typeface="Lucida Sans" pitchFamily="34" charset="0"/>
+              </a:rPr>
+              <a:t>Wants to impart all his knowledge to others and achieve a high rating for his answers.</a:t>
             </a:r>
             <a:endParaRPr lang="en-GB" dirty="0">
               <a:latin typeface="Lucida Sans" pitchFamily="34" charset="0"/>
@@ -4725,7 +5317,7 @@
           <p:nvPr/>
         </p:nvPicPr>
         <p:blipFill>
-          <a:blip r:embed="rId2" cstate="print"/>
+          <a:blip r:embed="rId3" cstate="print"/>
           <a:srcRect/>
           <a:stretch>
             <a:fillRect/>
@@ -4751,7 +5343,7 @@
           <p:nvPr/>
         </p:nvPicPr>
         <p:blipFill>
-          <a:blip r:embed="rId3">
+          <a:blip r:embed="rId4">
             <a:extLst>
               <a:ext uri="{28A0092B-C50C-407E-A947-70E740481C1C}">
                 <a14:useLocalDpi xmlns:a14="http://schemas.microsoft.com/office/drawing/2010/main" val="0"/>
@@ -4793,159 +5385,6 @@
 </file>
 
 <file path=ppt/slides/slide6.xml><?xml version="1.0" encoding="utf-8"?>
-<p:sld xmlns:a="http://schemas.openxmlformats.org/drawingml/2006/main" xmlns:r="http://schemas.openxmlformats.org/officeDocument/2006/relationships" xmlns:p="http://schemas.openxmlformats.org/presentationml/2006/main">
-  <p:cSld>
-    <p:spTree>
-      <p:nvGrpSpPr>
-        <p:cNvPr id="1" name=""/>
-        <p:cNvGrpSpPr/>
-        <p:nvPr/>
-      </p:nvGrpSpPr>
-      <p:grpSpPr>
-        <a:xfrm>
-          <a:off x="0" y="0"/>
-          <a:ext cx="0" cy="0"/>
-          <a:chOff x="0" y="0"/>
-          <a:chExt cx="0" cy="0"/>
-        </a:xfrm>
-      </p:grpSpPr>
-      <p:sp>
-        <p:nvSpPr>
-          <p:cNvPr id="2" name="Title 1"/>
-          <p:cNvSpPr>
-            <a:spLocks noGrp="1"/>
-          </p:cNvSpPr>
-          <p:nvPr>
-            <p:ph type="title"/>
-          </p:nvPr>
-        </p:nvSpPr>
-        <p:spPr/>
-        <p:txBody>
-          <a:bodyPr/>
-          <a:lstStyle/>
-          <a:p>
-            <a:r>
-              <a:rPr lang="en-GB" dirty="0" smtClean="0">
-                <a:latin typeface="Lucida Sans" pitchFamily="34" charset="0"/>
-              </a:rPr>
-              <a:t>User Personas</a:t>
-            </a:r>
-            <a:endParaRPr lang="en-GB" dirty="0">
-              <a:latin typeface="Lucida Sans" pitchFamily="34" charset="0"/>
-            </a:endParaRPr>
-          </a:p>
-        </p:txBody>
-      </p:sp>
-      <p:sp>
-        <p:nvSpPr>
-          <p:cNvPr id="3" name="Content Placeholder 2"/>
-          <p:cNvSpPr>
-            <a:spLocks noGrp="1"/>
-          </p:cNvSpPr>
-          <p:nvPr>
-            <p:ph sz="quarter" idx="1"/>
-          </p:nvPr>
-        </p:nvSpPr>
-        <p:spPr/>
-        <p:txBody>
-          <a:bodyPr/>
-          <a:lstStyle/>
-          <a:p>
-            <a:r>
-              <a:rPr lang="en-GB" dirty="0" err="1" smtClean="0">
-                <a:latin typeface="Lucida Sans" pitchFamily="34" charset="0"/>
-              </a:rPr>
-              <a:t>Trollo</a:t>
-            </a:r>
-            <a:r>
-              <a:rPr lang="en-GB" dirty="0" smtClean="0">
-                <a:latin typeface="Lucida Sans" pitchFamily="34" charset="0"/>
-              </a:rPr>
-              <a:t> goes here</a:t>
-            </a:r>
-            <a:endParaRPr lang="en-GB" dirty="0">
-              <a:latin typeface="Lucida Sans" pitchFamily="34" charset="0"/>
-            </a:endParaRPr>
-          </a:p>
-        </p:txBody>
-      </p:sp>
-      <p:pic>
-        <p:nvPicPr>
-          <p:cNvPr id="5" name="Picture 2" descr="H:\studeso\styling\images\akita.png"/>
-          <p:cNvPicPr>
-            <a:picLocks noChangeAspect="1" noChangeArrowheads="1"/>
-          </p:cNvPicPr>
-          <p:nvPr/>
-        </p:nvPicPr>
-        <p:blipFill>
-          <a:blip r:embed="rId2" cstate="print"/>
-          <a:srcRect/>
-          <a:stretch>
-            <a:fillRect/>
-          </a:stretch>
-        </p:blipFill>
-        <p:spPr bwMode="auto">
-          <a:xfrm flipH="1">
-            <a:off x="7559824" y="0"/>
-            <a:ext cx="1584176" cy="1475656"/>
-          </a:xfrm>
-          <a:prstGeom prst="rect">
-            <a:avLst/>
-          </a:prstGeom>
-          <a:noFill/>
-        </p:spPr>
-      </p:pic>
-      <p:pic>
-        <p:nvPicPr>
-          <p:cNvPr id="4" name="Picture 3"/>
-          <p:cNvPicPr>
-            <a:picLocks noChangeAspect="1"/>
-          </p:cNvPicPr>
-          <p:nvPr/>
-        </p:nvPicPr>
-        <p:blipFill>
-          <a:blip r:embed="rId3" cstate="print">
-            <a:extLst>
-              <a:ext uri="{28A0092B-C50C-407E-A947-70E740481C1C}">
-                <a14:useLocalDpi xmlns:a14="http://schemas.microsoft.com/office/drawing/2010/main" val="0"/>
-              </a:ext>
-            </a:extLst>
-          </a:blip>
-          <a:stretch>
-            <a:fillRect/>
-          </a:stretch>
-        </p:blipFill>
-        <p:spPr>
-          <a:xfrm>
-            <a:off x="5796136" y="1143000"/>
-            <a:ext cx="3214643" cy="2933321"/>
-          </a:xfrm>
-          <a:prstGeom prst="rect">
-            <a:avLst/>
-          </a:prstGeom>
-        </p:spPr>
-      </p:pic>
-    </p:spTree>
-    <p:extLst>
-      <p:ext uri="{BB962C8B-B14F-4D97-AF65-F5344CB8AC3E}">
-        <p14:creationId xmlns:p14="http://schemas.microsoft.com/office/powerpoint/2010/main" val="2678201838"/>
-      </p:ext>
-    </p:extLst>
-  </p:cSld>
-  <p:clrMapOvr>
-    <a:masterClrMapping/>
-  </p:clrMapOvr>
-  <p:timing>
-    <p:tnLst>
-      <p:par>
-        <p:cTn id="1" dur="indefinite" restart="never" nodeType="tmRoot"/>
-      </p:par>
-    </p:tnLst>
-  </p:timing>
-</p:sld>
-</file>
-
-<file path=ppt/slides/slide7.xml><?xml version="1.0" encoding="utf-8"?>
 <p:sld xmlns:a="http://schemas.openxmlformats.org/drawingml/2006/main" xmlns:r="http://schemas.openxmlformats.org/officeDocument/2006/relationships" xmlns:p="http://schemas.openxmlformats.org/presentationml/2006/main">
   <p:cSld>
     <p:spTree>
@@ -5107,11 +5546,7 @@
                       </a:r>
                       <a:r>
                         <a:rPr lang="en-GB" sz="1400" baseline="0" dirty="0" smtClean="0"/>
-                        <a:t> certain topics, posts with about  A “and” </a:t>
-                      </a:r>
-                      <a:r>
-                        <a:rPr lang="en-GB" sz="1400" baseline="0" dirty="0" smtClean="0"/>
-                        <a:t>B, or ask a new question</a:t>
+                        <a:t> certain topics, posts with about  A “and” B, or ask a new question</a:t>
                       </a:r>
                       <a:endParaRPr lang="en-GB" sz="1400" dirty="0"/>
                     </a:p>
@@ -5376,10 +5811,17 @@
   <p:clrMapOvr>
     <a:masterClrMapping/>
   </p:clrMapOvr>
+  <p:timing>
+    <p:tnLst>
+      <p:par>
+        <p:cTn id="1" dur="indefinite" restart="never" nodeType="tmRoot"/>
+      </p:par>
+    </p:tnLst>
+  </p:timing>
 </p:sld>
 </file>
 
-<file path=ppt/slides/slide8.xml><?xml version="1.0" encoding="utf-8"?>
+<file path=ppt/slides/slide7.xml><?xml version="1.0" encoding="utf-8"?>
 <p:sld xmlns:a="http://schemas.openxmlformats.org/drawingml/2006/main" xmlns:r="http://schemas.openxmlformats.org/officeDocument/2006/relationships" xmlns:p="http://schemas.openxmlformats.org/presentationml/2006/main">
   <p:cSld>
     <p:spTree>
@@ -5499,6 +5941,142 @@
     <p:extLst>
       <p:ext uri="{BB962C8B-B14F-4D97-AF65-F5344CB8AC3E}">
         <p14:creationId xmlns:p14="http://schemas.microsoft.com/office/powerpoint/2010/main" val="3144856911"/>
+      </p:ext>
+    </p:extLst>
+  </p:cSld>
+  <p:clrMapOvr>
+    <a:masterClrMapping/>
+  </p:clrMapOvr>
+  <p:timing>
+    <p:tnLst>
+      <p:par>
+        <p:cTn id="1" dur="indefinite" restart="never" nodeType="tmRoot"/>
+      </p:par>
+    </p:tnLst>
+  </p:timing>
+</p:sld>
+</file>
+
+<file path=ppt/slides/slide8.xml><?xml version="1.0" encoding="utf-8"?>
+<p:sld xmlns:a="http://schemas.openxmlformats.org/drawingml/2006/main" xmlns:r="http://schemas.openxmlformats.org/officeDocument/2006/relationships" xmlns:p="http://schemas.openxmlformats.org/presentationml/2006/main">
+  <p:cSld>
+    <p:spTree>
+      <p:nvGrpSpPr>
+        <p:cNvPr id="1" name=""/>
+        <p:cNvGrpSpPr/>
+        <p:nvPr/>
+      </p:nvGrpSpPr>
+      <p:grpSpPr>
+        <a:xfrm>
+          <a:off x="0" y="0"/>
+          <a:ext cx="0" cy="0"/>
+          <a:chOff x="0" y="0"/>
+          <a:chExt cx="0" cy="0"/>
+        </a:xfrm>
+      </p:grpSpPr>
+      <p:sp>
+        <p:nvSpPr>
+          <p:cNvPr id="2" name="Title 1"/>
+          <p:cNvSpPr>
+            <a:spLocks noGrp="1"/>
+          </p:cNvSpPr>
+          <p:nvPr>
+            <p:ph type="title"/>
+          </p:nvPr>
+        </p:nvSpPr>
+        <p:spPr>
+          <a:xfrm>
+            <a:off x="395536" y="53752"/>
+            <a:ext cx="8229600" cy="1143000"/>
+          </a:xfrm>
+        </p:spPr>
+        <p:txBody>
+          <a:bodyPr/>
+          <a:lstStyle/>
+          <a:p>
+            <a:r>
+              <a:rPr lang="en-GB" dirty="0" smtClean="0">
+                <a:latin typeface="Lucida Sans" pitchFamily="34" charset="0"/>
+              </a:rPr>
+              <a:t>n-Tier Diagram</a:t>
+            </a:r>
+            <a:endParaRPr lang="en-GB" dirty="0">
+              <a:latin typeface="Lucida Sans" pitchFamily="34" charset="0"/>
+            </a:endParaRPr>
+          </a:p>
+        </p:txBody>
+      </p:sp>
+      <p:pic>
+        <p:nvPicPr>
+          <p:cNvPr id="2050" name="Picture 2" descr="C:\Users\Ewan\Documents\GitHub\studeso\docs\diagrams\BarkNTier.png"/>
+          <p:cNvPicPr>
+            <a:picLocks noChangeAspect="1" noChangeArrowheads="1"/>
+          </p:cNvPicPr>
+          <p:nvPr/>
+        </p:nvPicPr>
+        <p:blipFill>
+          <a:blip r:embed="rId2" cstate="print">
+            <a:extLst>
+              <a:ext uri="{28A0092B-C50C-407E-A947-70E740481C1C}">
+                <a14:useLocalDpi xmlns:a14="http://schemas.microsoft.com/office/drawing/2010/main" val="0"/>
+              </a:ext>
+            </a:extLst>
+          </a:blip>
+          <a:srcRect/>
+          <a:stretch>
+            <a:fillRect/>
+          </a:stretch>
+        </p:blipFill>
+        <p:spPr bwMode="auto">
+          <a:xfrm>
+            <a:off x="395536" y="2708920"/>
+            <a:ext cx="8088313" cy="1206500"/>
+          </a:xfrm>
+          <a:prstGeom prst="rect">
+            <a:avLst/>
+          </a:prstGeom>
+          <a:noFill/>
+          <a:extLst>
+            <a:ext uri="{909E8E84-426E-40DD-AFC4-6F175D3DCCD1}">
+              <a14:hiddenFill xmlns:a14="http://schemas.microsoft.com/office/drawing/2010/main">
+                <a:solidFill>
+                  <a:srgbClr val="FFFFFF"/>
+                </a:solidFill>
+              </a14:hiddenFill>
+            </a:ext>
+          </a:extLst>
+        </p:spPr>
+      </p:pic>
+      <p:pic>
+        <p:nvPicPr>
+          <p:cNvPr id="5" name="Picture 2" descr="H:\studeso\styling\images\akita.png"/>
+          <p:cNvPicPr>
+            <a:picLocks noChangeAspect="1" noChangeArrowheads="1"/>
+          </p:cNvPicPr>
+          <p:nvPr/>
+        </p:nvPicPr>
+        <p:blipFill>
+          <a:blip r:embed="rId3" cstate="print"/>
+          <a:srcRect/>
+          <a:stretch>
+            <a:fillRect/>
+          </a:stretch>
+        </p:blipFill>
+        <p:spPr bwMode="auto">
+          <a:xfrm flipH="1">
+            <a:off x="7559824" y="0"/>
+            <a:ext cx="1584176" cy="1475656"/>
+          </a:xfrm>
+          <a:prstGeom prst="rect">
+            <a:avLst/>
+          </a:prstGeom>
+          <a:noFill/>
+        </p:spPr>
+      </p:pic>
+    </p:spTree>
+    <p:extLst>
+      <p:ext uri="{BB962C8B-B14F-4D97-AF65-F5344CB8AC3E}">
+        <p14:creationId xmlns:p14="http://schemas.microsoft.com/office/powerpoint/2010/main" val="1312360545"/>
       </p:ext>
     </p:extLst>
   </p:cSld>
@@ -5542,12 +6120,7 @@
             <p:ph type="title"/>
           </p:nvPr>
         </p:nvSpPr>
-        <p:spPr>
-          <a:xfrm>
-            <a:off x="395536" y="53752"/>
-            <a:ext cx="8229600" cy="1143000"/>
-          </a:xfrm>
-        </p:spPr>
+        <p:spPr/>
         <p:txBody>
           <a:bodyPr/>
           <a:lstStyle/>
@@ -5556,7 +6129,7 @@
               <a:rPr lang="en-GB" dirty="0" smtClean="0">
                 <a:latin typeface="Lucida Sans" pitchFamily="34" charset="0"/>
               </a:rPr>
-              <a:t>n-Tier Diagram</a:t>
+              <a:t>Wireframes</a:t>
             </a:r>
             <a:endParaRPr lang="en-GB" dirty="0">
               <a:latin typeface="Lucida Sans" pitchFamily="34" charset="0"/>
@@ -5564,47 +6137,30 @@
           </a:p>
         </p:txBody>
       </p:sp>
-      <p:pic>
-        <p:nvPicPr>
-          <p:cNvPr id="2050" name="Picture 2" descr="C:\Users\Ewan\Documents\GitHub\studeso\docs\diagrams\BarkNTier.png"/>
-          <p:cNvPicPr>
-            <a:picLocks noChangeAspect="1" noChangeArrowheads="1"/>
-          </p:cNvPicPr>
-          <p:nvPr/>
-        </p:nvPicPr>
-        <p:blipFill>
-          <a:blip r:embed="rId2" cstate="print">
-            <a:extLst>
-              <a:ext uri="{28A0092B-C50C-407E-A947-70E740481C1C}">
-                <a14:useLocalDpi xmlns:a14="http://schemas.microsoft.com/office/drawing/2010/main" val="0"/>
-              </a:ext>
-            </a:extLst>
-          </a:blip>
-          <a:srcRect/>
-          <a:stretch>
-            <a:fillRect/>
-          </a:stretch>
-        </p:blipFill>
-        <p:spPr bwMode="auto">
-          <a:xfrm>
-            <a:off x="395536" y="2708920"/>
-            <a:ext cx="8088313" cy="1206500"/>
-          </a:xfrm>
-          <a:prstGeom prst="rect">
-            <a:avLst/>
-          </a:prstGeom>
-          <a:noFill/>
-          <a:extLst>
-            <a:ext uri="{909E8E84-426E-40DD-AFC4-6F175D3DCCD1}">
-              <a14:hiddenFill xmlns:a14="http://schemas.microsoft.com/office/drawing/2010/main">
-                <a:solidFill>
-                  <a:srgbClr val="FFFFFF"/>
-                </a:solidFill>
-              </a14:hiddenFill>
-            </a:ext>
-          </a:extLst>
-        </p:spPr>
-      </p:pic>
+      <p:sp>
+        <p:nvSpPr>
+          <p:cNvPr id="3" name="Content Placeholder 2"/>
+          <p:cNvSpPr>
+            <a:spLocks noGrp="1"/>
+          </p:cNvSpPr>
+          <p:nvPr>
+            <p:ph sz="quarter" idx="1"/>
+          </p:nvPr>
+        </p:nvSpPr>
+        <p:spPr/>
+        <p:txBody>
+          <a:bodyPr/>
+          <a:lstStyle/>
+          <a:p>
+            <a:r>
+              <a:rPr lang="en-GB" dirty="0" smtClean="0">
+                <a:latin typeface="Lucida Sans" pitchFamily="34" charset="0"/>
+              </a:rPr>
+              <a:t>Paste this shit in, bitch</a:t>
+            </a:r>
+          </a:p>
+        </p:txBody>
+      </p:sp>
       <p:pic>
         <p:nvPicPr>
           <p:cNvPr id="5" name="Picture 2" descr="H:\studeso\styling\images\akita.png"/>
@@ -5614,7 +6170,7 @@
           <p:nvPr/>
         </p:nvPicPr>
         <p:blipFill>
-          <a:blip r:embed="rId3" cstate="print"/>
+          <a:blip r:embed="rId2" cstate="print"/>
           <a:srcRect/>
           <a:stretch>
             <a:fillRect/>
@@ -5634,7 +6190,7 @@
     </p:spTree>
     <p:extLst>
       <p:ext uri="{BB962C8B-B14F-4D97-AF65-F5344CB8AC3E}">
-        <p14:creationId xmlns:p14="http://schemas.microsoft.com/office/powerpoint/2010/main" val="1312360545"/>
+        <p14:creationId xmlns:p14="http://schemas.microsoft.com/office/powerpoint/2010/main" val="2608953531"/>
       </p:ext>
     </p:extLst>
   </p:cSld>
@@ -5981,4 +6537,289 @@
   <a:objectDefaults/>
   <a:extraClrSchemeLst/>
 </a:theme>
+</file>
+
+<file path=ppt/theme/theme2.xml><?xml version="1.0" encoding="utf-8"?>
+<a:theme xmlns:a="http://schemas.openxmlformats.org/drawingml/2006/main" name="Office Theme">
+  <a:themeElements>
+    <a:clrScheme name="Office">
+      <a:dk1>
+        <a:sysClr val="windowText" lastClr="000000"/>
+      </a:dk1>
+      <a:lt1>
+        <a:sysClr val="window" lastClr="FFFFFF"/>
+      </a:lt1>
+      <a:dk2>
+        <a:srgbClr val="1F497D"/>
+      </a:dk2>
+      <a:lt2>
+        <a:srgbClr val="EEECE1"/>
+      </a:lt2>
+      <a:accent1>
+        <a:srgbClr val="4F81BD"/>
+      </a:accent1>
+      <a:accent2>
+        <a:srgbClr val="C0504D"/>
+      </a:accent2>
+      <a:accent3>
+        <a:srgbClr val="9BBB59"/>
+      </a:accent3>
+      <a:accent4>
+        <a:srgbClr val="8064A2"/>
+      </a:accent4>
+      <a:accent5>
+        <a:srgbClr val="4BACC6"/>
+      </a:accent5>
+      <a:accent6>
+        <a:srgbClr val="F79646"/>
+      </a:accent6>
+      <a:hlink>
+        <a:srgbClr val="0000FF"/>
+      </a:hlink>
+      <a:folHlink>
+        <a:srgbClr val="800080"/>
+      </a:folHlink>
+    </a:clrScheme>
+    <a:fontScheme name="Office">
+      <a:majorFont>
+        <a:latin typeface="Calibri"/>
+        <a:ea typeface=""/>
+        <a:cs typeface=""/>
+        <a:font script="Jpan" typeface="ＭＳ Ｐゴシック"/>
+        <a:font script="Hang" typeface="맑은 고딕"/>
+        <a:font script="Hans" typeface="宋体"/>
+        <a:font script="Hant" typeface="新細明體"/>
+        <a:font script="Arab" typeface="Times New Roman"/>
+        <a:font script="Hebr" typeface="Times New Roman"/>
+        <a:font script="Thai" typeface="Angsana New"/>
+        <a:font script="Ethi" typeface="Nyala"/>
+        <a:font script="Beng" typeface="Vrinda"/>
+        <a:font script="Gujr" typeface="Shruti"/>
+        <a:font script="Khmr" typeface="MoolBoran"/>
+        <a:font script="Knda" typeface="Tunga"/>
+        <a:font script="Guru" typeface="Raavi"/>
+        <a:font script="Cans" typeface="Euphemia"/>
+        <a:font script="Cher" typeface="Plantagenet Cherokee"/>
+        <a:font script="Yiii" typeface="Microsoft Yi Baiti"/>
+        <a:font script="Tibt" typeface="Microsoft Himalaya"/>
+        <a:font script="Thaa" typeface="MV Boli"/>
+        <a:font script="Deva" typeface="Mangal"/>
+        <a:font script="Telu" typeface="Gautami"/>
+        <a:font script="Taml" typeface="Latha"/>
+        <a:font script="Syrc" typeface="Estrangelo Edessa"/>
+        <a:font script="Orya" typeface="Kalinga"/>
+        <a:font script="Mlym" typeface="Kartika"/>
+        <a:font script="Laoo" typeface="DokChampa"/>
+        <a:font script="Sinh" typeface="Iskoola Pota"/>
+        <a:font script="Mong" typeface="Mongolian Baiti"/>
+        <a:font script="Viet" typeface="Times New Roman"/>
+        <a:font script="Uigh" typeface="Microsoft Uighur"/>
+        <a:font script="Geor" typeface="Sylfaen"/>
+      </a:majorFont>
+      <a:minorFont>
+        <a:latin typeface="Calibri"/>
+        <a:ea typeface=""/>
+        <a:cs typeface=""/>
+        <a:font script="Jpan" typeface="ＭＳ Ｐゴシック"/>
+        <a:font script="Hang" typeface="맑은 고딕"/>
+        <a:font script="Hans" typeface="宋体"/>
+        <a:font script="Hant" typeface="新細明體"/>
+        <a:font script="Arab" typeface="Arial"/>
+        <a:font script="Hebr" typeface="Arial"/>
+        <a:font script="Thai" typeface="Cordia New"/>
+        <a:font script="Ethi" typeface="Nyala"/>
+        <a:font script="Beng" typeface="Vrinda"/>
+        <a:font script="Gujr" typeface="Shruti"/>
+        <a:font script="Khmr" typeface="DaunPenh"/>
+        <a:font script="Knda" typeface="Tunga"/>
+        <a:font script="Guru" typeface="Raavi"/>
+        <a:font script="Cans" typeface="Euphemia"/>
+        <a:font script="Cher" typeface="Plantagenet Cherokee"/>
+        <a:font script="Yiii" typeface="Microsoft Yi Baiti"/>
+        <a:font script="Tibt" typeface="Microsoft Himalaya"/>
+        <a:font script="Thaa" typeface="MV Boli"/>
+        <a:font script="Deva" typeface="Mangal"/>
+        <a:font script="Telu" typeface="Gautami"/>
+        <a:font script="Taml" typeface="Latha"/>
+        <a:font script="Syrc" typeface="Estrangelo Edessa"/>
+        <a:font script="Orya" typeface="Kalinga"/>
+        <a:font script="Mlym" typeface="Kartika"/>
+        <a:font script="Laoo" typeface="DokChampa"/>
+        <a:font script="Sinh" typeface="Iskoola Pota"/>
+        <a:font script="Mong" typeface="Mongolian Baiti"/>
+        <a:font script="Viet" typeface="Arial"/>
+        <a:font script="Uigh" typeface="Microsoft Uighur"/>
+        <a:font script="Geor" typeface="Sylfaen"/>
+      </a:minorFont>
+    </a:fontScheme>
+    <a:fmtScheme name="Office">
+      <a:fillStyleLst>
+        <a:solidFill>
+          <a:schemeClr val="phClr"/>
+        </a:solidFill>
+        <a:gradFill rotWithShape="1">
+          <a:gsLst>
+            <a:gs pos="0">
+              <a:schemeClr val="phClr">
+                <a:tint val="50000"/>
+                <a:satMod val="300000"/>
+              </a:schemeClr>
+            </a:gs>
+            <a:gs pos="35000">
+              <a:schemeClr val="phClr">
+                <a:tint val="37000"/>
+                <a:satMod val="300000"/>
+              </a:schemeClr>
+            </a:gs>
+            <a:gs pos="100000">
+              <a:schemeClr val="phClr">
+                <a:tint val="15000"/>
+                <a:satMod val="350000"/>
+              </a:schemeClr>
+            </a:gs>
+          </a:gsLst>
+          <a:lin ang="16200000" scaled="1"/>
+        </a:gradFill>
+        <a:gradFill rotWithShape="1">
+          <a:gsLst>
+            <a:gs pos="0">
+              <a:schemeClr val="phClr">
+                <a:shade val="51000"/>
+                <a:satMod val="130000"/>
+              </a:schemeClr>
+            </a:gs>
+            <a:gs pos="80000">
+              <a:schemeClr val="phClr">
+                <a:shade val="93000"/>
+                <a:satMod val="130000"/>
+              </a:schemeClr>
+            </a:gs>
+            <a:gs pos="100000">
+              <a:schemeClr val="phClr">
+                <a:shade val="94000"/>
+                <a:satMod val="135000"/>
+              </a:schemeClr>
+            </a:gs>
+          </a:gsLst>
+          <a:lin ang="16200000" scaled="0"/>
+        </a:gradFill>
+      </a:fillStyleLst>
+      <a:lnStyleLst>
+        <a:ln w="9525" cap="flat" cmpd="sng" algn="ctr">
+          <a:solidFill>
+            <a:schemeClr val="phClr">
+              <a:shade val="95000"/>
+              <a:satMod val="105000"/>
+            </a:schemeClr>
+          </a:solidFill>
+          <a:prstDash val="solid"/>
+        </a:ln>
+        <a:ln w="25400" cap="flat" cmpd="sng" algn="ctr">
+          <a:solidFill>
+            <a:schemeClr val="phClr"/>
+          </a:solidFill>
+          <a:prstDash val="solid"/>
+        </a:ln>
+        <a:ln w="38100" cap="flat" cmpd="sng" algn="ctr">
+          <a:solidFill>
+            <a:schemeClr val="phClr"/>
+          </a:solidFill>
+          <a:prstDash val="solid"/>
+        </a:ln>
+      </a:lnStyleLst>
+      <a:effectStyleLst>
+        <a:effectStyle>
+          <a:effectLst>
+            <a:outerShdw blurRad="40000" dist="20000" dir="5400000" rotWithShape="0">
+              <a:srgbClr val="000000">
+                <a:alpha val="38000"/>
+              </a:srgbClr>
+            </a:outerShdw>
+          </a:effectLst>
+        </a:effectStyle>
+        <a:effectStyle>
+          <a:effectLst>
+            <a:outerShdw blurRad="40000" dist="23000" dir="5400000" rotWithShape="0">
+              <a:srgbClr val="000000">
+                <a:alpha val="35000"/>
+              </a:srgbClr>
+            </a:outerShdw>
+          </a:effectLst>
+        </a:effectStyle>
+        <a:effectStyle>
+          <a:effectLst>
+            <a:outerShdw blurRad="40000" dist="23000" dir="5400000" rotWithShape="0">
+              <a:srgbClr val="000000">
+                <a:alpha val="35000"/>
+              </a:srgbClr>
+            </a:outerShdw>
+          </a:effectLst>
+          <a:scene3d>
+            <a:camera prst="orthographicFront">
+              <a:rot lat="0" lon="0" rev="0"/>
+            </a:camera>
+            <a:lightRig rig="threePt" dir="t">
+              <a:rot lat="0" lon="0" rev="1200000"/>
+            </a:lightRig>
+          </a:scene3d>
+          <a:sp3d>
+            <a:bevelT w="63500" h="25400"/>
+          </a:sp3d>
+        </a:effectStyle>
+      </a:effectStyleLst>
+      <a:bgFillStyleLst>
+        <a:solidFill>
+          <a:schemeClr val="phClr"/>
+        </a:solidFill>
+        <a:gradFill rotWithShape="1">
+          <a:gsLst>
+            <a:gs pos="0">
+              <a:schemeClr val="phClr">
+                <a:tint val="40000"/>
+                <a:satMod val="350000"/>
+              </a:schemeClr>
+            </a:gs>
+            <a:gs pos="40000">
+              <a:schemeClr val="phClr">
+                <a:tint val="45000"/>
+                <a:shade val="99000"/>
+                <a:satMod val="350000"/>
+              </a:schemeClr>
+            </a:gs>
+            <a:gs pos="100000">
+              <a:schemeClr val="phClr">
+                <a:shade val="20000"/>
+                <a:satMod val="255000"/>
+              </a:schemeClr>
+            </a:gs>
+          </a:gsLst>
+          <a:path path="circle">
+            <a:fillToRect l="50000" t="-80000" r="50000" b="180000"/>
+          </a:path>
+        </a:gradFill>
+        <a:gradFill rotWithShape="1">
+          <a:gsLst>
+            <a:gs pos="0">
+              <a:schemeClr val="phClr">
+                <a:tint val="80000"/>
+                <a:satMod val="300000"/>
+              </a:schemeClr>
+            </a:gs>
+            <a:gs pos="100000">
+              <a:schemeClr val="phClr">
+                <a:shade val="30000"/>
+                <a:satMod val="200000"/>
+              </a:schemeClr>
+            </a:gs>
+          </a:gsLst>
+          <a:path path="circle">
+            <a:fillToRect l="50000" t="50000" r="50000" b="50000"/>
+          </a:path>
+        </a:gradFill>
+      </a:bgFillStyleLst>
+    </a:fmtScheme>
+  </a:themeElements>
+  <a:objectDefaults/>
+  <a:extraClrSchemeLst/>
+</a:theme>
 </file>
</xml_diff>

<commit_message>
Update user needs table
</commit_message>
<xml_diff>
--- a/docs/presentation.pptx
+++ b/docs/presentation.pptx
@@ -4604,7 +4604,19 @@
               <a:rPr lang="en-GB" dirty="0" smtClean="0">
                 <a:latin typeface="Lucida Sans" pitchFamily="34" charset="0"/>
               </a:rPr>
-              <a:t>-themed discussion forum.</a:t>
+              <a:t> </a:t>
+            </a:r>
+            <a:r>
+              <a:rPr lang="en-GB" dirty="0" smtClean="0">
+                <a:latin typeface="Lucida Sans" pitchFamily="34" charset="0"/>
+              </a:rPr>
+              <a:t>themed </a:t>
+            </a:r>
+            <a:r>
+              <a:rPr lang="en-GB" dirty="0" smtClean="0">
+                <a:latin typeface="Lucida Sans" pitchFamily="34" charset="0"/>
+              </a:rPr>
+              <a:t>discussion forum.</a:t>
             </a:r>
           </a:p>
           <a:p>
@@ -4637,7 +4649,19 @@
               <a:rPr lang="en-GB" dirty="0" smtClean="0">
                 <a:latin typeface="Lucida Sans" pitchFamily="34" charset="0"/>
               </a:rPr>
-              <a:t>Reserved tags for universities, special groups. TODO?: Users have to be verified/accepted to post in these groups.</a:t>
+              <a:t>Reserved tags for universities, special </a:t>
+            </a:r>
+            <a:r>
+              <a:rPr lang="en-GB" dirty="0" smtClean="0">
+                <a:latin typeface="Lucida Sans" pitchFamily="34" charset="0"/>
+              </a:rPr>
+              <a:t>groups. Users </a:t>
+            </a:r>
+            <a:r>
+              <a:rPr lang="en-GB" dirty="0" smtClean="0">
+                <a:latin typeface="Lucida Sans" pitchFamily="34" charset="0"/>
+              </a:rPr>
+              <a:t>have to be verified/accepted to post in these groups.</a:t>
             </a:r>
           </a:p>
           <a:p>
@@ -5424,7 +5448,13 @@
               <a:rPr lang="en-GB" dirty="0" smtClean="0">
                 <a:latin typeface="Lucida Sans" pitchFamily="34" charset="0"/>
               </a:rPr>
-              <a:t>User Needs Table TODO!</a:t>
+              <a:t>User Needs </a:t>
+            </a:r>
+            <a:r>
+              <a:rPr lang="en-GB" dirty="0" smtClean="0">
+                <a:latin typeface="Lucida Sans" pitchFamily="34" charset="0"/>
+              </a:rPr>
+              <a:t>Table</a:t>
             </a:r>
             <a:endParaRPr lang="en-GB" dirty="0">
               <a:latin typeface="Lucida Sans" pitchFamily="34" charset="0"/>
@@ -5448,7 +5478,7 @@
         </p:nvGraphicFramePr>
         <p:xfrm>
           <a:off x="467544" y="1412776"/>
-          <a:ext cx="8280920" cy="5184574"/>
+          <a:ext cx="8280920" cy="4347085"/>
         </p:xfrm>
         <a:graphic>
           <a:graphicData uri="http://schemas.openxmlformats.org/drawingml/2006/table">
@@ -5498,7 +5528,19 @@
                     <a:p>
                       <a:r>
                         <a:rPr lang="en-GB" sz="1400" dirty="0" smtClean="0"/>
-                        <a:t>Met?</a:t>
+                        <a:t>Is</a:t>
+                      </a:r>
+                      <a:r>
+                        <a:rPr lang="en-GB" sz="1400" baseline="0" dirty="0" smtClean="0"/>
+                        <a:t> it m</a:t>
+                      </a:r>
+                      <a:r>
+                        <a:rPr lang="en-GB" sz="1400" dirty="0" smtClean="0"/>
+                        <a:t>et</a:t>
+                      </a:r>
+                      <a:r>
+                        <a:rPr lang="en-GB" sz="1400" dirty="0" smtClean="0"/>
+                        <a:t>?</a:t>
                       </a:r>
                       <a:endParaRPr lang="en-GB" sz="1400" dirty="0"/>
                     </a:p>
@@ -5562,7 +5604,11 @@
                     <a:bodyPr/>
                     <a:lstStyle/>
                     <a:p>
-                      <a:endParaRPr lang="en-GB" sz="1400"/>
+                      <a:r>
+                        <a:rPr lang="en-GB" sz="1400" dirty="0" smtClean="0"/>
+                        <a:t>Yes</a:t>
+                      </a:r>
+                      <a:endParaRPr lang="en-GB" sz="1400" dirty="0"/>
                     </a:p>
                   </a:txBody>
                   <a:tcPr/>
@@ -5612,6 +5658,10 @@
                     <a:bodyPr/>
                     <a:lstStyle/>
                     <a:p>
+                      <a:r>
+                        <a:rPr lang="en-GB" sz="1400" dirty="0" smtClean="0"/>
+                        <a:t>Yes</a:t>
+                      </a:r>
                       <a:endParaRPr lang="en-GB" sz="1400" dirty="0"/>
                     </a:p>
                   </a:txBody>
@@ -5622,6 +5672,14 @@
                     <a:bodyPr/>
                     <a:lstStyle/>
                     <a:p>
+                      <a:r>
+                        <a:rPr lang="en-GB" sz="1400" dirty="0" smtClean="0"/>
+                        <a:t>Search bar/recommended</a:t>
+                      </a:r>
+                      <a:r>
+                        <a:rPr lang="en-GB" sz="1400" baseline="0" dirty="0" smtClean="0"/>
+                        <a:t> tags.</a:t>
+                      </a:r>
                       <a:endParaRPr lang="en-GB" sz="1400" dirty="0"/>
                     </a:p>
                   </a:txBody>
@@ -5666,6 +5724,10 @@
                     <a:bodyPr/>
                     <a:lstStyle/>
                     <a:p>
+                      <a:r>
+                        <a:rPr lang="en-GB" sz="1400" dirty="0" smtClean="0"/>
+                        <a:t>Yes</a:t>
+                      </a:r>
                       <a:endParaRPr lang="en-GB" sz="1400" dirty="0"/>
                     </a:p>
                   </a:txBody>
@@ -5678,7 +5740,11 @@
                     <a:p>
                       <a:r>
                         <a:rPr lang="en-GB" sz="1400" dirty="0" smtClean="0"/>
-                        <a:t>Unanswered/new questions view</a:t>
+                        <a:t>Unanswered/new questions </a:t>
+                      </a:r>
+                      <a:r>
+                        <a:rPr lang="en-GB" sz="1400" dirty="0" smtClean="0"/>
+                        <a:t>view.</a:t>
                       </a:r>
                       <a:endParaRPr lang="en-GB" sz="1400" dirty="0"/>
                     </a:p>
@@ -5720,6 +5786,10 @@
                     <a:bodyPr/>
                     <a:lstStyle/>
                     <a:p>
+                      <a:r>
+                        <a:rPr lang="en-GB" sz="1400" dirty="0" smtClean="0"/>
+                        <a:t>Yes</a:t>
+                      </a:r>
                       <a:endParaRPr lang="en-GB" sz="1400" dirty="0"/>
                     </a:p>
                   </a:txBody>
@@ -5733,72 +5803,6 @@
                       <a:r>
                         <a:rPr lang="en-GB" sz="1400" dirty="0" smtClean="0"/>
                         <a:t>Other users?</a:t>
-                      </a:r>
-                      <a:endParaRPr lang="en-GB" sz="1400" dirty="0"/>
-                    </a:p>
-                  </a:txBody>
-                  <a:tcPr/>
-                </a:tc>
-              </a:tr>
-              <a:tr h="837489">
-                <a:tc>
-                  <a:txBody>
-                    <a:bodyPr/>
-                    <a:lstStyle/>
-                    <a:p>
-                      <a:r>
-                        <a:rPr lang="en-GB" sz="1400" dirty="0" err="1" smtClean="0"/>
-                        <a:t>Trollo</a:t>
-                      </a:r>
-                      <a:endParaRPr lang="en-GB" sz="1400" dirty="0"/>
-                    </a:p>
-                  </a:txBody>
-                  <a:tcPr/>
-                </a:tc>
-                <a:tc>
-                  <a:txBody>
-                    <a:bodyPr/>
-                    <a:lstStyle/>
-                    <a:p>
-                      <a:r>
-                        <a:rPr lang="en-GB" sz="1400" dirty="0" smtClean="0"/>
-                        <a:t>To leave, be bored and unsatisfied</a:t>
-                      </a:r>
-                      <a:r>
-                        <a:rPr lang="en-GB" sz="1400" baseline="0" dirty="0" smtClean="0"/>
-                        <a:t> with BARK!</a:t>
-                      </a:r>
-                      <a:endParaRPr lang="en-GB" sz="1400" dirty="0"/>
-                    </a:p>
-                  </a:txBody>
-                  <a:tcPr/>
-                </a:tc>
-                <a:tc>
-                  <a:txBody>
-                    <a:bodyPr/>
-                    <a:lstStyle/>
-                    <a:p>
-                      <a:r>
-                        <a:rPr lang="en-GB" sz="1400" dirty="0" smtClean="0"/>
-                        <a:t>Of</a:t>
-                      </a:r>
-                      <a:r>
-                        <a:rPr lang="en-GB" sz="1400" baseline="0" dirty="0" smtClean="0"/>
-                        <a:t> course!</a:t>
-                      </a:r>
-                      <a:endParaRPr lang="en-GB" sz="1400" dirty="0"/>
-                    </a:p>
-                  </a:txBody>
-                  <a:tcPr/>
-                </a:tc>
-                <a:tc>
-                  <a:txBody>
-                    <a:bodyPr/>
-                    <a:lstStyle/>
-                    <a:p>
-                      <a:r>
-                        <a:rPr lang="en-GB" sz="1400" dirty="0" smtClean="0"/>
-                        <a:t>Moderators/admins monitoring website</a:t>
                       </a:r>
                       <a:endParaRPr lang="en-GB" sz="1400" dirty="0"/>
                     </a:p>

</xml_diff>

<commit_message>
Added mockups to powerpoint
will need update when mockups are updated to include obvious search
feature
</commit_message>
<xml_diff>
--- a/docs/presentation.pptx
+++ b/docs/presentation.pptx
@@ -5,7 +5,7 @@
     <p:sldMasterId id="2147483660" r:id="rId1"/>
   </p:sldMasterIdLst>
   <p:notesMasterIdLst>
-    <p:notesMasterId r:id="rId11"/>
+    <p:notesMasterId r:id="rId13"/>
   </p:notesMasterIdLst>
   <p:sldIdLst>
     <p:sldId id="256" r:id="rId2"/>
@@ -17,6 +17,8 @@
     <p:sldId id="259" r:id="rId8"/>
     <p:sldId id="260" r:id="rId9"/>
     <p:sldId id="261" r:id="rId10"/>
+    <p:sldId id="265" r:id="rId11"/>
+    <p:sldId id="266" r:id="rId12"/>
   </p:sldIdLst>
   <p:sldSz cx="9144000" cy="6858000" type="screen4x3"/>
   <p:notesSz cx="6858000" cy="9144000"/>
@@ -117,7 +119,7 @@
   </p:defaultTextStyle>
   <p:extLst>
     <p:ext uri="{EFAFB233-063F-42B5-8137-9DF3F51BA10A}">
-      <p15:sldGuideLst xmlns="" xmlns:p15="http://schemas.microsoft.com/office/powerpoint/2012/main">
+      <p15:sldGuideLst xmlns:p15="http://schemas.microsoft.com/office/powerpoint/2012/main">
         <p15:guide id="1" orient="horz" pos="2160">
           <p15:clr>
             <a:srgbClr val="A4A3A4"/>
@@ -405,7 +407,7 @@
     </p:spTree>
     <p:extLst>
       <p:ext uri="{BB962C8B-B14F-4D97-AF65-F5344CB8AC3E}">
-        <p14:creationId xmlns:p14="http://schemas.microsoft.com/office/powerpoint/2010/main" xmlns="" val="3209695932"/>
+        <p14:creationId xmlns:p14="http://schemas.microsoft.com/office/powerpoint/2010/main" val="3209695932"/>
       </p:ext>
     </p:extLst>
   </p:cSld>
@@ -549,30 +551,6 @@
           <a:bodyPr/>
           <a:lstStyle/>
           <a:p>
-            <a:r>
-              <a:rPr lang="en-GB" dirty="0" smtClean="0">
-                <a:latin typeface="Lucida Sans" pitchFamily="34" charset="0"/>
-              </a:rPr>
-              <a:t>Jim can go onto our website and search for the tags @python and @dictionary </a:t>
-            </a:r>
-          </a:p>
-          <a:p>
-            <a:r>
-              <a:rPr lang="en-GB" dirty="0" smtClean="0">
-                <a:latin typeface="Lucida Sans" pitchFamily="34" charset="0"/>
-              </a:rPr>
-              <a:t>He’ll also search for post from his own University by using the special @bristol.ac.uk tag.</a:t>
-            </a:r>
-          </a:p>
-          <a:p>
-            <a:r>
-              <a:rPr lang="en-GB" dirty="0" smtClean="0">
-                <a:latin typeface="Lucida Sans" pitchFamily="34" charset="0"/>
-              </a:rPr>
-              <a:t>The combination of tags leads him to posts from other people in his course who are struggling with the same things and so can quickly find an answer!</a:t>
-            </a:r>
-          </a:p>
-          <a:p>
             <a:endParaRPr lang="en-GB" dirty="0"/>
           </a:p>
         </p:txBody>
@@ -595,7 +573,7 @@
             <a:fld id="{801CE7F8-BC30-4FF3-AC28-1053AB04805F}" type="slidenum">
               <a:rPr lang="en-GB" smtClean="0"/>
               <a:pPr/>
-              <a:t>4</a:t>
+              <a:t>1</a:t>
             </a:fld>
             <a:endParaRPr lang="en-GB"/>
           </a:p>
@@ -604,7 +582,7 @@
     </p:spTree>
     <p:extLst>
       <p:ext uri="{BB962C8B-B14F-4D97-AF65-F5344CB8AC3E}">
-        <p14:creationId xmlns:p14="http://schemas.microsoft.com/office/powerpoint/2010/main" xmlns="" val="3257369482"/>
+        <p14:creationId xmlns:p14="http://schemas.microsoft.com/office/powerpoint/2010/main" val="912348835"/>
       </p:ext>
     </p:extLst>
   </p:cSld>
@@ -659,6 +637,115 @@
           <a:lstStyle/>
           <a:p>
             <a:r>
+              <a:rPr lang="en-GB" dirty="0" smtClean="0">
+                <a:latin typeface="Lucida Sans" pitchFamily="34" charset="0"/>
+              </a:rPr>
+              <a:t>Jim can go onto our website and search for the tags @python and @dictionary </a:t>
+            </a:r>
+          </a:p>
+          <a:p>
+            <a:r>
+              <a:rPr lang="en-GB" dirty="0" smtClean="0">
+                <a:latin typeface="Lucida Sans" pitchFamily="34" charset="0"/>
+              </a:rPr>
+              <a:t>He’ll also search for post from his own University by using the special @bristol.ac.uk tag.</a:t>
+            </a:r>
+          </a:p>
+          <a:p>
+            <a:r>
+              <a:rPr lang="en-GB" dirty="0" smtClean="0">
+                <a:latin typeface="Lucida Sans" pitchFamily="34" charset="0"/>
+              </a:rPr>
+              <a:t>The combination of tags leads him to posts from other people in his course who are struggling with the same things and so can quickly find an answer!</a:t>
+            </a:r>
+          </a:p>
+          <a:p>
+            <a:endParaRPr lang="en-GB" dirty="0"/>
+          </a:p>
+        </p:txBody>
+      </p:sp>
+      <p:sp>
+        <p:nvSpPr>
+          <p:cNvPr id="4" name="Slide Number Placeholder 3"/>
+          <p:cNvSpPr>
+            <a:spLocks noGrp="1"/>
+          </p:cNvSpPr>
+          <p:nvPr>
+            <p:ph type="sldNum" sz="quarter" idx="10"/>
+          </p:nvPr>
+        </p:nvSpPr>
+        <p:spPr/>
+        <p:txBody>
+          <a:bodyPr/>
+          <a:lstStyle/>
+          <a:p>
+            <a:fld id="{801CE7F8-BC30-4FF3-AC28-1053AB04805F}" type="slidenum">
+              <a:rPr lang="en-GB" smtClean="0"/>
+              <a:pPr/>
+              <a:t>4</a:t>
+            </a:fld>
+            <a:endParaRPr lang="en-GB"/>
+          </a:p>
+        </p:txBody>
+      </p:sp>
+    </p:spTree>
+    <p:extLst>
+      <p:ext uri="{BB962C8B-B14F-4D97-AF65-F5344CB8AC3E}">
+        <p14:creationId xmlns:p14="http://schemas.microsoft.com/office/powerpoint/2010/main" val="3257369482"/>
+      </p:ext>
+    </p:extLst>
+  </p:cSld>
+  <p:clrMapOvr>
+    <a:masterClrMapping/>
+  </p:clrMapOvr>
+</p:notes>
+</file>
+
+<file path=ppt/notesSlides/notesSlide3.xml><?xml version="1.0" encoding="utf-8"?>
+<p:notes xmlns:a="http://schemas.openxmlformats.org/drawingml/2006/main" xmlns:r="http://schemas.openxmlformats.org/officeDocument/2006/relationships" xmlns:p="http://schemas.openxmlformats.org/presentationml/2006/main">
+  <p:cSld>
+    <p:spTree>
+      <p:nvGrpSpPr>
+        <p:cNvPr id="1" name=""/>
+        <p:cNvGrpSpPr/>
+        <p:nvPr/>
+      </p:nvGrpSpPr>
+      <p:grpSpPr>
+        <a:xfrm>
+          <a:off x="0" y="0"/>
+          <a:ext cx="0" cy="0"/>
+          <a:chOff x="0" y="0"/>
+          <a:chExt cx="0" cy="0"/>
+        </a:xfrm>
+      </p:grpSpPr>
+      <p:sp>
+        <p:nvSpPr>
+          <p:cNvPr id="2" name="Slide Image Placeholder 1"/>
+          <p:cNvSpPr>
+            <a:spLocks noGrp="1" noRot="1" noChangeAspect="1"/>
+          </p:cNvSpPr>
+          <p:nvPr>
+            <p:ph type="sldImg"/>
+          </p:nvPr>
+        </p:nvSpPr>
+        <p:spPr/>
+      </p:sp>
+      <p:sp>
+        <p:nvSpPr>
+          <p:cNvPr id="3" name="Notes Placeholder 2"/>
+          <p:cNvSpPr>
+            <a:spLocks noGrp="1"/>
+          </p:cNvSpPr>
+          <p:nvPr>
+            <p:ph type="body" idx="1"/>
+          </p:nvPr>
+        </p:nvSpPr>
+        <p:spPr/>
+        <p:txBody>
+          <a:bodyPr/>
+          <a:lstStyle/>
+          <a:p>
+            <a:r>
               <a:rPr lang="en-GB" dirty="0" smtClean="0"/>
               <a:t>He can browse BARK! for programming tags e.g. @java and look for unanswered questions in which he can answer. Many students would appreciate it. He gets a buzz out of answering questions and enjoys a large "score", as many people find his answers helpful.</a:t>
             </a:r>
@@ -693,7 +780,7 @@
     </p:spTree>
     <p:extLst>
       <p:ext uri="{BB962C8B-B14F-4D97-AF65-F5344CB8AC3E}">
-        <p14:creationId xmlns:p14="http://schemas.microsoft.com/office/powerpoint/2010/main" xmlns="" val="1032398851"/>
+        <p14:creationId xmlns:p14="http://schemas.microsoft.com/office/powerpoint/2010/main" val="1032398851"/>
       </p:ext>
     </p:extLst>
   </p:cSld>
@@ -4485,7 +4572,7 @@
           <p:nvPr/>
         </p:nvPicPr>
         <p:blipFill>
-          <a:blip r:embed="rId2" cstate="print"/>
+          <a:blip r:embed="rId3" cstate="print"/>
           <a:srcRect/>
           <a:stretch>
             <a:fillRect/>
@@ -4505,7 +4592,245 @@
     </p:spTree>
     <p:extLst>
       <p:ext uri="{BB962C8B-B14F-4D97-AF65-F5344CB8AC3E}">
-        <p14:creationId xmlns:p14="http://schemas.microsoft.com/office/powerpoint/2010/main" xmlns="" val="2689682241"/>
+        <p14:creationId xmlns:p14="http://schemas.microsoft.com/office/powerpoint/2010/main" val="2689682241"/>
+      </p:ext>
+    </p:extLst>
+  </p:cSld>
+  <p:clrMapOvr>
+    <a:masterClrMapping/>
+  </p:clrMapOvr>
+  <p:timing>
+    <p:tnLst>
+      <p:par>
+        <p:cTn id="1" dur="indefinite" restart="never" nodeType="tmRoot"/>
+      </p:par>
+    </p:tnLst>
+  </p:timing>
+</p:sld>
+</file>
+
+<file path=ppt/slides/slide10.xml><?xml version="1.0" encoding="utf-8"?>
+<p:sld xmlns:a="http://schemas.openxmlformats.org/drawingml/2006/main" xmlns:r="http://schemas.openxmlformats.org/officeDocument/2006/relationships" xmlns:p="http://schemas.openxmlformats.org/presentationml/2006/main">
+  <p:cSld>
+    <p:spTree>
+      <p:nvGrpSpPr>
+        <p:cNvPr id="1" name=""/>
+        <p:cNvGrpSpPr/>
+        <p:nvPr/>
+      </p:nvGrpSpPr>
+      <p:grpSpPr>
+        <a:xfrm>
+          <a:off x="0" y="0"/>
+          <a:ext cx="0" cy="0"/>
+          <a:chOff x="0" y="0"/>
+          <a:chExt cx="0" cy="0"/>
+        </a:xfrm>
+      </p:grpSpPr>
+      <p:sp>
+        <p:nvSpPr>
+          <p:cNvPr id="2" name="Title 1"/>
+          <p:cNvSpPr>
+            <a:spLocks noGrp="1"/>
+          </p:cNvSpPr>
+          <p:nvPr>
+            <p:ph type="title"/>
+          </p:nvPr>
+        </p:nvSpPr>
+        <p:spPr/>
+        <p:txBody>
+          <a:bodyPr/>
+          <a:lstStyle/>
+          <a:p>
+            <a:r>
+              <a:rPr lang="en-GB" dirty="0" smtClean="0">
+                <a:latin typeface="Lucida Sans" pitchFamily="34" charset="0"/>
+              </a:rPr>
+              <a:t>Wireframes – logged in homepage</a:t>
+            </a:r>
+            <a:endParaRPr lang="en-GB" dirty="0">
+              <a:latin typeface="Lucida Sans" pitchFamily="34" charset="0"/>
+            </a:endParaRPr>
+          </a:p>
+        </p:txBody>
+      </p:sp>
+      <p:pic>
+        <p:nvPicPr>
+          <p:cNvPr id="4" name="Content Placeholder 3"/>
+          <p:cNvPicPr>
+            <a:picLocks noGrp="1" noChangeAspect="1"/>
+          </p:cNvPicPr>
+          <p:nvPr>
+            <p:ph sz="quarter" idx="1"/>
+          </p:nvPr>
+        </p:nvPicPr>
+        <p:blipFill>
+          <a:blip r:embed="rId2">
+            <a:extLst>
+              <a:ext uri="{28A0092B-C50C-407E-A947-70E740481C1C}">
+                <a14:useLocalDpi xmlns:a14="http://schemas.microsoft.com/office/drawing/2010/main" val="0"/>
+              </a:ext>
+            </a:extLst>
+          </a:blip>
+          <a:stretch>
+            <a:fillRect/>
+          </a:stretch>
+        </p:blipFill>
+        <p:spPr>
+          <a:xfrm>
+            <a:off x="107009" y="1319680"/>
+            <a:ext cx="9069457" cy="4269559"/>
+          </a:xfrm>
+        </p:spPr>
+      </p:pic>
+      <p:pic>
+        <p:nvPicPr>
+          <p:cNvPr id="5" name="Picture 2" descr="H:\studeso\styling\images\akita.png"/>
+          <p:cNvPicPr>
+            <a:picLocks noChangeAspect="1" noChangeArrowheads="1"/>
+          </p:cNvPicPr>
+          <p:nvPr/>
+        </p:nvPicPr>
+        <p:blipFill>
+          <a:blip r:embed="rId3" cstate="print"/>
+          <a:srcRect/>
+          <a:stretch>
+            <a:fillRect/>
+          </a:stretch>
+        </p:blipFill>
+        <p:spPr bwMode="auto">
+          <a:xfrm flipH="1">
+            <a:off x="7559824" y="0"/>
+            <a:ext cx="1584176" cy="1475656"/>
+          </a:xfrm>
+          <a:prstGeom prst="rect">
+            <a:avLst/>
+          </a:prstGeom>
+          <a:noFill/>
+        </p:spPr>
+      </p:pic>
+    </p:spTree>
+    <p:extLst>
+      <p:ext uri="{BB962C8B-B14F-4D97-AF65-F5344CB8AC3E}">
+        <p14:creationId xmlns:p14="http://schemas.microsoft.com/office/powerpoint/2010/main" val="2500783131"/>
+      </p:ext>
+    </p:extLst>
+  </p:cSld>
+  <p:clrMapOvr>
+    <a:masterClrMapping/>
+  </p:clrMapOvr>
+  <p:timing>
+    <p:tnLst>
+      <p:par>
+        <p:cTn id="1" dur="indefinite" restart="never" nodeType="tmRoot"/>
+      </p:par>
+    </p:tnLst>
+  </p:timing>
+</p:sld>
+</file>
+
+<file path=ppt/slides/slide11.xml><?xml version="1.0" encoding="utf-8"?>
+<p:sld xmlns:a="http://schemas.openxmlformats.org/drawingml/2006/main" xmlns:r="http://schemas.openxmlformats.org/officeDocument/2006/relationships" xmlns:p="http://schemas.openxmlformats.org/presentationml/2006/main">
+  <p:cSld>
+    <p:spTree>
+      <p:nvGrpSpPr>
+        <p:cNvPr id="1" name=""/>
+        <p:cNvGrpSpPr/>
+        <p:nvPr/>
+      </p:nvGrpSpPr>
+      <p:grpSpPr>
+        <a:xfrm>
+          <a:off x="0" y="0"/>
+          <a:ext cx="0" cy="0"/>
+          <a:chOff x="0" y="0"/>
+          <a:chExt cx="0" cy="0"/>
+        </a:xfrm>
+      </p:grpSpPr>
+      <p:sp>
+        <p:nvSpPr>
+          <p:cNvPr id="2" name="Title 1"/>
+          <p:cNvSpPr>
+            <a:spLocks noGrp="1"/>
+          </p:cNvSpPr>
+          <p:nvPr>
+            <p:ph type="title"/>
+          </p:nvPr>
+        </p:nvSpPr>
+        <p:spPr/>
+        <p:txBody>
+          <a:bodyPr/>
+          <a:lstStyle/>
+          <a:p>
+            <a:r>
+              <a:rPr lang="en-GB" dirty="0" smtClean="0">
+                <a:latin typeface="Lucida Sans" pitchFamily="34" charset="0"/>
+              </a:rPr>
+              <a:t>Wireframes – post view</a:t>
+            </a:r>
+            <a:endParaRPr lang="en-GB" dirty="0">
+              <a:latin typeface="Lucida Sans" pitchFamily="34" charset="0"/>
+            </a:endParaRPr>
+          </a:p>
+        </p:txBody>
+      </p:sp>
+      <p:pic>
+        <p:nvPicPr>
+          <p:cNvPr id="4" name="Content Placeholder 3"/>
+          <p:cNvPicPr>
+            <a:picLocks noGrp="1" noChangeAspect="1"/>
+          </p:cNvPicPr>
+          <p:nvPr>
+            <p:ph sz="quarter" idx="1"/>
+          </p:nvPr>
+        </p:nvPicPr>
+        <p:blipFill>
+          <a:blip r:embed="rId2">
+            <a:extLst>
+              <a:ext uri="{28A0092B-C50C-407E-A947-70E740481C1C}">
+                <a14:useLocalDpi xmlns:a14="http://schemas.microsoft.com/office/drawing/2010/main" val="0"/>
+              </a:ext>
+            </a:extLst>
+          </a:blip>
+          <a:stretch>
+            <a:fillRect/>
+          </a:stretch>
+        </p:blipFill>
+        <p:spPr>
+          <a:xfrm>
+            <a:off x="122879" y="1260552"/>
+            <a:ext cx="9070623" cy="4256680"/>
+          </a:xfrm>
+        </p:spPr>
+      </p:pic>
+      <p:pic>
+        <p:nvPicPr>
+          <p:cNvPr id="5" name="Picture 2" descr="H:\studeso\styling\images\akita.png"/>
+          <p:cNvPicPr>
+            <a:picLocks noChangeAspect="1" noChangeArrowheads="1"/>
+          </p:cNvPicPr>
+          <p:nvPr/>
+        </p:nvPicPr>
+        <p:blipFill>
+          <a:blip r:embed="rId3" cstate="print"/>
+          <a:srcRect/>
+          <a:stretch>
+            <a:fillRect/>
+          </a:stretch>
+        </p:blipFill>
+        <p:spPr bwMode="auto">
+          <a:xfrm flipH="1">
+            <a:off x="7559824" y="0"/>
+            <a:ext cx="1584176" cy="1475656"/>
+          </a:xfrm>
+          <a:prstGeom prst="rect">
+            <a:avLst/>
+          </a:prstGeom>
+          <a:noFill/>
+        </p:spPr>
+      </p:pic>
+    </p:spTree>
+    <p:extLst>
+      <p:ext uri="{BB962C8B-B14F-4D97-AF65-F5344CB8AC3E}">
+        <p14:creationId xmlns:p14="http://schemas.microsoft.com/office/powerpoint/2010/main" val="2121058436"/>
       </p:ext>
     </p:extLst>
   </p:cSld>
@@ -4604,19 +4929,7 @@
               <a:rPr lang="en-GB" dirty="0" smtClean="0">
                 <a:latin typeface="Lucida Sans" pitchFamily="34" charset="0"/>
               </a:rPr>
-              <a:t> </a:t>
-            </a:r>
-            <a:r>
-              <a:rPr lang="en-GB" dirty="0" smtClean="0">
-                <a:latin typeface="Lucida Sans" pitchFamily="34" charset="0"/>
-              </a:rPr>
-              <a:t>themed </a:t>
-            </a:r>
-            <a:r>
-              <a:rPr lang="en-GB" dirty="0" smtClean="0">
-                <a:latin typeface="Lucida Sans" pitchFamily="34" charset="0"/>
-              </a:rPr>
-              <a:t>discussion forum.</a:t>
+              <a:t> themed discussion forum.</a:t>
             </a:r>
           </a:p>
           <a:p>
@@ -4649,19 +4962,7 @@
               <a:rPr lang="en-GB" dirty="0" smtClean="0">
                 <a:latin typeface="Lucida Sans" pitchFamily="34" charset="0"/>
               </a:rPr>
-              <a:t>Reserved tags for universities, special </a:t>
-            </a:r>
-            <a:r>
-              <a:rPr lang="en-GB" dirty="0" smtClean="0">
-                <a:latin typeface="Lucida Sans" pitchFamily="34" charset="0"/>
-              </a:rPr>
-              <a:t>groups. Users </a:t>
-            </a:r>
-            <a:r>
-              <a:rPr lang="en-GB" dirty="0" smtClean="0">
-                <a:latin typeface="Lucida Sans" pitchFamily="34" charset="0"/>
-              </a:rPr>
-              <a:t>have to be verified/accepted to post in these groups.</a:t>
+              <a:t>Reserved tags for universities, special groups. Users have to be verified/accepted to post in these groups.</a:t>
             </a:r>
           </a:p>
           <a:p>
@@ -4713,7 +5014,7 @@
     </p:spTree>
     <p:extLst>
       <p:ext uri="{BB962C8B-B14F-4D97-AF65-F5344CB8AC3E}">
-        <p14:creationId xmlns:p14="http://schemas.microsoft.com/office/powerpoint/2010/main" xmlns="" val="1822052854"/>
+        <p14:creationId xmlns:p14="http://schemas.microsoft.com/office/powerpoint/2010/main" val="1822052854"/>
       </p:ext>
     </p:extLst>
   </p:cSld>
@@ -4931,7 +5232,7 @@
     </p:spTree>
     <p:extLst>
       <p:ext uri="{BB962C8B-B14F-4D97-AF65-F5344CB8AC3E}">
-        <p14:creationId xmlns:p14="http://schemas.microsoft.com/office/powerpoint/2010/main" xmlns="" val="832151694"/>
+        <p14:creationId xmlns:p14="http://schemas.microsoft.com/office/powerpoint/2010/main" val="832151694"/>
       </p:ext>
     </p:extLst>
   </p:cSld>
@@ -5005,24 +5306,19 @@
         <p:spPr/>
         <p:txBody>
           <a:bodyPr>
-            <a:normAutofit fontScale="92500" lnSpcReduction="10000"/>
+            <a:normAutofit lnSpcReduction="10000"/>
           </a:bodyPr>
           <a:lstStyle/>
           <a:p>
             <a:r>
-              <a:rPr lang="en-GB" dirty="0" smtClean="0">
+              <a:rPr lang="en-GB" b="1" dirty="0" smtClean="0">
                 <a:latin typeface="Lucida Sans" pitchFamily="34" charset="0"/>
               </a:rPr>
-              <a:t>Name: Jim</a:t>
-            </a:r>
-          </a:p>
-          <a:p>
-            <a:r>
-              <a:rPr lang="en-GB" dirty="0" smtClean="0">
-                <a:latin typeface="Lucida Sans" pitchFamily="34" charset="0"/>
-              </a:rPr>
-              <a:t>Age: 17</a:t>
-            </a:r>
+              <a:t>Jim, 17</a:t>
+            </a:r>
+            <a:endParaRPr lang="en-GB" b="1" dirty="0" smtClean="0">
+              <a:latin typeface="Lucida Sans" pitchFamily="34" charset="0"/>
+            </a:endParaRPr>
           </a:p>
           <a:p>
             <a:r>
@@ -5153,7 +5449,7 @@
           <a:blip r:embed="rId4" cstate="print">
             <a:extLst>
               <a:ext uri="{28A0092B-C50C-407E-A947-70E740481C1C}">
-                <a14:useLocalDpi xmlns:a14="http://schemas.microsoft.com/office/drawing/2010/main" xmlns="" val="0"/>
+                <a14:useLocalDpi xmlns:a14="http://schemas.microsoft.com/office/drawing/2010/main" val="0"/>
               </a:ext>
             </a:extLst>
           </a:blip>
@@ -5163,8 +5459,8 @@
         </p:blipFill>
         <p:spPr>
           <a:xfrm>
-            <a:off x="4282516" y="1196752"/>
-            <a:ext cx="3657600" cy="2438400"/>
+            <a:off x="4788024" y="1210678"/>
+            <a:ext cx="3320988" cy="2213992"/>
           </a:xfrm>
           <a:prstGeom prst="rect">
             <a:avLst/>
@@ -5174,7 +5470,7 @@
     </p:spTree>
     <p:extLst>
       <p:ext uri="{BB962C8B-B14F-4D97-AF65-F5344CB8AC3E}">
-        <p14:creationId xmlns:p14="http://schemas.microsoft.com/office/powerpoint/2010/main" xmlns="" val="3379387096"/>
+        <p14:creationId xmlns:p14="http://schemas.microsoft.com/office/powerpoint/2010/main" val="3379387096"/>
       </p:ext>
     </p:extLst>
   </p:cSld>
@@ -5251,19 +5547,14 @@
           <a:lstStyle/>
           <a:p>
             <a:r>
-              <a:rPr lang="en-GB" dirty="0" smtClean="0">
+              <a:rPr lang="en-GB" b="1" dirty="0" smtClean="0">
                 <a:latin typeface="Lucida Sans" pitchFamily="34" charset="0"/>
               </a:rPr>
-              <a:t>Name : Dave</a:t>
-            </a:r>
-          </a:p>
-          <a:p>
-            <a:r>
-              <a:rPr lang="en-GB" dirty="0" smtClean="0">
-                <a:latin typeface="Lucida Sans" pitchFamily="34" charset="0"/>
-              </a:rPr>
-              <a:t>Age: 22</a:t>
-            </a:r>
+              <a:t>Dave, 22</a:t>
+            </a:r>
+            <a:endParaRPr lang="en-GB" b="1" dirty="0" smtClean="0">
+              <a:latin typeface="Lucida Sans" pitchFamily="34" charset="0"/>
+            </a:endParaRPr>
           </a:p>
           <a:p>
             <a:r>
@@ -5278,8 +5569,17 @@
               <a:rPr lang="en-GB" dirty="0" smtClean="0">
                 <a:latin typeface="Lucida Sans" pitchFamily="34" charset="0"/>
               </a:rPr>
-              <a:t>A programming Guru</a:t>
-            </a:r>
+              <a:t>A programming </a:t>
+            </a:r>
+            <a:r>
+              <a:rPr lang="en-GB" dirty="0" smtClean="0">
+                <a:latin typeface="Lucida Sans" pitchFamily="34" charset="0"/>
+              </a:rPr>
+              <a:t>guru</a:t>
+            </a:r>
+            <a:endParaRPr lang="en-GB" dirty="0" smtClean="0">
+              <a:latin typeface="Lucida Sans" pitchFamily="34" charset="0"/>
+            </a:endParaRPr>
           </a:p>
           <a:p>
             <a:r>
@@ -5374,7 +5674,7 @@
           <a:blip r:embed="rId4" cstate="print">
             <a:extLst>
               <a:ext uri="{28A0092B-C50C-407E-A947-70E740481C1C}">
-                <a14:useLocalDpi xmlns:a14="http://schemas.microsoft.com/office/drawing/2010/main" xmlns="" val="0"/>
+                <a14:useLocalDpi xmlns:a14="http://schemas.microsoft.com/office/drawing/2010/main" val="0"/>
               </a:ext>
             </a:extLst>
           </a:blip>
@@ -5384,8 +5684,8 @@
         </p:blipFill>
         <p:spPr>
           <a:xfrm>
-            <a:off x="4979242" y="1228203"/>
-            <a:ext cx="3936158" cy="2953693"/>
+            <a:off x="5020827" y="1186720"/>
+            <a:ext cx="3335288" cy="2502800"/>
           </a:xfrm>
           <a:prstGeom prst="rect">
             <a:avLst/>
@@ -5395,7 +5695,7 @@
     </p:spTree>
     <p:extLst>
       <p:ext uri="{BB962C8B-B14F-4D97-AF65-F5344CB8AC3E}">
-        <p14:creationId xmlns:p14="http://schemas.microsoft.com/office/powerpoint/2010/main" xmlns="" val="3285001572"/>
+        <p14:creationId xmlns:p14="http://schemas.microsoft.com/office/powerpoint/2010/main" val="3285001572"/>
       </p:ext>
     </p:extLst>
   </p:cSld>
@@ -5448,13 +5748,7 @@
               <a:rPr lang="en-GB" dirty="0" smtClean="0">
                 <a:latin typeface="Lucida Sans" pitchFamily="34" charset="0"/>
               </a:rPr>
-              <a:t>User Needs </a:t>
-            </a:r>
-            <a:r>
-              <a:rPr lang="en-GB" dirty="0" smtClean="0">
-                <a:latin typeface="Lucida Sans" pitchFamily="34" charset="0"/>
-              </a:rPr>
-              <a:t>Table</a:t>
+              <a:t>User Needs Table</a:t>
             </a:r>
             <a:endParaRPr lang="en-GB" dirty="0">
               <a:latin typeface="Lucida Sans" pitchFamily="34" charset="0"/>
@@ -5471,7 +5765,7 @@
           <p:nvPr>
             <p:extLst>
               <p:ext uri="{D42A27DB-BD31-4B8C-83A1-F6EECF244321}">
-                <p14:modId xmlns:p14="http://schemas.microsoft.com/office/powerpoint/2010/main" xmlns="" val="2022530688"/>
+                <p14:modId xmlns:p14="http://schemas.microsoft.com/office/powerpoint/2010/main" val="2022530688"/>
               </p:ext>
             </p:extLst>
           </p:nvPr>
@@ -5536,11 +5830,7 @@
                       </a:r>
                       <a:r>
                         <a:rPr lang="en-GB" sz="1400" dirty="0" smtClean="0"/>
-                        <a:t>et</a:t>
-                      </a:r>
-                      <a:r>
-                        <a:rPr lang="en-GB" sz="1400" dirty="0" smtClean="0"/>
-                        <a:t>?</a:t>
+                        <a:t>et?</a:t>
                       </a:r>
                       <a:endParaRPr lang="en-GB" sz="1400" dirty="0"/>
                     </a:p>
@@ -5740,11 +6030,7 @@
                     <a:p>
                       <a:r>
                         <a:rPr lang="en-GB" sz="1400" dirty="0" smtClean="0"/>
-                        <a:t>Unanswered/new questions </a:t>
-                      </a:r>
-                      <a:r>
-                        <a:rPr lang="en-GB" sz="1400" dirty="0" smtClean="0"/>
-                        <a:t>view.</a:t>
+                        <a:t>Unanswered/new questions view.</a:t>
                       </a:r>
                       <a:endParaRPr lang="en-GB" sz="1400" dirty="0"/>
                     </a:p>
@@ -5903,7 +6189,7 @@
           <a:noFill/>
           <a:extLst>
             <a:ext uri="{909E8E84-426E-40DD-AFC4-6F175D3DCCD1}">
-              <a14:hiddenFill xmlns:a14="http://schemas.microsoft.com/office/drawing/2010/main" xmlns="">
+              <a14:hiddenFill xmlns:a14="http://schemas.microsoft.com/office/drawing/2010/main">
                 <a:solidFill>
                   <a:srgbClr val="FFFFFF"/>
                 </a:solidFill>
@@ -5941,7 +6227,7 @@
     </p:spTree>
     <p:extLst>
       <p:ext uri="{BB962C8B-B14F-4D97-AF65-F5344CB8AC3E}">
-        <p14:creationId xmlns:p14="http://schemas.microsoft.com/office/powerpoint/2010/main" xmlns="" val="3144856911"/>
+        <p14:creationId xmlns:p14="http://schemas.microsoft.com/office/powerpoint/2010/main" val="3144856911"/>
       </p:ext>
     </p:extLst>
   </p:cSld>
@@ -6062,7 +6348,7 @@
     </p:spTree>
     <p:extLst>
       <p:ext uri="{BB962C8B-B14F-4D97-AF65-F5344CB8AC3E}">
-        <p14:creationId xmlns:p14="http://schemas.microsoft.com/office/powerpoint/2010/main" xmlns="" val="1312360545"/>
+        <p14:creationId xmlns:p14="http://schemas.microsoft.com/office/powerpoint/2010/main" val="1312360545"/>
       </p:ext>
     </p:extLst>
   </p:cSld>
@@ -6115,7 +6401,7 @@
               <a:rPr lang="en-GB" dirty="0" smtClean="0">
                 <a:latin typeface="Lucida Sans" pitchFamily="34" charset="0"/>
               </a:rPr>
-              <a:t>Wireframes</a:t>
+              <a:t>Wireframes – index page</a:t>
             </a:r>
             <a:endParaRPr lang="en-GB" dirty="0">
               <a:latin typeface="Lucida Sans" pitchFamily="34" charset="0"/>
@@ -6123,30 +6409,35 @@
           </a:p>
         </p:txBody>
       </p:sp>
-      <p:sp>
-        <p:nvSpPr>
-          <p:cNvPr id="3" name="Content Placeholder 2"/>
-          <p:cNvSpPr>
-            <a:spLocks noGrp="1"/>
-          </p:cNvSpPr>
+      <p:pic>
+        <p:nvPicPr>
+          <p:cNvPr id="4" name="Content Placeholder 3"/>
+          <p:cNvPicPr>
+            <a:picLocks noGrp="1" noChangeAspect="1"/>
+          </p:cNvPicPr>
           <p:nvPr>
             <p:ph sz="quarter" idx="1"/>
           </p:nvPr>
-        </p:nvSpPr>
-        <p:spPr/>
-        <p:txBody>
-          <a:bodyPr/>
-          <a:lstStyle/>
-          <a:p>
-            <a:r>
-              <a:rPr lang="en-GB" dirty="0" smtClean="0">
-                <a:latin typeface="Lucida Sans" pitchFamily="34" charset="0"/>
-              </a:rPr>
-              <a:t>Paste this shit in, bitch</a:t>
-            </a:r>
-          </a:p>
-        </p:txBody>
-      </p:sp>
+        </p:nvPicPr>
+        <p:blipFill>
+          <a:blip r:embed="rId2">
+            <a:extLst>
+              <a:ext uri="{28A0092B-C50C-407E-A947-70E740481C1C}">
+                <a14:useLocalDpi xmlns:a14="http://schemas.microsoft.com/office/drawing/2010/main" val="0"/>
+              </a:ext>
+            </a:extLst>
+          </a:blip>
+          <a:stretch>
+            <a:fillRect/>
+          </a:stretch>
+        </p:blipFill>
+        <p:spPr>
+          <a:xfrm>
+            <a:off x="78319" y="1295400"/>
+            <a:ext cx="9065681" cy="4157338"/>
+          </a:xfrm>
+        </p:spPr>
+      </p:pic>
       <p:pic>
         <p:nvPicPr>
           <p:cNvPr id="5" name="Picture 2" descr="H:\studeso\styling\images\akita.png"/>
@@ -6156,7 +6447,7 @@
           <p:nvPr/>
         </p:nvPicPr>
         <p:blipFill>
-          <a:blip r:embed="rId2" cstate="print"/>
+          <a:blip r:embed="rId3" cstate="print"/>
           <a:srcRect/>
           <a:stretch>
             <a:fillRect/>
@@ -6176,7 +6467,7 @@
     </p:spTree>
     <p:extLst>
       <p:ext uri="{BB962C8B-B14F-4D97-AF65-F5344CB8AC3E}">
-        <p14:creationId xmlns:p14="http://schemas.microsoft.com/office/powerpoint/2010/main" xmlns="" val="2608953531"/>
+        <p14:creationId xmlns:p14="http://schemas.microsoft.com/office/powerpoint/2010/main" val="2608953531"/>
       </p:ext>
     </p:extLst>
   </p:cSld>

</xml_diff>

<commit_message>
updated presentation with updated mockups
only thing to add now is the site map/url mapping
</commit_message>
<xml_diff>
--- a/docs/presentation.pptx
+++ b/docs/presentation.pptx
@@ -238,7 +238,7 @@
             <a:fld id="{3BB74382-EDD2-490F-9388-C1D0E6077212}" type="datetimeFigureOut">
               <a:rPr lang="en-GB" smtClean="0"/>
               <a:pPr/>
-              <a:t>20/02/2015</a:t>
+              <a:t>21/02/2015</a:t>
             </a:fld>
             <a:endParaRPr lang="en-GB"/>
           </a:p>
@@ -934,7 +934,7 @@
             <a:fld id="{3FEB6C20-88C7-4B3D-B23C-A0B2BF770696}" type="datetimeFigureOut">
               <a:rPr lang="en-GB" smtClean="0"/>
               <a:pPr/>
-              <a:t>20/02/2015</a:t>
+              <a:t>21/02/2015</a:t>
             </a:fld>
             <a:endParaRPr lang="en-GB"/>
           </a:p>
@@ -1295,7 +1295,7 @@
             <a:fld id="{3FEB6C20-88C7-4B3D-B23C-A0B2BF770696}" type="datetimeFigureOut">
               <a:rPr lang="en-GB" smtClean="0"/>
               <a:pPr/>
-              <a:t>20/02/2015</a:t>
+              <a:t>21/02/2015</a:t>
             </a:fld>
             <a:endParaRPr lang="en-GB"/>
           </a:p>
@@ -1472,7 +1472,7 @@
             <a:fld id="{3FEB6C20-88C7-4B3D-B23C-A0B2BF770696}" type="datetimeFigureOut">
               <a:rPr lang="en-GB" smtClean="0"/>
               <a:pPr/>
-              <a:t>20/02/2015</a:t>
+              <a:t>21/02/2015</a:t>
             </a:fld>
             <a:endParaRPr lang="en-GB"/>
           </a:p>
@@ -1709,7 +1709,7 @@
             <a:fld id="{3FEB6C20-88C7-4B3D-B23C-A0B2BF770696}" type="datetimeFigureOut">
               <a:rPr lang="en-GB" smtClean="0"/>
               <a:pPr/>
-              <a:t>20/02/2015</a:t>
+              <a:t>21/02/2015</a:t>
             </a:fld>
             <a:endParaRPr lang="en-GB"/>
           </a:p>
@@ -1980,7 +1980,7 @@
             <a:fld id="{3FEB6C20-88C7-4B3D-B23C-A0B2BF770696}" type="datetimeFigureOut">
               <a:rPr lang="en-GB" smtClean="0"/>
               <a:pPr/>
-              <a:t>20/02/2015</a:t>
+              <a:t>21/02/2015</a:t>
             </a:fld>
             <a:endParaRPr lang="en-GB"/>
           </a:p>
@@ -2202,7 +2202,7 @@
             <a:fld id="{3FEB6C20-88C7-4B3D-B23C-A0B2BF770696}" type="datetimeFigureOut">
               <a:rPr lang="en-GB" smtClean="0"/>
               <a:pPr/>
-              <a:t>20/02/2015</a:t>
+              <a:t>21/02/2015</a:t>
             </a:fld>
             <a:endParaRPr lang="en-GB"/>
           </a:p>
@@ -2556,7 +2556,7 @@
             <a:fld id="{3FEB6C20-88C7-4B3D-B23C-A0B2BF770696}" type="datetimeFigureOut">
               <a:rPr lang="en-GB" smtClean="0"/>
               <a:pPr/>
-              <a:t>20/02/2015</a:t>
+              <a:t>21/02/2015</a:t>
             </a:fld>
             <a:endParaRPr lang="en-GB"/>
           </a:p>
@@ -2790,7 +2790,7 @@
             <a:fld id="{3FEB6C20-88C7-4B3D-B23C-A0B2BF770696}" type="datetimeFigureOut">
               <a:rPr lang="en-GB" smtClean="0"/>
               <a:pPr/>
-              <a:t>20/02/2015</a:t>
+              <a:t>21/02/2015</a:t>
             </a:fld>
             <a:endParaRPr lang="en-GB"/>
           </a:p>
@@ -2932,7 +2932,7 @@
             <a:fld id="{3FEB6C20-88C7-4B3D-B23C-A0B2BF770696}" type="datetimeFigureOut">
               <a:rPr lang="en-GB" smtClean="0"/>
               <a:pPr/>
-              <a:t>20/02/2015</a:t>
+              <a:t>21/02/2015</a:t>
             </a:fld>
             <a:endParaRPr lang="en-GB"/>
           </a:p>
@@ -3211,7 +3211,7 @@
             <a:fld id="{3FEB6C20-88C7-4B3D-B23C-A0B2BF770696}" type="datetimeFigureOut">
               <a:rPr lang="en-GB" smtClean="0"/>
               <a:pPr/>
-              <a:t>20/02/2015</a:t>
+              <a:t>21/02/2015</a:t>
             </a:fld>
             <a:endParaRPr lang="en-GB"/>
           </a:p>
@@ -3620,7 +3620,7 @@
             <a:fld id="{3FEB6C20-88C7-4B3D-B23C-A0B2BF770696}" type="datetimeFigureOut">
               <a:rPr lang="en-GB" smtClean="0"/>
               <a:pPr/>
-              <a:t>20/02/2015</a:t>
+              <a:t>21/02/2015</a:t>
             </a:fld>
             <a:endParaRPr lang="en-GB"/>
           </a:p>
@@ -3960,7 +3960,7 @@
             <a:fld id="{3FEB6C20-88C7-4B3D-B23C-A0B2BF770696}" type="datetimeFigureOut">
               <a:rPr lang="en-GB" smtClean="0"/>
               <a:pPr/>
-              <a:t>20/02/2015</a:t>
+              <a:t>21/02/2015</a:t>
             </a:fld>
             <a:endParaRPr lang="en-GB"/>
           </a:p>
@@ -4655,7 +4655,33 @@
       </p:sp>
       <p:pic>
         <p:nvPicPr>
-          <p:cNvPr id="4" name="Content Placeholder 3"/>
+          <p:cNvPr id="5" name="Picture 2" descr="H:\studeso\styling\images\akita.png"/>
+          <p:cNvPicPr>
+            <a:picLocks noChangeAspect="1" noChangeArrowheads="1"/>
+          </p:cNvPicPr>
+          <p:nvPr/>
+        </p:nvPicPr>
+        <p:blipFill>
+          <a:blip r:embed="rId2" cstate="print"/>
+          <a:srcRect/>
+          <a:stretch>
+            <a:fillRect/>
+          </a:stretch>
+        </p:blipFill>
+        <p:spPr bwMode="auto">
+          <a:xfrm flipH="1">
+            <a:off x="7559824" y="0"/>
+            <a:ext cx="1584176" cy="1475656"/>
+          </a:xfrm>
+          <a:prstGeom prst="rect">
+            <a:avLst/>
+          </a:prstGeom>
+          <a:noFill/>
+        </p:spPr>
+      </p:pic>
+      <p:pic>
+        <p:nvPicPr>
+          <p:cNvPr id="8" name="Content Placeholder 7"/>
           <p:cNvPicPr>
             <a:picLocks noGrp="1" noChangeAspect="1"/>
           </p:cNvPicPr>
@@ -4664,7 +4690,7 @@
           </p:nvPr>
         </p:nvPicPr>
         <p:blipFill>
-          <a:blip r:embed="rId2">
+          <a:blip r:embed="rId3">
             <a:extLst>
               <a:ext uri="{28A0092B-C50C-407E-A947-70E740481C1C}">
                 <a14:useLocalDpi xmlns:a14="http://schemas.microsoft.com/office/drawing/2010/main" val="0"/>
@@ -4677,35 +4703,9 @@
         </p:blipFill>
         <p:spPr>
           <a:xfrm>
-            <a:off x="107009" y="1319680"/>
-            <a:ext cx="9069457" cy="4269559"/>
-          </a:xfrm>
-        </p:spPr>
-      </p:pic>
-      <p:pic>
-        <p:nvPicPr>
-          <p:cNvPr id="5" name="Picture 2" descr="H:\studeso\styling\images\akita.png"/>
-          <p:cNvPicPr>
-            <a:picLocks noChangeAspect="1" noChangeArrowheads="1"/>
-          </p:cNvPicPr>
-          <p:nvPr/>
-        </p:nvPicPr>
-        <p:blipFill>
-          <a:blip r:embed="rId3" cstate="print"/>
-          <a:srcRect/>
-          <a:stretch>
-            <a:fillRect/>
-          </a:stretch>
-        </p:blipFill>
-        <p:spPr bwMode="auto">
-          <a:xfrm flipH="1">
-            <a:off x="7559824" y="0"/>
-            <a:ext cx="1584176" cy="1475656"/>
-          </a:xfrm>
-          <a:prstGeom prst="rect">
-            <a:avLst/>
-          </a:prstGeom>
-          <a:noFill/>
+            <a:off x="14016" y="1279339"/>
+            <a:ext cx="9118916" cy="4309901"/>
+          </a:xfrm>
         </p:spPr>
       </p:pic>
     </p:spTree>
@@ -5316,9 +5316,6 @@
               </a:rPr>
               <a:t>Jim, 17</a:t>
             </a:r>
-            <a:endParaRPr lang="en-GB" b="1" dirty="0" smtClean="0">
-              <a:latin typeface="Lucida Sans" pitchFamily="34" charset="0"/>
-            </a:endParaRPr>
           </a:p>
           <a:p>
             <a:r>
@@ -5552,9 +5549,6 @@
               </a:rPr>
               <a:t>Dave, 22</a:t>
             </a:r>
-            <a:endParaRPr lang="en-GB" b="1" dirty="0" smtClean="0">
-              <a:latin typeface="Lucida Sans" pitchFamily="34" charset="0"/>
-            </a:endParaRPr>
           </a:p>
           <a:p>
             <a:r>
@@ -5569,17 +5563,8 @@
               <a:rPr lang="en-GB" dirty="0" smtClean="0">
                 <a:latin typeface="Lucida Sans" pitchFamily="34" charset="0"/>
               </a:rPr>
-              <a:t>A programming </a:t>
-            </a:r>
-            <a:r>
-              <a:rPr lang="en-GB" dirty="0" smtClean="0">
-                <a:latin typeface="Lucida Sans" pitchFamily="34" charset="0"/>
-              </a:rPr>
-              <a:t>guru</a:t>
-            </a:r>
-            <a:endParaRPr lang="en-GB" dirty="0" smtClean="0">
-              <a:latin typeface="Lucida Sans" pitchFamily="34" charset="0"/>
-            </a:endParaRPr>
+              <a:t>A programming guru</a:t>
+            </a:r>
           </a:p>
           <a:p>
             <a:r>

</xml_diff>

<commit_message>
Updated presentation with url mapping and matrix
Site map last thing to be added
</commit_message>
<xml_diff>
--- a/docs/presentation.pptx
+++ b/docs/presentation.pptx
@@ -5,7 +5,7 @@
     <p:sldMasterId id="2147483660" r:id="rId1"/>
   </p:sldMasterIdLst>
   <p:notesMasterIdLst>
-    <p:notesMasterId r:id="rId13"/>
+    <p:notesMasterId r:id="rId14"/>
   </p:notesMasterIdLst>
   <p:sldIdLst>
     <p:sldId id="256" r:id="rId2"/>
@@ -14,11 +14,12 @@
     <p:sldId id="258" r:id="rId5"/>
     <p:sldId id="264" r:id="rId6"/>
     <p:sldId id="263" r:id="rId7"/>
-    <p:sldId id="259" r:id="rId8"/>
-    <p:sldId id="260" r:id="rId9"/>
-    <p:sldId id="261" r:id="rId10"/>
-    <p:sldId id="265" r:id="rId11"/>
-    <p:sldId id="266" r:id="rId12"/>
+    <p:sldId id="267" r:id="rId8"/>
+    <p:sldId id="259" r:id="rId9"/>
+    <p:sldId id="260" r:id="rId10"/>
+    <p:sldId id="261" r:id="rId11"/>
+    <p:sldId id="265" r:id="rId12"/>
+    <p:sldId id="266" r:id="rId13"/>
   </p:sldIdLst>
   <p:sldSz cx="9144000" cy="6858000" type="screen4x3"/>
   <p:notesSz cx="6858000" cy="9144000"/>
@@ -142,19 +143,6 @@
 </p:cmAuthorLst>
 </file>
 
-<file path=ppt/comments/comment1.xml><?xml version="1.0" encoding="utf-8"?>
-<p:cmLst xmlns:a="http://schemas.openxmlformats.org/drawingml/2006/main" xmlns:r="http://schemas.openxmlformats.org/officeDocument/2006/relationships" xmlns:p="http://schemas.openxmlformats.org/presentationml/2006/main">
-  <p:cm authorId="0" dt="2015-02-12T10:33:33.753" idx="2">
-    <p:pos x="5411" y="1039"/>
-    <p:text/>
-  </p:cm>
-  <p:cm authorId="0" dt="2015-02-12T10:33:47.269" idx="3">
-    <p:pos x="5555" y="1175"/>
-    <p:text>Just copied from the REQUIREMENTS.txt FILE</p:text>
-  </p:cm>
-</p:cmLst>
-</file>
-
 <file path=ppt/notesMasters/notesMaster1.xml><?xml version="1.0" encoding="utf-8"?>
 <p:notesMaster xmlns:a="http://schemas.openxmlformats.org/drawingml/2006/main" xmlns:r="http://schemas.openxmlformats.org/officeDocument/2006/relationships" xmlns:p="http://schemas.openxmlformats.org/presentationml/2006/main">
   <p:cSld>
@@ -238,7 +226,7 @@
             <a:fld id="{3BB74382-EDD2-490F-9388-C1D0E6077212}" type="datetimeFigureOut">
               <a:rPr lang="en-GB" smtClean="0"/>
               <a:pPr/>
-              <a:t>21/02/2015</a:t>
+              <a:t>22/02/2015</a:t>
             </a:fld>
             <a:endParaRPr lang="en-GB"/>
           </a:p>
@@ -934,7 +922,7 @@
             <a:fld id="{3FEB6C20-88C7-4B3D-B23C-A0B2BF770696}" type="datetimeFigureOut">
               <a:rPr lang="en-GB" smtClean="0"/>
               <a:pPr/>
-              <a:t>21/02/2015</a:t>
+              <a:t>22/02/2015</a:t>
             </a:fld>
             <a:endParaRPr lang="en-GB"/>
           </a:p>
@@ -1295,7 +1283,7 @@
             <a:fld id="{3FEB6C20-88C7-4B3D-B23C-A0B2BF770696}" type="datetimeFigureOut">
               <a:rPr lang="en-GB" smtClean="0"/>
               <a:pPr/>
-              <a:t>21/02/2015</a:t>
+              <a:t>22/02/2015</a:t>
             </a:fld>
             <a:endParaRPr lang="en-GB"/>
           </a:p>
@@ -1472,7 +1460,7 @@
             <a:fld id="{3FEB6C20-88C7-4B3D-B23C-A0B2BF770696}" type="datetimeFigureOut">
               <a:rPr lang="en-GB" smtClean="0"/>
               <a:pPr/>
-              <a:t>21/02/2015</a:t>
+              <a:t>22/02/2015</a:t>
             </a:fld>
             <a:endParaRPr lang="en-GB"/>
           </a:p>
@@ -1709,7 +1697,7 @@
             <a:fld id="{3FEB6C20-88C7-4B3D-B23C-A0B2BF770696}" type="datetimeFigureOut">
               <a:rPr lang="en-GB" smtClean="0"/>
               <a:pPr/>
-              <a:t>21/02/2015</a:t>
+              <a:t>22/02/2015</a:t>
             </a:fld>
             <a:endParaRPr lang="en-GB"/>
           </a:p>
@@ -1980,7 +1968,7 @@
             <a:fld id="{3FEB6C20-88C7-4B3D-B23C-A0B2BF770696}" type="datetimeFigureOut">
               <a:rPr lang="en-GB" smtClean="0"/>
               <a:pPr/>
-              <a:t>21/02/2015</a:t>
+              <a:t>22/02/2015</a:t>
             </a:fld>
             <a:endParaRPr lang="en-GB"/>
           </a:p>
@@ -2202,7 +2190,7 @@
             <a:fld id="{3FEB6C20-88C7-4B3D-B23C-A0B2BF770696}" type="datetimeFigureOut">
               <a:rPr lang="en-GB" smtClean="0"/>
               <a:pPr/>
-              <a:t>21/02/2015</a:t>
+              <a:t>22/02/2015</a:t>
             </a:fld>
             <a:endParaRPr lang="en-GB"/>
           </a:p>
@@ -2556,7 +2544,7 @@
             <a:fld id="{3FEB6C20-88C7-4B3D-B23C-A0B2BF770696}" type="datetimeFigureOut">
               <a:rPr lang="en-GB" smtClean="0"/>
               <a:pPr/>
-              <a:t>21/02/2015</a:t>
+              <a:t>22/02/2015</a:t>
             </a:fld>
             <a:endParaRPr lang="en-GB"/>
           </a:p>
@@ -2790,7 +2778,7 @@
             <a:fld id="{3FEB6C20-88C7-4B3D-B23C-A0B2BF770696}" type="datetimeFigureOut">
               <a:rPr lang="en-GB" smtClean="0"/>
               <a:pPr/>
-              <a:t>21/02/2015</a:t>
+              <a:t>22/02/2015</a:t>
             </a:fld>
             <a:endParaRPr lang="en-GB"/>
           </a:p>
@@ -2932,7 +2920,7 @@
             <a:fld id="{3FEB6C20-88C7-4B3D-B23C-A0B2BF770696}" type="datetimeFigureOut">
               <a:rPr lang="en-GB" smtClean="0"/>
               <a:pPr/>
-              <a:t>21/02/2015</a:t>
+              <a:t>22/02/2015</a:t>
             </a:fld>
             <a:endParaRPr lang="en-GB"/>
           </a:p>
@@ -3211,7 +3199,7 @@
             <a:fld id="{3FEB6C20-88C7-4B3D-B23C-A0B2BF770696}" type="datetimeFigureOut">
               <a:rPr lang="en-GB" smtClean="0"/>
               <a:pPr/>
-              <a:t>21/02/2015</a:t>
+              <a:t>22/02/2015</a:t>
             </a:fld>
             <a:endParaRPr lang="en-GB"/>
           </a:p>
@@ -3620,7 +3608,7 @@
             <a:fld id="{3FEB6C20-88C7-4B3D-B23C-A0B2BF770696}" type="datetimeFigureOut">
               <a:rPr lang="en-GB" smtClean="0"/>
               <a:pPr/>
-              <a:t>21/02/2015</a:t>
+              <a:t>22/02/2015</a:t>
             </a:fld>
             <a:endParaRPr lang="en-GB"/>
           </a:p>
@@ -3960,7 +3948,7 @@
             <a:fld id="{3FEB6C20-88C7-4B3D-B23C-A0B2BF770696}" type="datetimeFigureOut">
               <a:rPr lang="en-GB" smtClean="0"/>
               <a:pPr/>
-              <a:t>21/02/2015</a:t>
+              <a:t>22/02/2015</a:t>
             </a:fld>
             <a:endParaRPr lang="en-GB"/>
           </a:p>
@@ -4645,6 +4633,125 @@
               <a:rPr lang="en-GB" dirty="0" smtClean="0">
                 <a:latin typeface="Lucida Sans" pitchFamily="34" charset="0"/>
               </a:rPr>
+              <a:t>Wireframes – index page</a:t>
+            </a:r>
+            <a:endParaRPr lang="en-GB" dirty="0">
+              <a:latin typeface="Lucida Sans" pitchFamily="34" charset="0"/>
+            </a:endParaRPr>
+          </a:p>
+        </p:txBody>
+      </p:sp>
+      <p:pic>
+        <p:nvPicPr>
+          <p:cNvPr id="4" name="Content Placeholder 3"/>
+          <p:cNvPicPr>
+            <a:picLocks noGrp="1" noChangeAspect="1"/>
+          </p:cNvPicPr>
+          <p:nvPr>
+            <p:ph sz="quarter" idx="1"/>
+          </p:nvPr>
+        </p:nvPicPr>
+        <p:blipFill>
+          <a:blip r:embed="rId2">
+            <a:extLst>
+              <a:ext uri="{28A0092B-C50C-407E-A947-70E740481C1C}">
+                <a14:useLocalDpi xmlns:a14="http://schemas.microsoft.com/office/drawing/2010/main" val="0"/>
+              </a:ext>
+            </a:extLst>
+          </a:blip>
+          <a:stretch>
+            <a:fillRect/>
+          </a:stretch>
+        </p:blipFill>
+        <p:spPr>
+          <a:xfrm>
+            <a:off x="78319" y="1295400"/>
+            <a:ext cx="9065681" cy="4157338"/>
+          </a:xfrm>
+        </p:spPr>
+      </p:pic>
+      <p:pic>
+        <p:nvPicPr>
+          <p:cNvPr id="5" name="Picture 2" descr="H:\studeso\styling\images\akita.png"/>
+          <p:cNvPicPr>
+            <a:picLocks noChangeAspect="1" noChangeArrowheads="1"/>
+          </p:cNvPicPr>
+          <p:nvPr/>
+        </p:nvPicPr>
+        <p:blipFill>
+          <a:blip r:embed="rId3" cstate="print"/>
+          <a:srcRect/>
+          <a:stretch>
+            <a:fillRect/>
+          </a:stretch>
+        </p:blipFill>
+        <p:spPr bwMode="auto">
+          <a:xfrm flipH="1">
+            <a:off x="7559824" y="0"/>
+            <a:ext cx="1584176" cy="1475656"/>
+          </a:xfrm>
+          <a:prstGeom prst="rect">
+            <a:avLst/>
+          </a:prstGeom>
+          <a:noFill/>
+        </p:spPr>
+      </p:pic>
+    </p:spTree>
+    <p:extLst>
+      <p:ext uri="{BB962C8B-B14F-4D97-AF65-F5344CB8AC3E}">
+        <p14:creationId xmlns:p14="http://schemas.microsoft.com/office/powerpoint/2010/main" val="2608953531"/>
+      </p:ext>
+    </p:extLst>
+  </p:cSld>
+  <p:clrMapOvr>
+    <a:masterClrMapping/>
+  </p:clrMapOvr>
+  <p:timing>
+    <p:tnLst>
+      <p:par>
+        <p:cTn id="1" dur="indefinite" restart="never" nodeType="tmRoot"/>
+      </p:par>
+    </p:tnLst>
+  </p:timing>
+</p:sld>
+</file>
+
+<file path=ppt/slides/slide11.xml><?xml version="1.0" encoding="utf-8"?>
+<p:sld xmlns:a="http://schemas.openxmlformats.org/drawingml/2006/main" xmlns:r="http://schemas.openxmlformats.org/officeDocument/2006/relationships" xmlns:p="http://schemas.openxmlformats.org/presentationml/2006/main">
+  <p:cSld>
+    <p:spTree>
+      <p:nvGrpSpPr>
+        <p:cNvPr id="1" name=""/>
+        <p:cNvGrpSpPr/>
+        <p:nvPr/>
+      </p:nvGrpSpPr>
+      <p:grpSpPr>
+        <a:xfrm>
+          <a:off x="0" y="0"/>
+          <a:ext cx="0" cy="0"/>
+          <a:chOff x="0" y="0"/>
+          <a:chExt cx="0" cy="0"/>
+        </a:xfrm>
+      </p:grpSpPr>
+      <p:sp>
+        <p:nvSpPr>
+          <p:cNvPr id="2" name="Title 1"/>
+          <p:cNvSpPr>
+            <a:spLocks noGrp="1"/>
+          </p:cNvSpPr>
+          <p:nvPr>
+            <p:ph type="title"/>
+          </p:nvPr>
+        </p:nvSpPr>
+        <p:spPr/>
+        <p:txBody>
+          <a:bodyPr/>
+          <a:lstStyle/>
+          <a:p>
+            <a:r>
+              <a:rPr lang="en-GB" dirty="0" smtClean="0">
+                <a:latin typeface="Lucida Sans" pitchFamily="34" charset="0"/>
+              </a:rPr>
               <a:t>Wireframes – logged in homepage</a:t>
             </a:r>
             <a:endParaRPr lang="en-GB" dirty="0">
@@ -4728,7 +4835,7 @@
 </p:sld>
 </file>
 
-<file path=ppt/slides/slide11.xml><?xml version="1.0" encoding="utf-8"?>
+<file path=ppt/slides/slide12.xml><?xml version="1.0" encoding="utf-8"?>
 <p:sld xmlns:a="http://schemas.openxmlformats.org/drawingml/2006/main" xmlns:r="http://schemas.openxmlformats.org/officeDocument/2006/relationships" xmlns:p="http://schemas.openxmlformats.org/presentationml/2006/main">
   <p:cSld>
     <p:spTree>
@@ -4980,7 +5087,19 @@
               <a:rPr lang="en-GB" dirty="0" smtClean="0">
                 <a:latin typeface="Lucida Sans" pitchFamily="34" charset="0"/>
               </a:rPr>
-              <a:t>Not restricted to questions, general discussion welcome</a:t>
+              <a:t>Not restricted to questions, general </a:t>
+            </a:r>
+            <a:r>
+              <a:rPr lang="en-GB" dirty="0" smtClean="0">
+                <a:latin typeface="Lucida Sans" pitchFamily="34" charset="0"/>
+              </a:rPr>
+              <a:t>discussions </a:t>
+            </a:r>
+            <a:r>
+              <a:rPr lang="en-GB" dirty="0" smtClean="0">
+                <a:latin typeface="Lucida Sans" pitchFamily="34" charset="0"/>
+              </a:rPr>
+              <a:t>welcome</a:t>
             </a:r>
           </a:p>
         </p:txBody>
@@ -5002,7 +5121,7 @@
         </p:blipFill>
         <p:spPr bwMode="auto">
           <a:xfrm flipH="1">
-            <a:off x="7559824" y="0"/>
+            <a:off x="7559824" y="-104056"/>
             <a:ext cx="1584176" cy="1475656"/>
           </a:xfrm>
           <a:prstGeom prst="rect">
@@ -5220,7 +5339,7 @@
         </p:blipFill>
         <p:spPr bwMode="auto">
           <a:xfrm flipH="1">
-            <a:off x="7559824" y="0"/>
+            <a:off x="7559824" y="-90128"/>
             <a:ext cx="1584176" cy="1475656"/>
           </a:xfrm>
           <a:prstGeom prst="rect">
@@ -5425,7 +5544,7 @@
         </p:blipFill>
         <p:spPr bwMode="auto">
           <a:xfrm flipH="1">
-            <a:off x="7559824" y="0"/>
+            <a:off x="7559824" y="-90128"/>
             <a:ext cx="1584176" cy="1475656"/>
           </a:xfrm>
           <a:prstGeom prst="rect">
@@ -5638,7 +5757,7 @@
         </p:blipFill>
         <p:spPr bwMode="auto">
           <a:xfrm flipH="1">
-            <a:off x="7559824" y="0"/>
+            <a:off x="7559824" y="-90128"/>
             <a:ext cx="1584176" cy="1475656"/>
           </a:xfrm>
           <a:prstGeom prst="rect">
@@ -5733,7 +5852,13 @@
               <a:rPr lang="en-GB" dirty="0" smtClean="0">
                 <a:latin typeface="Lucida Sans" pitchFamily="34" charset="0"/>
               </a:rPr>
-              <a:t>User Needs Table</a:t>
+              <a:t>User Needs </a:t>
+            </a:r>
+            <a:r>
+              <a:rPr lang="en-GB" dirty="0" smtClean="0">
+                <a:latin typeface="Lucida Sans" pitchFamily="34" charset="0"/>
+              </a:rPr>
+              <a:t>Matrix</a:t>
             </a:r>
             <a:endParaRPr lang="en-GB" dirty="0">
               <a:latin typeface="Lucida Sans" pitchFamily="34" charset="0"/>
@@ -5750,14 +5875,14 @@
           <p:nvPr>
             <p:extLst>
               <p:ext uri="{D42A27DB-BD31-4B8C-83A1-F6EECF244321}">
-                <p14:modId xmlns:p14="http://schemas.microsoft.com/office/powerpoint/2010/main" val="2022530688"/>
+                <p14:modId xmlns:p14="http://schemas.microsoft.com/office/powerpoint/2010/main" val="3952015812"/>
               </p:ext>
             </p:extLst>
           </p:nvPr>
         </p:nvGraphicFramePr>
         <p:xfrm>
-          <a:off x="467544" y="1412776"/>
-          <a:ext cx="8280920" cy="4347085"/>
+          <a:off x="405880" y="1164858"/>
+          <a:ext cx="8280920" cy="5435821"/>
         </p:xfrm>
         <a:graphic>
           <a:graphicData uri="http://schemas.openxmlformats.org/drawingml/2006/table">
@@ -5779,7 +5904,7 @@
                     <a:p>
                       <a:r>
                         <a:rPr lang="en-GB" sz="1400" dirty="0" smtClean="0"/>
-                        <a:t>User</a:t>
+                        <a:t>Feature</a:t>
                       </a:r>
                       <a:endParaRPr lang="en-GB" sz="1400" dirty="0"/>
                     </a:p>
@@ -5793,7 +5918,7 @@
                     <a:p>
                       <a:r>
                         <a:rPr lang="en-GB" sz="1400" dirty="0" smtClean="0"/>
-                        <a:t>Need</a:t>
+                        <a:t>Jim</a:t>
                       </a:r>
                       <a:endParaRPr lang="en-GB" sz="1400" dirty="0"/>
                     </a:p>
@@ -5807,15 +5932,7 @@
                     <a:p>
                       <a:r>
                         <a:rPr lang="en-GB" sz="1400" dirty="0" smtClean="0"/>
-                        <a:t>Is</a:t>
-                      </a:r>
-                      <a:r>
-                        <a:rPr lang="en-GB" sz="1400" baseline="0" dirty="0" smtClean="0"/>
-                        <a:t> it m</a:t>
-                      </a:r>
-                      <a:r>
-                        <a:rPr lang="en-GB" sz="1400" dirty="0" smtClean="0"/>
-                        <a:t>et?</a:t>
+                        <a:t>Dave</a:t>
                       </a:r>
                       <a:endParaRPr lang="en-GB" sz="1400" dirty="0"/>
                     </a:p>
@@ -5829,11 +5946,7 @@
                     <a:p>
                       <a:r>
                         <a:rPr lang="en-GB" sz="1400" dirty="0" smtClean="0"/>
-                        <a:t>Met</a:t>
-                      </a:r>
-                      <a:r>
-                        <a:rPr lang="en-GB" sz="1400" baseline="0" dirty="0" smtClean="0"/>
-                        <a:t> by</a:t>
+                        <a:t>Total</a:t>
                       </a:r>
                       <a:endParaRPr lang="en-GB" sz="1400" dirty="0"/>
                     </a:p>
@@ -5849,7 +5962,7 @@
                     <a:p>
                       <a:r>
                         <a:rPr lang="en-GB" sz="1400" dirty="0" smtClean="0"/>
-                        <a:t>Jim (beginner)</a:t>
+                        <a:t>Add A Post/Comment</a:t>
                       </a:r>
                       <a:endParaRPr lang="en-GB" sz="1400" dirty="0"/>
                     </a:p>
@@ -5862,14 +5975,14 @@
                     <a:lstStyle/>
                     <a:p>
                       <a:r>
-                        <a:rPr lang="en-GB" sz="1400" dirty="0" smtClean="0"/>
-                        <a:t>Search for posts about</a:t>
+                        <a:rPr lang="en-GB" sz="1400" dirty="0" smtClean="0">
+                          <a:latin typeface="+mn-lt"/>
+                        </a:rPr>
+                        <a:t>5</a:t>
                       </a:r>
-                      <a:r>
-                        <a:rPr lang="en-GB" sz="1400" baseline="0" dirty="0" smtClean="0"/>
-                        <a:t> certain topics, posts with about  A “and” B, or ask a new question</a:t>
-                      </a:r>
-                      <a:endParaRPr lang="en-GB" sz="1400" dirty="0"/>
+                      <a:endParaRPr lang="en-GB" sz="1400" dirty="0">
+                        <a:latin typeface="+mn-lt"/>
+                      </a:endParaRPr>
                     </a:p>
                   </a:txBody>
                   <a:tcPr/>
@@ -5880,10 +5993,14 @@
                     <a:lstStyle/>
                     <a:p>
                       <a:r>
-                        <a:rPr lang="en-GB" sz="1400" dirty="0" smtClean="0"/>
-                        <a:t>Yes</a:t>
+                        <a:rPr lang="en-GB" dirty="0" smtClean="0">
+                          <a:latin typeface="+mn-lt"/>
+                        </a:rPr>
+                        <a:t>5</a:t>
                       </a:r>
-                      <a:endParaRPr lang="en-GB" sz="1400" dirty="0"/>
+                      <a:endParaRPr lang="en-GB" dirty="0">
+                        <a:latin typeface="+mn-lt"/>
+                      </a:endParaRPr>
                     </a:p>
                   </a:txBody>
                   <a:tcPr/>
@@ -5894,68 +6011,10 @@
                     <a:lstStyle/>
                     <a:p>
                       <a:r>
-                        <a:rPr lang="en-GB" sz="1400" dirty="0" smtClean="0"/>
-                        <a:t>Other users?</a:t>
+                        <a:rPr lang="en-GB" dirty="0" smtClean="0"/>
+                        <a:t>10</a:t>
                       </a:r>
-                      <a:endParaRPr lang="en-GB" sz="1400" dirty="0"/>
-                    </a:p>
-                  </a:txBody>
-                  <a:tcPr/>
-                </a:tc>
-              </a:tr>
-              <a:tr h="837489">
-                <a:tc>
-                  <a:txBody>
-                    <a:bodyPr/>
-                    <a:lstStyle/>
-                    <a:p>
-                      <a:endParaRPr lang="en-GB" sz="1400" dirty="0"/>
-                    </a:p>
-                  </a:txBody>
-                  <a:tcPr/>
-                </a:tc>
-                <a:tc>
-                  <a:txBody>
-                    <a:bodyPr/>
-                    <a:lstStyle/>
-                    <a:p>
-                      <a:r>
-                        <a:rPr lang="en-GB" sz="1400" dirty="0" smtClean="0"/>
-                        <a:t>Browse the site generally, view interesting content</a:t>
-                      </a:r>
-                      <a:endParaRPr lang="en-GB" sz="1400" dirty="0"/>
-                    </a:p>
-                  </a:txBody>
-                  <a:tcPr/>
-                </a:tc>
-                <a:tc>
-                  <a:txBody>
-                    <a:bodyPr/>
-                    <a:lstStyle/>
-                    <a:p>
-                      <a:r>
-                        <a:rPr lang="en-GB" sz="1400" dirty="0" smtClean="0"/>
-                        <a:t>Yes</a:t>
-                      </a:r>
-                      <a:endParaRPr lang="en-GB" sz="1400" dirty="0"/>
-                    </a:p>
-                  </a:txBody>
-                  <a:tcPr/>
-                </a:tc>
-                <a:tc>
-                  <a:txBody>
-                    <a:bodyPr/>
-                    <a:lstStyle/>
-                    <a:p>
-                      <a:r>
-                        <a:rPr lang="en-GB" sz="1400" dirty="0" smtClean="0"/>
-                        <a:t>Search bar/recommended</a:t>
-                      </a:r>
-                      <a:r>
-                        <a:rPr lang="en-GB" sz="1400" baseline="0" dirty="0" smtClean="0"/>
-                        <a:t> tags.</a:t>
-                      </a:r>
-                      <a:endParaRPr lang="en-GB" sz="1400" dirty="0"/>
+                      <a:endParaRPr lang="en-GB" dirty="0"/>
                     </a:p>
                   </a:txBody>
                   <a:tcPr/>
@@ -5969,7 +6028,7 @@
                     <a:p>
                       <a:r>
                         <a:rPr lang="en-GB" sz="1400" dirty="0" smtClean="0"/>
-                        <a:t>Dave (pro user)</a:t>
+                        <a:t>Restrict Post Contributors</a:t>
                       </a:r>
                       <a:endParaRPr lang="en-GB" sz="1400" dirty="0"/>
                     </a:p>
@@ -5982,12 +6041,60 @@
                     <a:lstStyle/>
                     <a:p>
                       <a:r>
+                        <a:rPr lang="en-GB" sz="1400" dirty="0" smtClean="0">
+                          <a:latin typeface="+mn-lt"/>
+                        </a:rPr>
+                        <a:t>5</a:t>
+                      </a:r>
+                      <a:endParaRPr lang="en-GB" sz="1400" dirty="0">
+                        <a:latin typeface="+mn-lt"/>
+                      </a:endParaRPr>
+                    </a:p>
+                  </a:txBody>
+                  <a:tcPr/>
+                </a:tc>
+                <a:tc>
+                  <a:txBody>
+                    <a:bodyPr/>
+                    <a:lstStyle/>
+                    <a:p>
+                      <a:r>
+                        <a:rPr lang="en-GB" dirty="0" smtClean="0">
+                          <a:latin typeface="+mn-lt"/>
+                        </a:rPr>
+                        <a:t>3</a:t>
+                      </a:r>
+                      <a:endParaRPr lang="en-GB" dirty="0">
+                        <a:latin typeface="+mn-lt"/>
+                      </a:endParaRPr>
+                    </a:p>
+                  </a:txBody>
+                  <a:tcPr/>
+                </a:tc>
+                <a:tc>
+                  <a:txBody>
+                    <a:bodyPr/>
+                    <a:lstStyle/>
+                    <a:p>
+                      <a:r>
+                        <a:rPr lang="en-GB" dirty="0" smtClean="0"/>
+                        <a:t>8</a:t>
+                      </a:r>
+                      <a:endParaRPr lang="en-GB" dirty="0"/>
+                    </a:p>
+                  </a:txBody>
+                  <a:tcPr/>
+                </a:tc>
+              </a:tr>
+              <a:tr h="837489">
+                <a:tc>
+                  <a:txBody>
+                    <a:bodyPr/>
+                    <a:lstStyle/>
+                    <a:p>
+                      <a:r>
                         <a:rPr lang="en-GB" sz="1400" dirty="0" smtClean="0"/>
-                        <a:t>To view</a:t>
-                      </a:r>
-                      <a:r>
-                        <a:rPr lang="en-GB" sz="1400" baseline="0" dirty="0" smtClean="0"/>
-                        <a:t> unanswered posts about topics he knows about</a:t>
+                        <a:t>Rating System</a:t>
                       </a:r>
                       <a:endParaRPr lang="en-GB" sz="1400" dirty="0"/>
                     </a:p>
@@ -6000,8 +6107,60 @@
                     <a:lstStyle/>
                     <a:p>
                       <a:r>
+                        <a:rPr lang="en-GB" dirty="0" smtClean="0">
+                          <a:latin typeface="+mn-lt"/>
+                        </a:rPr>
+                        <a:t>2</a:t>
+                      </a:r>
+                      <a:endParaRPr lang="en-GB" dirty="0">
+                        <a:latin typeface="+mn-lt"/>
+                      </a:endParaRPr>
+                    </a:p>
+                  </a:txBody>
+                  <a:tcPr/>
+                </a:tc>
+                <a:tc>
+                  <a:txBody>
+                    <a:bodyPr/>
+                    <a:lstStyle/>
+                    <a:p>
+                      <a:r>
+                        <a:rPr lang="en-GB" dirty="0" smtClean="0">
+                          <a:latin typeface="+mn-lt"/>
+                        </a:rPr>
+                        <a:t>5</a:t>
+                      </a:r>
+                      <a:endParaRPr lang="en-GB" dirty="0">
+                        <a:latin typeface="+mn-lt"/>
+                      </a:endParaRPr>
+                    </a:p>
+                  </a:txBody>
+                  <a:tcPr/>
+                </a:tc>
+                <a:tc>
+                  <a:txBody>
+                    <a:bodyPr/>
+                    <a:lstStyle/>
+                    <a:p>
+                      <a:r>
+                        <a:rPr lang="en-GB" dirty="0" smtClean="0"/>
+                        <a:t>7</a:t>
+                      </a:r>
+                      <a:endParaRPr lang="en-GB" dirty="0"/>
+                    </a:p>
+                  </a:txBody>
+                  <a:tcPr/>
+                </a:tc>
+              </a:tr>
+              <a:tr h="1088736">
+                <a:tc>
+                  <a:txBody>
+                    <a:bodyPr/>
+                    <a:lstStyle/>
+                    <a:p>
+                      <a:r>
                         <a:rPr lang="en-GB" sz="1400" dirty="0" smtClean="0"/>
-                        <a:t>Yes</a:t>
+                        <a:t>Tag Subscription</a:t>
                       </a:r>
                       <a:endParaRPr lang="en-GB" sz="1400" dirty="0"/>
                     </a:p>
@@ -6014,10 +6173,46 @@
                     <a:lstStyle/>
                     <a:p>
                       <a:r>
-                        <a:rPr lang="en-GB" sz="1400" dirty="0" smtClean="0"/>
-                        <a:t>Unanswered/new questions view.</a:t>
+                        <a:rPr lang="en-GB" sz="1400" dirty="0" smtClean="0">
+                          <a:latin typeface="+mn-lt"/>
+                        </a:rPr>
+                        <a:t>3</a:t>
                       </a:r>
-                      <a:endParaRPr lang="en-GB" sz="1400" dirty="0"/>
+                      <a:endParaRPr lang="en-GB" sz="1400" dirty="0">
+                        <a:latin typeface="+mn-lt"/>
+                      </a:endParaRPr>
+                    </a:p>
+                  </a:txBody>
+                  <a:tcPr/>
+                </a:tc>
+                <a:tc>
+                  <a:txBody>
+                    <a:bodyPr/>
+                    <a:lstStyle/>
+                    <a:p>
+                      <a:r>
+                        <a:rPr lang="en-GB" dirty="0" smtClean="0">
+                          <a:latin typeface="+mn-lt"/>
+                        </a:rPr>
+                        <a:t>5</a:t>
+                      </a:r>
+                      <a:endParaRPr lang="en-GB" dirty="0">
+                        <a:latin typeface="+mn-lt"/>
+                      </a:endParaRPr>
+                    </a:p>
+                  </a:txBody>
+                  <a:tcPr/>
+                </a:tc>
+                <a:tc>
+                  <a:txBody>
+                    <a:bodyPr/>
+                    <a:lstStyle/>
+                    <a:p>
+                      <a:r>
+                        <a:rPr lang="en-GB" dirty="0" smtClean="0"/>
+                        <a:t>8</a:t>
+                      </a:r>
+                      <a:endParaRPr lang="en-GB" dirty="0"/>
                     </a:p>
                   </a:txBody>
                   <a:tcPr/>
@@ -6029,23 +6224,9 @@
                     <a:bodyPr/>
                     <a:lstStyle/>
                     <a:p>
-                      <a:endParaRPr lang="en-GB" sz="1400" dirty="0"/>
-                    </a:p>
-                  </a:txBody>
-                  <a:tcPr/>
-                </a:tc>
-                <a:tc>
-                  <a:txBody>
-                    <a:bodyPr/>
-                    <a:lstStyle/>
-                    <a:p>
                       <a:r>
                         <a:rPr lang="en-GB" sz="1400" dirty="0" smtClean="0"/>
-                        <a:t>Discuss</a:t>
-                      </a:r>
-                      <a:r>
-                        <a:rPr lang="en-GB" sz="1400" baseline="0" dirty="0" smtClean="0"/>
-                        <a:t> / communicate with other pro-users at his level</a:t>
+                        <a:t>Anonymous Posting</a:t>
                       </a:r>
                       <a:endParaRPr lang="en-GB" sz="1400" dirty="0"/>
                     </a:p>
@@ -6058,10 +6239,32 @@
                     <a:lstStyle/>
                     <a:p>
                       <a:r>
-                        <a:rPr lang="en-GB" sz="1400" dirty="0" smtClean="0"/>
-                        <a:t>Yes</a:t>
+                        <a:rPr lang="en-GB" sz="1400" dirty="0" smtClean="0">
+                          <a:latin typeface="+mn-lt"/>
+                        </a:rPr>
+                        <a:t>4</a:t>
                       </a:r>
-                      <a:endParaRPr lang="en-GB" sz="1400" dirty="0"/>
+                      <a:endParaRPr lang="en-GB" sz="1400" dirty="0">
+                        <a:latin typeface="+mn-lt"/>
+                      </a:endParaRPr>
+                    </a:p>
+                  </a:txBody>
+                  <a:tcPr/>
+                </a:tc>
+                <a:tc>
+                  <a:txBody>
+                    <a:bodyPr/>
+                    <a:lstStyle/>
+                    <a:p>
+                      <a:r>
+                        <a:rPr lang="en-GB" sz="1400" dirty="0" smtClean="0">
+                          <a:latin typeface="+mn-lt"/>
+                        </a:rPr>
+                        <a:t>1</a:t>
+                      </a:r>
+                      <a:endParaRPr lang="en-GB" sz="1400" dirty="0">
+                        <a:latin typeface="+mn-lt"/>
+                      </a:endParaRPr>
                     </a:p>
                   </a:txBody>
                   <a:tcPr/>
@@ -6073,7 +6276,7 @@
                     <a:p>
                       <a:r>
                         <a:rPr lang="en-GB" sz="1400" dirty="0" smtClean="0"/>
-                        <a:t>Other users?</a:t>
+                        <a:t>5</a:t>
                       </a:r>
                       <a:endParaRPr lang="en-GB" sz="1400" dirty="0"/>
                     </a:p>
@@ -6085,6 +6288,32 @@
           </a:graphicData>
         </a:graphic>
       </p:graphicFrame>
+      <p:pic>
+        <p:nvPicPr>
+          <p:cNvPr id="5" name="Picture 2" descr="H:\studeso\styling\images\akita.png"/>
+          <p:cNvPicPr>
+            <a:picLocks noChangeAspect="1" noChangeArrowheads="1"/>
+          </p:cNvPicPr>
+          <p:nvPr/>
+        </p:nvPicPr>
+        <p:blipFill>
+          <a:blip r:embed="rId2" cstate="print"/>
+          <a:srcRect/>
+          <a:stretch>
+            <a:fillRect/>
+          </a:stretch>
+        </p:blipFill>
+        <p:spPr bwMode="auto">
+          <a:xfrm flipH="1">
+            <a:off x="7559824" y="-171400"/>
+            <a:ext cx="1584176" cy="1475656"/>
+          </a:xfrm>
+          <a:prstGeom prst="rect">
+            <a:avLst/>
+          </a:prstGeom>
+          <a:noFill/>
+        </p:spPr>
+      </p:pic>
     </p:spTree>
   </p:cSld>
   <p:clrMapOvr>
@@ -6127,6 +6356,350 @@
             <p:ph type="title"/>
           </p:nvPr>
         </p:nvSpPr>
+        <p:spPr/>
+        <p:txBody>
+          <a:bodyPr>
+            <a:normAutofit/>
+          </a:bodyPr>
+          <a:lstStyle/>
+          <a:p>
+            <a:r>
+              <a:rPr lang="en-GB" dirty="0" smtClean="0">
+                <a:latin typeface="Lucida Sans" panose="020B0602030504020204" pitchFamily="34" charset="0"/>
+              </a:rPr>
+              <a:t>URL Mapping</a:t>
+            </a:r>
+            <a:endParaRPr lang="en-GB" dirty="0">
+              <a:latin typeface="Lucida Sans" panose="020B0602030504020204" pitchFamily="34" charset="0"/>
+            </a:endParaRPr>
+          </a:p>
+        </p:txBody>
+      </p:sp>
+      <p:graphicFrame>
+        <p:nvGraphicFramePr>
+          <p:cNvPr id="4" name="Content Placeholder 3"/>
+          <p:cNvGraphicFramePr>
+            <a:graphicFrameLocks noGrp="1"/>
+          </p:cNvGraphicFramePr>
+          <p:nvPr>
+            <p:ph sz="quarter" idx="1"/>
+            <p:extLst>
+              <p:ext uri="{D42A27DB-BD31-4B8C-83A1-F6EECF244321}">
+                <p14:modId xmlns:p14="http://schemas.microsoft.com/office/powerpoint/2010/main" val="963210065"/>
+              </p:ext>
+            </p:extLst>
+          </p:nvPr>
+        </p:nvGraphicFramePr>
+        <p:xfrm>
+          <a:off x="457200" y="1219200"/>
+          <a:ext cx="8229600" cy="2595880"/>
+        </p:xfrm>
+        <a:graphic>
+          <a:graphicData uri="http://schemas.openxmlformats.org/drawingml/2006/table">
+            <a:tbl>
+              <a:tblPr firstRow="1" bandRow="1">
+                <a:tableStyleId>{5C22544A-7EE6-4342-B048-85BDC9FD1C3A}</a:tableStyleId>
+              </a:tblPr>
+              <a:tblGrid>
+                <a:gridCol w="4114800"/>
+                <a:gridCol w="4114800"/>
+              </a:tblGrid>
+              <a:tr h="370840">
+                <a:tc>
+                  <a:txBody>
+                    <a:bodyPr/>
+                    <a:lstStyle/>
+                    <a:p>
+                      <a:r>
+                        <a:rPr lang="en-GB" dirty="0" smtClean="0"/>
+                        <a:t>Description</a:t>
+                      </a:r>
+                      <a:endParaRPr lang="en-GB" dirty="0"/>
+                    </a:p>
+                  </a:txBody>
+                  <a:tcPr/>
+                </a:tc>
+                <a:tc>
+                  <a:txBody>
+                    <a:bodyPr/>
+                    <a:lstStyle/>
+                    <a:p>
+                      <a:r>
+                        <a:rPr lang="en-GB" dirty="0" smtClean="0"/>
+                        <a:t>Mapping</a:t>
+                      </a:r>
+                      <a:endParaRPr lang="en-GB" dirty="0"/>
+                    </a:p>
+                  </a:txBody>
+                  <a:tcPr/>
+                </a:tc>
+              </a:tr>
+              <a:tr h="370840">
+                <a:tc>
+                  <a:txBody>
+                    <a:bodyPr/>
+                    <a:lstStyle/>
+                    <a:p>
+                      <a:r>
+                        <a:rPr lang="en-GB" dirty="0" smtClean="0"/>
+                        <a:t>Posts/Questions</a:t>
+                      </a:r>
+                      <a:endParaRPr lang="en-GB" dirty="0"/>
+                    </a:p>
+                  </a:txBody>
+                  <a:tcPr/>
+                </a:tc>
+                <a:tc>
+                  <a:txBody>
+                    <a:bodyPr/>
+                    <a:lstStyle/>
+                    <a:p>
+                      <a:r>
+                        <a:rPr lang="en-GB" dirty="0" smtClean="0"/>
+                        <a:t>/posts/</a:t>
+                      </a:r>
+                      <a:r>
+                        <a:rPr lang="en-GB" dirty="0" err="1" smtClean="0"/>
+                        <a:t>postId</a:t>
+                      </a:r>
+                      <a:r>
+                        <a:rPr lang="en-GB" dirty="0" smtClean="0"/>
+                        <a:t>/post-title-slug</a:t>
+                      </a:r>
+                      <a:endParaRPr lang="en-GB" dirty="0"/>
+                    </a:p>
+                  </a:txBody>
+                  <a:tcPr/>
+                </a:tc>
+              </a:tr>
+              <a:tr h="370840">
+                <a:tc>
+                  <a:txBody>
+                    <a:bodyPr/>
+                    <a:lstStyle/>
+                    <a:p>
+                      <a:r>
+                        <a:rPr lang="en-GB" dirty="0" smtClean="0"/>
+                        <a:t>View Tags</a:t>
+                      </a:r>
+                      <a:endParaRPr lang="en-GB" dirty="0"/>
+                    </a:p>
+                  </a:txBody>
+                  <a:tcPr/>
+                </a:tc>
+                <a:tc>
+                  <a:txBody>
+                    <a:bodyPr/>
+                    <a:lstStyle/>
+                    <a:p>
+                      <a:r>
+                        <a:rPr lang="en-GB" dirty="0" smtClean="0"/>
+                        <a:t>/posts/tags/tag1+tag2+...</a:t>
+                      </a:r>
+                      <a:endParaRPr lang="en-GB" dirty="0"/>
+                    </a:p>
+                  </a:txBody>
+                  <a:tcPr/>
+                </a:tc>
+              </a:tr>
+              <a:tr h="370840">
+                <a:tc>
+                  <a:txBody>
+                    <a:bodyPr/>
+                    <a:lstStyle/>
+                    <a:p>
+                      <a:r>
+                        <a:rPr lang="en-GB" dirty="0" smtClean="0"/>
+                        <a:t>New Posts</a:t>
+                      </a:r>
+                      <a:endParaRPr lang="en-GB" dirty="0"/>
+                    </a:p>
+                  </a:txBody>
+                  <a:tcPr/>
+                </a:tc>
+                <a:tc>
+                  <a:txBody>
+                    <a:bodyPr/>
+                    <a:lstStyle/>
+                    <a:p>
+                      <a:r>
+                        <a:rPr lang="en-GB" dirty="0" smtClean="0"/>
+                        <a:t>/posts/new/tag1+tag2+...</a:t>
+                      </a:r>
+                      <a:endParaRPr lang="en-GB" dirty="0"/>
+                    </a:p>
+                  </a:txBody>
+                  <a:tcPr/>
+                </a:tc>
+              </a:tr>
+              <a:tr h="370840">
+                <a:tc>
+                  <a:txBody>
+                    <a:bodyPr/>
+                    <a:lstStyle/>
+                    <a:p>
+                      <a:r>
+                        <a:rPr lang="en-GB" dirty="0" smtClean="0"/>
+                        <a:t>Add a new post</a:t>
+                      </a:r>
+                      <a:endParaRPr lang="en-GB" dirty="0"/>
+                    </a:p>
+                  </a:txBody>
+                  <a:tcPr/>
+                </a:tc>
+                <a:tc>
+                  <a:txBody>
+                    <a:bodyPr/>
+                    <a:lstStyle/>
+                    <a:p>
+                      <a:r>
+                        <a:rPr lang="en-GB" dirty="0" smtClean="0"/>
+                        <a:t>/posts/bark</a:t>
+                      </a:r>
+                      <a:endParaRPr lang="en-GB" dirty="0"/>
+                    </a:p>
+                  </a:txBody>
+                  <a:tcPr/>
+                </a:tc>
+              </a:tr>
+              <a:tr h="370840">
+                <a:tc>
+                  <a:txBody>
+                    <a:bodyPr/>
+                    <a:lstStyle/>
+                    <a:p>
+                      <a:r>
+                        <a:rPr lang="en-GB" dirty="0" smtClean="0"/>
+                        <a:t>Tag Search</a:t>
+                      </a:r>
+                      <a:endParaRPr lang="en-GB" dirty="0"/>
+                    </a:p>
+                  </a:txBody>
+                  <a:tcPr/>
+                </a:tc>
+                <a:tc>
+                  <a:txBody>
+                    <a:bodyPr/>
+                    <a:lstStyle/>
+                    <a:p>
+                      <a:r>
+                        <a:rPr lang="en-GB" dirty="0" smtClean="0"/>
+                        <a:t>/</a:t>
+                      </a:r>
+                      <a:r>
+                        <a:rPr lang="en-GB" dirty="0" err="1" smtClean="0"/>
+                        <a:t>search?q</a:t>
+                      </a:r>
+                      <a:r>
+                        <a:rPr lang="en-GB" dirty="0" smtClean="0"/>
+                        <a:t>=tag1+tag2+...</a:t>
+                      </a:r>
+                      <a:endParaRPr lang="en-GB" dirty="0"/>
+                    </a:p>
+                  </a:txBody>
+                  <a:tcPr/>
+                </a:tc>
+              </a:tr>
+              <a:tr h="370840">
+                <a:tc>
+                  <a:txBody>
+                    <a:bodyPr/>
+                    <a:lstStyle/>
+                    <a:p>
+                      <a:r>
+                        <a:rPr lang="en-GB" dirty="0" smtClean="0"/>
+                        <a:t>User Profile</a:t>
+                      </a:r>
+                      <a:endParaRPr lang="en-GB" dirty="0"/>
+                    </a:p>
+                  </a:txBody>
+                  <a:tcPr/>
+                </a:tc>
+                <a:tc>
+                  <a:txBody>
+                    <a:bodyPr/>
+                    <a:lstStyle/>
+                    <a:p>
+                      <a:r>
+                        <a:rPr lang="en-GB" dirty="0" smtClean="0"/>
+                        <a:t>/user/username</a:t>
+                      </a:r>
+                      <a:endParaRPr lang="en-GB" dirty="0"/>
+                    </a:p>
+                  </a:txBody>
+                  <a:tcPr/>
+                </a:tc>
+              </a:tr>
+            </a:tbl>
+          </a:graphicData>
+        </a:graphic>
+      </p:graphicFrame>
+      <p:pic>
+        <p:nvPicPr>
+          <p:cNvPr id="5" name="Picture 2" descr="H:\studeso\styling\images\akita.png"/>
+          <p:cNvPicPr>
+            <a:picLocks noChangeAspect="1" noChangeArrowheads="1"/>
+          </p:cNvPicPr>
+          <p:nvPr/>
+        </p:nvPicPr>
+        <p:blipFill>
+          <a:blip r:embed="rId2" cstate="print"/>
+          <a:srcRect/>
+          <a:stretch>
+            <a:fillRect/>
+          </a:stretch>
+        </p:blipFill>
+        <p:spPr bwMode="auto">
+          <a:xfrm flipH="1">
+            <a:off x="7559824" y="-171400"/>
+            <a:ext cx="1584176" cy="1475656"/>
+          </a:xfrm>
+          <a:prstGeom prst="rect">
+            <a:avLst/>
+          </a:prstGeom>
+          <a:noFill/>
+        </p:spPr>
+      </p:pic>
+    </p:spTree>
+    <p:extLst>
+      <p:ext uri="{BB962C8B-B14F-4D97-AF65-F5344CB8AC3E}">
+        <p14:creationId xmlns:p14="http://schemas.microsoft.com/office/powerpoint/2010/main" val="2465526846"/>
+      </p:ext>
+    </p:extLst>
+  </p:cSld>
+  <p:clrMapOvr>
+    <a:masterClrMapping/>
+  </p:clrMapOvr>
+</p:sld>
+</file>
+
+<file path=ppt/slides/slide8.xml><?xml version="1.0" encoding="utf-8"?>
+<p:sld xmlns:a="http://schemas.openxmlformats.org/drawingml/2006/main" xmlns:r="http://schemas.openxmlformats.org/officeDocument/2006/relationships" xmlns:p="http://schemas.openxmlformats.org/presentationml/2006/main">
+  <p:cSld>
+    <p:spTree>
+      <p:nvGrpSpPr>
+        <p:cNvPr id="1" name=""/>
+        <p:cNvGrpSpPr/>
+        <p:nvPr/>
+      </p:nvGrpSpPr>
+      <p:grpSpPr>
+        <a:xfrm>
+          <a:off x="0" y="0"/>
+          <a:ext cx="0" cy="0"/>
+          <a:chOff x="0" y="0"/>
+          <a:chExt cx="0" cy="0"/>
+        </a:xfrm>
+      </p:grpSpPr>
+      <p:sp>
+        <p:nvSpPr>
+          <p:cNvPr id="2" name="Title 1"/>
+          <p:cNvSpPr>
+            <a:spLocks noGrp="1"/>
+          </p:cNvSpPr>
+          <p:nvPr>
+            <p:ph type="title"/>
+          </p:nvPr>
+        </p:nvSpPr>
         <p:spPr>
           <a:xfrm>
             <a:off x="457200" y="44624"/>
@@ -6213,127 +6786,6 @@
     <p:extLst>
       <p:ext uri="{BB962C8B-B14F-4D97-AF65-F5344CB8AC3E}">
         <p14:creationId xmlns:p14="http://schemas.microsoft.com/office/powerpoint/2010/main" val="3144856911"/>
-      </p:ext>
-    </p:extLst>
-  </p:cSld>
-  <p:clrMapOvr>
-    <a:masterClrMapping/>
-  </p:clrMapOvr>
-  <p:timing>
-    <p:tnLst>
-      <p:par>
-        <p:cTn id="1" dur="indefinite" restart="never" nodeType="tmRoot"/>
-      </p:par>
-    </p:tnLst>
-  </p:timing>
-</p:sld>
-</file>
-
-<file path=ppt/slides/slide8.xml><?xml version="1.0" encoding="utf-8"?>
-<p:sld xmlns:a="http://schemas.openxmlformats.org/drawingml/2006/main" xmlns:r="http://schemas.openxmlformats.org/officeDocument/2006/relationships" xmlns:p="http://schemas.openxmlformats.org/presentationml/2006/main">
-  <p:cSld>
-    <p:spTree>
-      <p:nvGrpSpPr>
-        <p:cNvPr id="1" name=""/>
-        <p:cNvGrpSpPr/>
-        <p:nvPr/>
-      </p:nvGrpSpPr>
-      <p:grpSpPr>
-        <a:xfrm>
-          <a:off x="0" y="0"/>
-          <a:ext cx="0" cy="0"/>
-          <a:chOff x="0" y="0"/>
-          <a:chExt cx="0" cy="0"/>
-        </a:xfrm>
-      </p:grpSpPr>
-      <p:sp>
-        <p:nvSpPr>
-          <p:cNvPr id="2" name="Title 1"/>
-          <p:cNvSpPr>
-            <a:spLocks noGrp="1"/>
-          </p:cNvSpPr>
-          <p:nvPr>
-            <p:ph type="title"/>
-          </p:nvPr>
-        </p:nvSpPr>
-        <p:spPr>
-          <a:xfrm>
-            <a:off x="395536" y="53752"/>
-            <a:ext cx="8229600" cy="1143000"/>
-          </a:xfrm>
-        </p:spPr>
-        <p:txBody>
-          <a:bodyPr/>
-          <a:lstStyle/>
-          <a:p>
-            <a:r>
-              <a:rPr lang="en-GB" dirty="0" smtClean="0">
-                <a:latin typeface="Lucida Sans" pitchFamily="34" charset="0"/>
-              </a:rPr>
-              <a:t>n-Tier Diagram</a:t>
-            </a:r>
-            <a:endParaRPr lang="en-GB" dirty="0">
-              <a:latin typeface="Lucida Sans" pitchFamily="34" charset="0"/>
-            </a:endParaRPr>
-          </a:p>
-        </p:txBody>
-      </p:sp>
-      <p:pic>
-        <p:nvPicPr>
-          <p:cNvPr id="5" name="Picture 2" descr="H:\studeso\styling\images\akita.png"/>
-          <p:cNvPicPr>
-            <a:picLocks noChangeAspect="1" noChangeArrowheads="1"/>
-          </p:cNvPicPr>
-          <p:nvPr/>
-        </p:nvPicPr>
-        <p:blipFill>
-          <a:blip r:embed="rId2" cstate="print"/>
-          <a:srcRect/>
-          <a:stretch>
-            <a:fillRect/>
-          </a:stretch>
-        </p:blipFill>
-        <p:spPr bwMode="auto">
-          <a:xfrm flipH="1">
-            <a:off x="7559824" y="0"/>
-            <a:ext cx="1584176" cy="1475656"/>
-          </a:xfrm>
-          <a:prstGeom prst="rect">
-            <a:avLst/>
-          </a:prstGeom>
-          <a:noFill/>
-        </p:spPr>
-      </p:pic>
-      <p:pic>
-        <p:nvPicPr>
-          <p:cNvPr id="1026" name="Picture 2" descr="C:\Users\2082442C\AppData\Local\Temp\BarkNTier.png"/>
-          <p:cNvPicPr>
-            <a:picLocks noChangeAspect="1" noChangeArrowheads="1"/>
-          </p:cNvPicPr>
-          <p:nvPr/>
-        </p:nvPicPr>
-        <p:blipFill>
-          <a:blip r:embed="rId3" cstate="print"/>
-          <a:srcRect/>
-          <a:stretch>
-            <a:fillRect/>
-          </a:stretch>
-        </p:blipFill>
-        <p:spPr bwMode="auto">
-          <a:xfrm>
-            <a:off x="527050" y="2825750"/>
-            <a:ext cx="8088313" cy="1206500"/>
-          </a:xfrm>
-          <a:prstGeom prst="rect">
-            <a:avLst/>
-          </a:prstGeom>
-          <a:noFill/>
-        </p:spPr>
-      </p:pic>
-    </p:spTree>
-    <p:extLst>
-      <p:ext uri="{BB962C8B-B14F-4D97-AF65-F5344CB8AC3E}">
-        <p14:creationId xmlns:p14="http://schemas.microsoft.com/office/powerpoint/2010/main" val="1312360545"/>
       </p:ext>
     </p:extLst>
   </p:cSld>
@@ -6377,7 +6829,12 @@
             <p:ph type="title"/>
           </p:nvPr>
         </p:nvSpPr>
-        <p:spPr/>
+        <p:spPr>
+          <a:xfrm>
+            <a:off x="395536" y="53752"/>
+            <a:ext cx="8229600" cy="1143000"/>
+          </a:xfrm>
+        </p:spPr>
         <p:txBody>
           <a:bodyPr/>
           <a:lstStyle/>
@@ -6386,7 +6843,7 @@
               <a:rPr lang="en-GB" dirty="0" smtClean="0">
                 <a:latin typeface="Lucida Sans" pitchFamily="34" charset="0"/>
               </a:rPr>
-              <a:t>Wireframes – index page</a:t>
+              <a:t>n-Tier Diagram</a:t>
             </a:r>
             <a:endParaRPr lang="en-GB" dirty="0">
               <a:latin typeface="Lucida Sans" pitchFamily="34" charset="0"/>
@@ -6396,36 +6853,33 @@
       </p:sp>
       <p:pic>
         <p:nvPicPr>
-          <p:cNvPr id="4" name="Content Placeholder 3"/>
+          <p:cNvPr id="5" name="Picture 2" descr="H:\studeso\styling\images\akita.png"/>
           <p:cNvPicPr>
-            <a:picLocks noGrp="1" noChangeAspect="1"/>
+            <a:picLocks noChangeAspect="1" noChangeArrowheads="1"/>
           </p:cNvPicPr>
-          <p:nvPr>
-            <p:ph sz="quarter" idx="1"/>
-          </p:nvPr>
+          <p:nvPr/>
         </p:nvPicPr>
         <p:blipFill>
-          <a:blip r:embed="rId2">
-            <a:extLst>
-              <a:ext uri="{28A0092B-C50C-407E-A947-70E740481C1C}">
-                <a14:useLocalDpi xmlns:a14="http://schemas.microsoft.com/office/drawing/2010/main" val="0"/>
-              </a:ext>
-            </a:extLst>
-          </a:blip>
+          <a:blip r:embed="rId2" cstate="print"/>
+          <a:srcRect/>
           <a:stretch>
             <a:fillRect/>
           </a:stretch>
         </p:blipFill>
-        <p:spPr>
-          <a:xfrm>
-            <a:off x="78319" y="1295400"/>
-            <a:ext cx="9065681" cy="4157338"/>
-          </a:xfrm>
+        <p:spPr bwMode="auto">
+          <a:xfrm flipH="1">
+            <a:off x="7559824" y="0"/>
+            <a:ext cx="1584176" cy="1475656"/>
+          </a:xfrm>
+          <a:prstGeom prst="rect">
+            <a:avLst/>
+          </a:prstGeom>
+          <a:noFill/>
         </p:spPr>
       </p:pic>
       <p:pic>
         <p:nvPicPr>
-          <p:cNvPr id="5" name="Picture 2" descr="H:\studeso\styling\images\akita.png"/>
+          <p:cNvPr id="1026" name="Picture 2" descr="C:\Users\2082442C\AppData\Local\Temp\BarkNTier.png"/>
           <p:cNvPicPr>
             <a:picLocks noChangeAspect="1" noChangeArrowheads="1"/>
           </p:cNvPicPr>
@@ -6439,9 +6893,9 @@
           </a:stretch>
         </p:blipFill>
         <p:spPr bwMode="auto">
-          <a:xfrm flipH="1">
-            <a:off x="7559824" y="0"/>
-            <a:ext cx="1584176" cy="1475656"/>
+          <a:xfrm>
+            <a:off x="527050" y="2825750"/>
+            <a:ext cx="8088313" cy="1206500"/>
           </a:xfrm>
           <a:prstGeom prst="rect">
             <a:avLst/>
@@ -6452,7 +6906,7 @@
     </p:spTree>
     <p:extLst>
       <p:ext uri="{BB962C8B-B14F-4D97-AF65-F5344CB8AC3E}">
-        <p14:creationId xmlns:p14="http://schemas.microsoft.com/office/powerpoint/2010/main" val="2608953531"/>
+        <p14:creationId xmlns:p14="http://schemas.microsoft.com/office/powerpoint/2010/main" val="1312360545"/>
       </p:ext>
     </p:extLst>
   </p:cSld>

</xml_diff>